<commit_message>
background modified and coordinates
</commit_message>
<xml_diff>
--- a/assets/archivo.pptx
+++ b/assets/archivo.pptx
@@ -4,6 +4,9 @@
   <p:sldMasterIdLst>
     <p:sldMasterId id="2147483648" r:id="rId1"/>
   </p:sldMasterIdLst>
+  <p:notesMasterIdLst>
+    <p:notesMasterId r:id="rId24"/>
+  </p:notesMasterIdLst>
   <p:sldIdLst>
     <p:sldId id="256" r:id="rId2"/>
     <p:sldId id="257" r:id="rId3"/>
@@ -26,12 +29,10 @@
     <p:sldId id="274" r:id="rId20"/>
     <p:sldId id="275" r:id="rId21"/>
     <p:sldId id="276" r:id="rId22"/>
+    <p:sldId id="277" r:id="rId23"/>
   </p:sldIdLst>
-  <p:notesMasterIdLst>
-    <p:notesMasterId r:id="rId23"/>
-  </p:notesMasterIdLst>
-  <p:sldSz cx="9144000" cy="5143500"/>
-  <p:notesSz cx="5143500" cy="9144000"/>
+  <p:sldSz cx="7772400" cy="10058400"/>
+  <p:notesSz cx="10058400" cy="7772400"/>
   <p:defaultTextStyle>
     <a:lvl1pPr marL="0" algn="l" defTabSz="914400" rtl="0" eaLnBrk="1" latinLnBrk="0" hangingPunct="1">
       <a:defRPr sz="1800" kern="1200">
@@ -124,6 +125,11 @@
       </a:defRPr>
     </a:lvl9pPr>
   </p:defaultTextStyle>
+  <p:extLst>
+    <p:ext uri="{EFAFB233-063F-42B5-8137-9DF3F51BA10A}">
+      <p15:sldGuideLst xmlns:p15="http://schemas.microsoft.com/office/powerpoint/2012/main"/>
+    </p:ext>
+  </p:extLst>
 </p:presentation>
 </file>
 
@@ -149,234 +155,10 @@
           <a:chExt cx="0" cy="0"/>
         </a:xfrm>
       </p:grpSpPr>
-      <p:sp>
-        <p:nvSpPr>
-          <p:cNvPr id="2" name="Header Placeholder 1"/>
-          <p:cNvSpPr>
-            <a:spLocks noGrp="1"/>
-          </p:cNvSpPr>
-          <p:nvPr>
-            <p:ph type="hdr" sz="quarter"/>
-          </p:nvPr>
-        </p:nvSpPr>
-        <p:spPr>
-          <a:xfrm>
-            <a:off x="0" y="0"/>
-            <a:ext cx="2971800" cy="458788"/>
-          </a:xfrm>
-          <a:prstGeom prst="rect">
-            <a:avLst/>
-          </a:prstGeom>
-        </p:spPr>
-        <p:txBody>
-          <a:bodyPr vert="horz" lIns="91440" tIns="45720" rIns="91440" bIns="45720" rtlCol="0"/>
-          <a:lstStyle>
-            <a:lvl1pPr algn="l">
-              <a:defRPr sz="1200"/>
-            </a:lvl1pPr>
-          </a:lstStyle>
-          <a:p>
-            <a:endParaRPr lang="en-US"/>
-          </a:p>
-        </p:txBody>
-      </p:sp>
-      <p:sp>
-        <p:nvSpPr>
-          <p:cNvPr id="3" name="Date Placeholder 2"/>
-          <p:cNvSpPr>
-            <a:spLocks noGrp="1"/>
-          </p:cNvSpPr>
-          <p:nvPr>
-            <p:ph type="dt" idx="1"/>
-          </p:nvPr>
-        </p:nvSpPr>
-        <p:spPr>
-          <a:xfrm>
-            <a:off x="3884613" y="0"/>
-            <a:ext cx="2971800" cy="458788"/>
-          </a:xfrm>
-          <a:prstGeom prst="rect">
-            <a:avLst/>
-          </a:prstGeom>
-        </p:spPr>
-        <p:txBody>
-          <a:bodyPr vert="horz" lIns="91440" tIns="45720" rIns="91440" bIns="45720" rtlCol="0"/>
-          <a:lstStyle>
-            <a:lvl1pPr algn="r">
-              <a:defRPr sz="1200"/>
-            </a:lvl1pPr>
-          </a:lstStyle>
-          <a:p>
-            <a:fld id="{5282F153-3F37-0F45-9E97-73ACFA13230C}" type="datetimeFigureOut">
-              <a:rPr lang="en-US"/>
-              <a:t>7/23/19</a:t>
-            </a:fld>
-            <a:endParaRPr lang="en-US"/>
-          </a:p>
-        </p:txBody>
-      </p:sp>
-      <p:sp>
-        <p:nvSpPr>
-          <p:cNvPr id="4" name="Slide Image Placeholder 3"/>
-          <p:cNvSpPr>
-            <a:spLocks noGrp="1" noRot="1" noChangeAspect="1"/>
-          </p:cNvSpPr>
-          <p:nvPr>
-            <p:ph type="sldImg" idx="2"/>
-          </p:nvPr>
-        </p:nvSpPr>
-        <p:spPr>
-          <a:xfrm>
-            <a:off x="685800" y="1143000"/>
-            <a:ext cx="5486400" cy="3086100"/>
-          </a:xfrm>
-          <a:prstGeom prst="rect">
-            <a:avLst/>
-          </a:prstGeom>
-          <a:noFill/>
-          <a:ln w="12700">
-            <a:solidFill>
-              <a:prstClr val="black"/>
-            </a:solidFill>
-          </a:ln>
-        </p:spPr>
-        <p:txBody>
-          <a:bodyPr vert="horz" lIns="91440" tIns="45720" rIns="91440" bIns="45720" rtlCol="0" anchor="ctr"/>
-          <a:lstStyle/>
-          <a:p>
-            <a:endParaRPr lang="en-US"/>
-          </a:p>
-        </p:txBody>
-      </p:sp>
-      <p:sp>
-        <p:nvSpPr>
-          <p:cNvPr id="5" name="Notes Placeholder 4"/>
-          <p:cNvSpPr>
-            <a:spLocks noGrp="1"/>
-          </p:cNvSpPr>
-          <p:nvPr>
-            <p:ph type="body" sz="quarter" idx="3"/>
-          </p:nvPr>
-        </p:nvSpPr>
-        <p:spPr>
-          <a:xfrm>
-            <a:off x="685800" y="4400550"/>
-            <a:ext cx="5486400" cy="3600450"/>
-          </a:xfrm>
-          <a:prstGeom prst="rect">
-            <a:avLst/>
-          </a:prstGeom>
-        </p:spPr>
-        <p:txBody>
-          <a:bodyPr vert="horz" lIns="91440" tIns="45720" rIns="91440" bIns="45720" rtlCol="0"/>
-          <a:lstStyle/>
-          <a:p>
-            <a:pPr lvl="0"/>
-            <a:r>
-              <a:rPr lang="en-US"/>
-              <a:t>Click to edit Master text styles</a:t>
-            </a:r>
-          </a:p>
-          <a:p>
-            <a:pPr lvl="1"/>
-            <a:r>
-              <a:rPr lang="en-US"/>
-              <a:t>Second level</a:t>
-            </a:r>
-          </a:p>
-          <a:p>
-            <a:pPr lvl="2"/>
-            <a:r>
-              <a:rPr lang="en-US"/>
-              <a:t>Third level</a:t>
-            </a:r>
-          </a:p>
-          <a:p>
-            <a:pPr lvl="3"/>
-            <a:r>
-              <a:rPr lang="en-US"/>
-              <a:t>Fourth level</a:t>
-            </a:r>
-          </a:p>
-          <a:p>
-            <a:pPr lvl="4"/>
-            <a:r>
-              <a:rPr lang="en-US"/>
-              <a:t>Fifth level</a:t>
-            </a:r>
-          </a:p>
-        </p:txBody>
-      </p:sp>
-      <p:sp>
-        <p:nvSpPr>
-          <p:cNvPr id="6" name="Footer Placeholder 5"/>
-          <p:cNvSpPr>
-            <a:spLocks noGrp="1"/>
-          </p:cNvSpPr>
-          <p:nvPr>
-            <p:ph type="ftr" sz="quarter" idx="4"/>
-          </p:nvPr>
-        </p:nvSpPr>
-        <p:spPr>
-          <a:xfrm>
-            <a:off x="0" y="8685213"/>
-            <a:ext cx="2971800" cy="458787"/>
-          </a:xfrm>
-          <a:prstGeom prst="rect">
-            <a:avLst/>
-          </a:prstGeom>
-        </p:spPr>
-        <p:txBody>
-          <a:bodyPr vert="horz" lIns="91440" tIns="45720" rIns="91440" bIns="45720" rtlCol="0" anchor="b"/>
-          <a:lstStyle>
-            <a:lvl1pPr algn="l">
-              <a:defRPr sz="1200"/>
-            </a:lvl1pPr>
-          </a:lstStyle>
-          <a:p>
-            <a:endParaRPr lang="en-US"/>
-          </a:p>
-        </p:txBody>
-      </p:sp>
-      <p:sp>
-        <p:nvSpPr>
-          <p:cNvPr id="7" name="Slide Number Placeholder 6"/>
-          <p:cNvSpPr>
-            <a:spLocks noGrp="1"/>
-          </p:cNvSpPr>
-          <p:nvPr>
-            <p:ph type="sldNum" sz="quarter" idx="5"/>
-          </p:nvPr>
-        </p:nvSpPr>
-        <p:spPr>
-          <a:xfrm>
-            <a:off x="3884613" y="8685213"/>
-            <a:ext cx="2971800" cy="458787"/>
-          </a:xfrm>
-          <a:prstGeom prst="rect">
-            <a:avLst/>
-          </a:prstGeom>
-        </p:spPr>
-        <p:txBody>
-          <a:bodyPr vert="horz" lIns="91440" tIns="45720" rIns="91440" bIns="45720" rtlCol="0" anchor="b"/>
-          <a:lstStyle>
-            <a:lvl1pPr algn="r">
-              <a:defRPr sz="1200"/>
-            </a:lvl1pPr>
-          </a:lstStyle>
-          <a:p>
-            <a:fld id="{CE5E9CC1-C706-0F49-92D6-E571CC5EEA8F}" type="slidenum">
-              <a:rPr lang="en-US"/>
-              <a:t>‹#›</a:t>
-            </a:fld>
-            <a:endParaRPr lang="en-US"/>
-          </a:p>
-        </p:txBody>
-      </p:sp>
     </p:spTree>
     <p:extLst>
       <p:ext uri="{BB962C8B-B14F-4D97-AF65-F5344CB8AC3E}">
-        <p14:creationId xmlns:p14="http://schemas.microsoft.com/office/powerpoint/2010/main" val="1024086991"/>
+        <p14:creationId xmlns:p14="http://schemas.microsoft.com/office/powerpoint/2010/main" val="2182764328"/>
       </p:ext>
     </p:extLst>
   </p:cSld>
@@ -520,10 +302,6 @@
           <a:bodyPr/>
           <a:lstStyle/>
           <a:p>
-            <a:r>
-              <a:rPr lang="en-US" dirty="0"/>
-              <a:t/>
-            </a:r>
             <a:endParaRPr lang="en-US" dirty="0"/>
           </a:p>
         </p:txBody>
@@ -608,10 +386,6 @@
           <a:bodyPr/>
           <a:lstStyle/>
           <a:p>
-            <a:r>
-              <a:rPr lang="en-US" dirty="0"/>
-              <a:t/>
-            </a:r>
             <a:endParaRPr lang="en-US" dirty="0"/>
           </a:p>
         </p:txBody>
@@ -696,10 +470,6 @@
           <a:bodyPr/>
           <a:lstStyle/>
           <a:p>
-            <a:r>
-              <a:rPr lang="en-US" dirty="0"/>
-              <a:t/>
-            </a:r>
             <a:endParaRPr lang="en-US" dirty="0"/>
           </a:p>
         </p:txBody>
@@ -784,10 +554,6 @@
           <a:bodyPr/>
           <a:lstStyle/>
           <a:p>
-            <a:r>
-              <a:rPr lang="en-US" dirty="0"/>
-              <a:t/>
-            </a:r>
             <a:endParaRPr lang="en-US" dirty="0"/>
           </a:p>
         </p:txBody>
@@ -872,10 +638,6 @@
           <a:bodyPr/>
           <a:lstStyle/>
           <a:p>
-            <a:r>
-              <a:rPr lang="en-US" dirty="0"/>
-              <a:t/>
-            </a:r>
             <a:endParaRPr lang="en-US" dirty="0"/>
           </a:p>
         </p:txBody>
@@ -960,10 +722,6 @@
           <a:bodyPr/>
           <a:lstStyle/>
           <a:p>
-            <a:r>
-              <a:rPr lang="en-US" dirty="0"/>
-              <a:t/>
-            </a:r>
             <a:endParaRPr lang="en-US" dirty="0"/>
           </a:p>
         </p:txBody>
@@ -1048,10 +806,6 @@
           <a:bodyPr/>
           <a:lstStyle/>
           <a:p>
-            <a:r>
-              <a:rPr lang="en-US" dirty="0"/>
-              <a:t/>
-            </a:r>
             <a:endParaRPr lang="en-US" dirty="0"/>
           </a:p>
         </p:txBody>
@@ -1136,10 +890,6 @@
           <a:bodyPr/>
           <a:lstStyle/>
           <a:p>
-            <a:r>
-              <a:rPr lang="en-US" dirty="0"/>
-              <a:t/>
-            </a:r>
             <a:endParaRPr lang="en-US" dirty="0"/>
           </a:p>
         </p:txBody>
@@ -1224,10 +974,6 @@
           <a:bodyPr/>
           <a:lstStyle/>
           <a:p>
-            <a:r>
-              <a:rPr lang="en-US" dirty="0"/>
-              <a:t/>
-            </a:r>
             <a:endParaRPr lang="en-US" dirty="0"/>
           </a:p>
         </p:txBody>
@@ -1312,10 +1058,6 @@
           <a:bodyPr/>
           <a:lstStyle/>
           <a:p>
-            <a:r>
-              <a:rPr lang="en-US" dirty="0"/>
-              <a:t/>
-            </a:r>
             <a:endParaRPr lang="en-US" dirty="0"/>
           </a:p>
         </p:txBody>
@@ -1400,10 +1142,6 @@
           <a:bodyPr/>
           <a:lstStyle/>
           <a:p>
-            <a:r>
-              <a:rPr lang="en-US" dirty="0"/>
-              <a:t/>
-            </a:r>
             <a:endParaRPr lang="en-US" dirty="0"/>
           </a:p>
         </p:txBody>
@@ -1488,10 +1226,6 @@
           <a:bodyPr/>
           <a:lstStyle/>
           <a:p>
-            <a:r>
-              <a:rPr lang="en-US" dirty="0"/>
-              <a:t/>
-            </a:r>
             <a:endParaRPr lang="en-US" dirty="0"/>
           </a:p>
         </p:txBody>
@@ -1576,10 +1310,6 @@
           <a:bodyPr/>
           <a:lstStyle/>
           <a:p>
-            <a:r>
-              <a:rPr lang="en-US" dirty="0"/>
-              <a:t/>
-            </a:r>
             <a:endParaRPr lang="en-US" dirty="0"/>
           </a:p>
         </p:txBody>
@@ -1664,10 +1394,6 @@
           <a:bodyPr/>
           <a:lstStyle/>
           <a:p>
-            <a:r>
-              <a:rPr lang="en-US" dirty="0"/>
-              <a:t/>
-            </a:r>
             <a:endParaRPr lang="en-US" dirty="0"/>
           </a:p>
         </p:txBody>
@@ -1690,6 +1416,90 @@
             <a:fld id="{F7021451-1387-4CA6-816F-3879F97B5CBC}" type="slidenum">
               <a:rPr lang="en-US"/>
               <a:t>21</a:t>
+            </a:fld>
+            <a:endParaRPr lang="en-US"/>
+          </a:p>
+        </p:txBody>
+      </p:sp>
+    </p:spTree>
+    <p:extLst>
+      <p:ext uri="{BB962C8B-B14F-4D97-AF65-F5344CB8AC3E}">
+        <p14:creationId xmlns:p14="http://schemas.microsoft.com/office/powerpoint/2010/main" val="1024086991"/>
+      </p:ext>
+    </p:extLst>
+  </p:cSld>
+  <p:clrMapOvr>
+    <a:masterClrMapping/>
+  </p:clrMapOvr>
+</p:notes>
+</file>
+
+<file path=ppt/notesSlides/notesSlide22.xml><?xml version="1.0" encoding="utf-8"?>
+<p:notes xmlns:a="http://schemas.openxmlformats.org/drawingml/2006/main" xmlns:r="http://schemas.openxmlformats.org/officeDocument/2006/relationships" xmlns:p="http://schemas.openxmlformats.org/presentationml/2006/main">
+  <p:cSld>
+    <p:spTree>
+      <p:nvGrpSpPr>
+        <p:cNvPr id="1" name=""/>
+        <p:cNvGrpSpPr/>
+        <p:nvPr/>
+      </p:nvGrpSpPr>
+      <p:grpSpPr>
+        <a:xfrm>
+          <a:off x="0" y="0"/>
+          <a:ext cx="0" cy="0"/>
+          <a:chOff x="0" y="0"/>
+          <a:chExt cx="0" cy="0"/>
+        </a:xfrm>
+      </p:grpSpPr>
+      <p:sp>
+        <p:nvSpPr>
+          <p:cNvPr id="2" name="Slide Image Placeholder 1"/>
+          <p:cNvSpPr>
+            <a:spLocks noGrp="1" noRot="1" noChangeAspect="1"/>
+          </p:cNvSpPr>
+          <p:nvPr>
+            <p:ph type="sldImg"/>
+          </p:nvPr>
+        </p:nvSpPr>
+        <p:spPr/>
+      </p:sp>
+      <p:sp>
+        <p:nvSpPr>
+          <p:cNvPr id="3" name="Notes Placeholder 2"/>
+          <p:cNvSpPr>
+            <a:spLocks noGrp="1"/>
+          </p:cNvSpPr>
+          <p:nvPr>
+            <p:ph type="body" idx="1"/>
+          </p:nvPr>
+        </p:nvSpPr>
+        <p:spPr/>
+        <p:txBody>
+          <a:bodyPr/>
+          <a:lstStyle/>
+          <a:p>
+            <a:endParaRPr lang="en-US" dirty="0"/>
+          </a:p>
+        </p:txBody>
+      </p:sp>
+      <p:sp>
+        <p:nvSpPr>
+          <p:cNvPr id="4" name="Slide Number Placeholder 3"/>
+          <p:cNvSpPr>
+            <a:spLocks noGrp="1"/>
+          </p:cNvSpPr>
+          <p:nvPr>
+            <p:ph type="sldNum" sz="quarter" idx="10"/>
+          </p:nvPr>
+        </p:nvSpPr>
+        <p:spPr/>
+        <p:txBody>
+          <a:bodyPr/>
+          <a:lstStyle/>
+          <a:p>
+            <a:fld id="{F7021451-1387-4CA6-816F-3879F97B5CBC}" type="slidenum">
+              <a:rPr lang="en-US"/>
+              <a:t>22</a:t>
             </a:fld>
             <a:endParaRPr lang="en-US"/>
           </a:p>
@@ -1752,10 +1562,6 @@
           <a:bodyPr/>
           <a:lstStyle/>
           <a:p>
-            <a:r>
-              <a:rPr lang="en-US" dirty="0"/>
-              <a:t/>
-            </a:r>
             <a:endParaRPr lang="en-US" dirty="0"/>
           </a:p>
         </p:txBody>
@@ -1840,10 +1646,6 @@
           <a:bodyPr/>
           <a:lstStyle/>
           <a:p>
-            <a:r>
-              <a:rPr lang="en-US" dirty="0"/>
-              <a:t/>
-            </a:r>
             <a:endParaRPr lang="en-US" dirty="0"/>
           </a:p>
         </p:txBody>
@@ -1928,10 +1730,6 @@
           <a:bodyPr/>
           <a:lstStyle/>
           <a:p>
-            <a:r>
-              <a:rPr lang="en-US" dirty="0"/>
-              <a:t/>
-            </a:r>
             <a:endParaRPr lang="en-US" dirty="0"/>
           </a:p>
         </p:txBody>
@@ -2016,10 +1814,6 @@
           <a:bodyPr/>
           <a:lstStyle/>
           <a:p>
-            <a:r>
-              <a:rPr lang="en-US" dirty="0"/>
-              <a:t/>
-            </a:r>
             <a:endParaRPr lang="en-US" dirty="0"/>
           </a:p>
         </p:txBody>
@@ -2104,10 +1898,6 @@
           <a:bodyPr/>
           <a:lstStyle/>
           <a:p>
-            <a:r>
-              <a:rPr lang="en-US" dirty="0"/>
-              <a:t/>
-            </a:r>
             <a:endParaRPr lang="en-US" dirty="0"/>
           </a:p>
         </p:txBody>
@@ -2192,10 +1982,6 @@
           <a:bodyPr/>
           <a:lstStyle/>
           <a:p>
-            <a:r>
-              <a:rPr lang="en-US" dirty="0"/>
-              <a:t/>
-            </a:r>
             <a:endParaRPr lang="en-US" dirty="0"/>
           </a:p>
         </p:txBody>
@@ -2280,10 +2066,6 @@
           <a:bodyPr/>
           <a:lstStyle/>
           <a:p>
-            <a:r>
-              <a:rPr lang="en-US" dirty="0"/>
-              <a:t/>
-            </a:r>
             <a:endParaRPr lang="en-US" dirty="0"/>
           </a:p>
         </p:txBody>
@@ -2357,6 +2139,11 @@
 <file path=ppt/slideMasters/slideMaster1.xml><?xml version="1.0" encoding="utf-8"?>
 <p:sldMaster xmlns:a="http://schemas.openxmlformats.org/drawingml/2006/main" xmlns:r="http://schemas.openxmlformats.org/officeDocument/2006/relationships" xmlns:p="http://schemas.openxmlformats.org/presentationml/2006/main">
   <p:cSld>
+    <p:bg>
+      <p:bgRef idx="1001">
+        <a:schemeClr val="bg1"/>
+      </p:bgRef>
+    </p:bg>
     <p:spTree>
       <p:nvGrpSpPr>
         <p:cNvPr id="1" name=""/>
@@ -2634,6 +2421,14 @@
 <file path=ppt/slides/slide1.xml><?xml version="1.0" encoding="utf-8"?>
 <p:sld xmlns:a="http://schemas.openxmlformats.org/drawingml/2006/main" xmlns:r="http://schemas.openxmlformats.org/officeDocument/2006/relationships" xmlns:p="http://schemas.openxmlformats.org/presentationml/2006/main">
   <p:cSld name="Slide 1">
+    <p:bg>
+      <p:bgPr>
+        <a:solidFill>
+          <a:srgbClr val="616161"/>
+        </a:solidFill>
+        <a:effectLst/>
+      </p:bgPr>
+    </p:bg>
     <p:spTree>
       <p:nvGrpSpPr>
         <p:cNvPr id="1" name=""/>
@@ -2657,7 +2452,7 @@
         <p:spPr>
           <a:xfrm>
             <a:off x="457200" y="457200"/>
-            <a:ext cx="6858000" cy="0"/>
+            <a:ext cx="5829300" cy="0"/>
           </a:xfrm>
           <a:prstGeom prst="rect">
             <a:avLst/>
@@ -2669,18 +2464,26 @@
           <a:bodyPr wrap="square" rtlCol="0" anchor="ctr"/>
           <a:lstStyle/>
           <a:p>
-            <a:pPr algn="l" indent="0" marL="0">
+            <a:pPr marL="0" indent="0" algn="l">
               <a:buNone/>
             </a:pPr>
             <a:r>
-              <a:rPr lang="en-US" sz="2400" dirty="0">
-                <a:solidFill>
-                  <a:srgbClr val="000000"/>
-                </a:solidFill>
-              </a:rPr>
-              <a:t>REPONER MANILLA INTERIORES APERTURA DE PUERTA RH</a:t>
-            </a:r>
-            <a:endParaRPr lang="en-US" sz="2400" dirty="0"/>
+              <a:rPr lang="en-US" sz="1400" dirty="0">
+                <a:solidFill>
+                  <a:srgbClr val="F39200"/>
+                </a:solidFill>
+              </a:rPr>
+              <a:t>8. </a:t>
+            </a:r>
+            <a:r>
+              <a:rPr lang="en-US" sz="1400" dirty="0">
+                <a:solidFill>
+                  <a:srgbClr val="FFFFFF"/>
+                </a:solidFill>
+              </a:rPr>
+              <a:t>LIMPIAR CABINA SUCIA</a:t>
+            </a:r>
+            <a:endParaRPr lang="en-US" sz="1400" dirty="0"/>
           </a:p>
         </p:txBody>
       </p:sp>
@@ -2692,8 +2495,8 @@
         </p:nvSpPr>
         <p:spPr>
           <a:xfrm>
-            <a:off x="457200" y="2286000"/>
-            <a:ext cx="6858000" cy="0"/>
+            <a:off x="457200" y="5029200"/>
+            <a:ext cx="5829300" cy="0"/>
           </a:xfrm>
           <a:prstGeom prst="rect">
             <a:avLst/>
@@ -2705,18 +2508,26 @@
           <a:bodyPr wrap="square" rtlCol="0" anchor="ctr"/>
           <a:lstStyle/>
           <a:p>
-            <a:pPr algn="l" indent="0" marL="0">
+            <a:pPr marL="0" indent="0" algn="l">
               <a:buNone/>
             </a:pPr>
             <a:r>
-              <a:rPr lang="en-US" sz="2400" dirty="0">
-                <a:solidFill>
-                  <a:srgbClr val="000000"/>
-                </a:solidFill>
-              </a:rPr>
-              <a:t>EVALUACIÓN DE A/C NO ENFRIA</a:t>
-            </a:r>
-            <a:endParaRPr lang="en-US" sz="2400" dirty="0"/>
+              <a:rPr lang="en-US" sz="1400" dirty="0">
+                <a:solidFill>
+                  <a:srgbClr val="F39200"/>
+                </a:solidFill>
+              </a:rPr>
+              <a:t>9. </a:t>
+            </a:r>
+            <a:r>
+              <a:rPr lang="en-US" sz="1400" dirty="0">
+                <a:solidFill>
+                  <a:srgbClr val="FFFFFF"/>
+                </a:solidFill>
+              </a:rPr>
+              <a:t>CAMBIAR FILTRO DE A/C</a:t>
+            </a:r>
+            <a:endParaRPr lang="en-US" sz="1400" dirty="0"/>
           </a:p>
         </p:txBody>
       </p:sp>
@@ -2731,6 +2542,14 @@
 <file path=ppt/slides/slide10.xml><?xml version="1.0" encoding="utf-8"?>
 <p:sld xmlns:a="http://schemas.openxmlformats.org/drawingml/2006/main" xmlns:r="http://schemas.openxmlformats.org/officeDocument/2006/relationships" xmlns:p="http://schemas.openxmlformats.org/presentationml/2006/main">
   <p:cSld name="Slide 10">
+    <p:bg>
+      <p:bgPr>
+        <a:solidFill>
+          <a:srgbClr val="616161"/>
+        </a:solidFill>
+        <a:effectLst/>
+      </p:bgPr>
+    </p:bg>
     <p:spTree>
       <p:nvGrpSpPr>
         <p:cNvPr id="1" name=""/>
@@ -2754,7 +2573,7 @@
         <p:spPr>
           <a:xfrm>
             <a:off x="457200" y="457200"/>
-            <a:ext cx="6858000" cy="0"/>
+            <a:ext cx="5829300" cy="0"/>
           </a:xfrm>
           <a:prstGeom prst="rect">
             <a:avLst/>
@@ -2766,18 +2585,26 @@
           <a:bodyPr wrap="square" rtlCol="0" anchor="ctr"/>
           <a:lstStyle/>
           <a:p>
-            <a:pPr algn="l" indent="0" marL="0">
+            <a:pPr marL="0" indent="0" algn="l">
               <a:buNone/>
             </a:pPr>
             <a:r>
-              <a:rPr lang="en-US" sz="2400" dirty="0">
-                <a:solidFill>
-                  <a:srgbClr val="000000"/>
-                </a:solidFill>
-              </a:rPr>
-              <a:t>REPONER CUÑAS</a:t>
-            </a:r>
-            <a:endParaRPr lang="en-US" sz="2400" dirty="0"/>
+              <a:rPr lang="en-US" sz="1400" dirty="0">
+                <a:solidFill>
+                  <a:srgbClr val="F39200"/>
+                </a:solidFill>
+              </a:rPr>
+              <a:t>26. </a:t>
+            </a:r>
+            <a:r>
+              <a:rPr lang="en-US" sz="1400" dirty="0">
+                <a:solidFill>
+                  <a:srgbClr val="FFFFFF"/>
+                </a:solidFill>
+              </a:rPr>
+              <a:t>REPONER BOMBA CENTRIFUGA Y FABRICAR SOPORTE PARA DUCTO CAIDO</a:t>
+            </a:r>
+            <a:endParaRPr lang="en-US" sz="1400" dirty="0"/>
           </a:p>
         </p:txBody>
       </p:sp>
@@ -2789,8 +2616,8 @@
         </p:nvSpPr>
         <p:spPr>
           <a:xfrm>
-            <a:off x="457200" y="2286000"/>
-            <a:ext cx="6858000" cy="0"/>
+            <a:off x="457200" y="5029200"/>
+            <a:ext cx="5829300" cy="0"/>
           </a:xfrm>
           <a:prstGeom prst="rect">
             <a:avLst/>
@@ -2802,18 +2629,26 @@
           <a:bodyPr wrap="square" rtlCol="0" anchor="ctr"/>
           <a:lstStyle/>
           <a:p>
-            <a:pPr algn="l" indent="0" marL="0">
+            <a:pPr marL="0" indent="0" algn="l">
               <a:buNone/>
             </a:pPr>
             <a:r>
-              <a:rPr lang="en-US" sz="2400" dirty="0">
-                <a:solidFill>
-                  <a:srgbClr val="000000"/>
-                </a:solidFill>
-              </a:rPr>
-              <a:t>REPONER 02 PORTACUÑAS RH Y LH</a:t>
-            </a:r>
-            <a:endParaRPr lang="en-US" sz="2400" dirty="0"/>
+              <a:rPr lang="en-US" sz="1400" dirty="0">
+                <a:solidFill>
+                  <a:srgbClr val="F39200"/>
+                </a:solidFill>
+              </a:rPr>
+              <a:t>27. </a:t>
+            </a:r>
+            <a:r>
+              <a:rPr lang="en-US" sz="1400" dirty="0">
+                <a:solidFill>
+                  <a:srgbClr val="FFFFFF"/>
+                </a:solidFill>
+              </a:rPr>
+              <a:t>NORMALIZAR ESTANQUE CON CONTAMINACIÓN EXCESIVA Y LINEAS DE FLUJO TAPADAS</a:t>
+            </a:r>
+            <a:endParaRPr lang="en-US" sz="1400" dirty="0"/>
           </a:p>
         </p:txBody>
       </p:sp>
@@ -2828,6 +2663,14 @@
 <file path=ppt/slides/slide11.xml><?xml version="1.0" encoding="utf-8"?>
 <p:sld xmlns:a="http://schemas.openxmlformats.org/drawingml/2006/main" xmlns:r="http://schemas.openxmlformats.org/officeDocument/2006/relationships" xmlns:p="http://schemas.openxmlformats.org/presentationml/2006/main">
   <p:cSld name="Slide 11">
+    <p:bg>
+      <p:bgPr>
+        <a:solidFill>
+          <a:srgbClr val="616161"/>
+        </a:solidFill>
+        <a:effectLst/>
+      </p:bgPr>
+    </p:bg>
     <p:spTree>
       <p:nvGrpSpPr>
         <p:cNvPr id="1" name=""/>
@@ -2851,7 +2694,7 @@
         <p:spPr>
           <a:xfrm>
             <a:off x="457200" y="457200"/>
-            <a:ext cx="6858000" cy="0"/>
+            <a:ext cx="5829300" cy="0"/>
           </a:xfrm>
           <a:prstGeom prst="rect">
             <a:avLst/>
@@ -2863,18 +2706,26 @@
           <a:bodyPr wrap="square" rtlCol="0" anchor="ctr"/>
           <a:lstStyle/>
           <a:p>
-            <a:pPr algn="l" indent="0" marL="0">
+            <a:pPr marL="0" indent="0" algn="l">
               <a:buNone/>
             </a:pPr>
             <a:r>
-              <a:rPr lang="en-US" sz="2400" dirty="0">
-                <a:solidFill>
-                  <a:srgbClr val="000000"/>
-                </a:solidFill>
-              </a:rPr>
-              <a:t>CAMBIAR ADHESIVOS DE SEGURIDAD</a:t>
-            </a:r>
-            <a:endParaRPr lang="en-US" sz="2400" dirty="0"/>
+              <a:rPr lang="en-US" sz="1400" dirty="0">
+                <a:solidFill>
+                  <a:srgbClr val="F39200"/>
+                </a:solidFill>
+              </a:rPr>
+              <a:t>28. </a:t>
+            </a:r>
+            <a:r>
+              <a:rPr lang="en-US" sz="1400" dirty="0">
+                <a:solidFill>
+                  <a:srgbClr val="FFFFFF"/>
+                </a:solidFill>
+              </a:rPr>
+              <a:t>REPONER CUÑAS</a:t>
+            </a:r>
+            <a:endParaRPr lang="en-US" sz="1400" dirty="0"/>
           </a:p>
         </p:txBody>
       </p:sp>
@@ -2886,8 +2737,8 @@
         </p:nvSpPr>
         <p:spPr>
           <a:xfrm>
-            <a:off x="457200" y="2286000"/>
-            <a:ext cx="6858000" cy="0"/>
+            <a:off x="457200" y="5029200"/>
+            <a:ext cx="5829300" cy="0"/>
           </a:xfrm>
           <a:prstGeom prst="rect">
             <a:avLst/>
@@ -2899,18 +2750,26 @@
           <a:bodyPr wrap="square" rtlCol="0" anchor="ctr"/>
           <a:lstStyle/>
           <a:p>
-            <a:pPr algn="l" indent="0" marL="0">
+            <a:pPr marL="0" indent="0" algn="l">
               <a:buNone/>
             </a:pPr>
             <a:r>
-              <a:rPr lang="en-US" sz="2400" dirty="0">
-                <a:solidFill>
-                  <a:srgbClr val="000000"/>
-                </a:solidFill>
-              </a:rPr>
-              <a:t>REPARAR TAPABARROS LADO CHOFER SUELTO</a:t>
-            </a:r>
-            <a:endParaRPr lang="en-US" sz="2400" dirty="0"/>
+              <a:rPr lang="en-US" sz="1400" dirty="0">
+                <a:solidFill>
+                  <a:srgbClr val="F39200"/>
+                </a:solidFill>
+              </a:rPr>
+              <a:t>29. </a:t>
+            </a:r>
+            <a:r>
+              <a:rPr lang="en-US" sz="1400" dirty="0">
+                <a:solidFill>
+                  <a:srgbClr val="FFFFFF"/>
+                </a:solidFill>
+              </a:rPr>
+              <a:t>REPONER 02 PORTACUÑAS RH Y LH</a:t>
+            </a:r>
+            <a:endParaRPr lang="en-US" sz="1400" dirty="0"/>
           </a:p>
         </p:txBody>
       </p:sp>
@@ -2925,6 +2784,14 @@
 <file path=ppt/slides/slide12.xml><?xml version="1.0" encoding="utf-8"?>
 <p:sld xmlns:a="http://schemas.openxmlformats.org/drawingml/2006/main" xmlns:r="http://schemas.openxmlformats.org/officeDocument/2006/relationships" xmlns:p="http://schemas.openxmlformats.org/presentationml/2006/main">
   <p:cSld name="Slide 12">
+    <p:bg>
+      <p:bgPr>
+        <a:solidFill>
+          <a:srgbClr val="616161"/>
+        </a:solidFill>
+        <a:effectLst/>
+      </p:bgPr>
+    </p:bg>
     <p:spTree>
       <p:nvGrpSpPr>
         <p:cNvPr id="1" name=""/>
@@ -2948,7 +2815,7 @@
         <p:spPr>
           <a:xfrm>
             <a:off x="457200" y="457200"/>
-            <a:ext cx="6858000" cy="0"/>
+            <a:ext cx="5829300" cy="0"/>
           </a:xfrm>
           <a:prstGeom prst="rect">
             <a:avLst/>
@@ -2960,18 +2827,26 @@
           <a:bodyPr wrap="square" rtlCol="0" anchor="ctr"/>
           <a:lstStyle/>
           <a:p>
-            <a:pPr algn="l" indent="0" marL="0">
+            <a:pPr marL="0" indent="0" algn="l">
               <a:buNone/>
             </a:pPr>
             <a:r>
-              <a:rPr lang="en-US" sz="2400" dirty="0">
-                <a:solidFill>
-                  <a:srgbClr val="000000"/>
-                </a:solidFill>
-              </a:rPr>
-              <a:t>FABRICAR PROTECCIÓN PARTES MOVIL RH</a:t>
-            </a:r>
-            <a:endParaRPr lang="en-US" sz="2400" dirty="0"/>
+              <a:rPr lang="en-US" sz="1400" dirty="0">
+                <a:solidFill>
+                  <a:srgbClr val="F39200"/>
+                </a:solidFill>
+              </a:rPr>
+              <a:t>30. </a:t>
+            </a:r>
+            <a:r>
+              <a:rPr lang="en-US" sz="1400" dirty="0">
+                <a:solidFill>
+                  <a:srgbClr val="FFFFFF"/>
+                </a:solidFill>
+              </a:rPr>
+              <a:t>CAMBIAR ADHESIVOS DE SEGURIDAD</a:t>
+            </a:r>
+            <a:endParaRPr lang="en-US" sz="1400" dirty="0"/>
           </a:p>
         </p:txBody>
       </p:sp>
@@ -2983,8 +2858,8 @@
         </p:nvSpPr>
         <p:spPr>
           <a:xfrm>
-            <a:off x="457200" y="2286000"/>
-            <a:ext cx="6858000" cy="0"/>
+            <a:off x="457200" y="5029200"/>
+            <a:ext cx="5829300" cy="0"/>
           </a:xfrm>
           <a:prstGeom prst="rect">
             <a:avLst/>
@@ -2996,18 +2871,26 @@
           <a:bodyPr wrap="square" rtlCol="0" anchor="ctr"/>
           <a:lstStyle/>
           <a:p>
-            <a:pPr algn="l" indent="0" marL="0">
+            <a:pPr marL="0" indent="0" algn="l">
               <a:buNone/>
             </a:pPr>
             <a:r>
-              <a:rPr lang="en-US" sz="2400" dirty="0">
-                <a:solidFill>
-                  <a:srgbClr val="000000"/>
-                </a:solidFill>
-              </a:rPr>
-              <a:t>CAMBIO DE REFRIGERANTE (DRENAJE Y LLENADO)</a:t>
-            </a:r>
-            <a:endParaRPr lang="en-US" sz="2400" dirty="0"/>
+              <a:rPr lang="en-US" sz="1400" dirty="0">
+                <a:solidFill>
+                  <a:srgbClr val="F39200"/>
+                </a:solidFill>
+              </a:rPr>
+              <a:t>31. </a:t>
+            </a:r>
+            <a:r>
+              <a:rPr lang="en-US" sz="1400" dirty="0">
+                <a:solidFill>
+                  <a:srgbClr val="FFFFFF"/>
+                </a:solidFill>
+              </a:rPr>
+              <a:t>REPARAR TAPABARROS LADO CHOFER SUELTO</a:t>
+            </a:r>
+            <a:endParaRPr lang="en-US" sz="1400" dirty="0"/>
           </a:p>
         </p:txBody>
       </p:sp>
@@ -3022,6 +2905,14 @@
 <file path=ppt/slides/slide13.xml><?xml version="1.0" encoding="utf-8"?>
 <p:sld xmlns:a="http://schemas.openxmlformats.org/drawingml/2006/main" xmlns:r="http://schemas.openxmlformats.org/officeDocument/2006/relationships" xmlns:p="http://schemas.openxmlformats.org/presentationml/2006/main">
   <p:cSld name="Slide 13">
+    <p:bg>
+      <p:bgPr>
+        <a:solidFill>
+          <a:srgbClr val="616161"/>
+        </a:solidFill>
+        <a:effectLst/>
+      </p:bgPr>
+    </p:bg>
     <p:spTree>
       <p:nvGrpSpPr>
         <p:cNvPr id="1" name=""/>
@@ -3045,7 +2936,7 @@
         <p:spPr>
           <a:xfrm>
             <a:off x="457200" y="457200"/>
-            <a:ext cx="6858000" cy="0"/>
+            <a:ext cx="5829300" cy="0"/>
           </a:xfrm>
           <a:prstGeom prst="rect">
             <a:avLst/>
@@ -3057,18 +2948,26 @@
           <a:bodyPr wrap="square" rtlCol="0" anchor="ctr"/>
           <a:lstStyle/>
           <a:p>
-            <a:pPr algn="l" indent="0" marL="0">
+            <a:pPr marL="0" indent="0" algn="l">
               <a:buNone/>
             </a:pPr>
             <a:r>
-              <a:rPr lang="en-US" sz="2400" dirty="0">
-                <a:solidFill>
-                  <a:srgbClr val="000000"/>
-                </a:solidFill>
-              </a:rPr>
-              <a:t>REPONER CODO 90° DE ESCAPE Y ABRAZADERA</a:t>
-            </a:r>
-            <a:endParaRPr lang="en-US" sz="2400" dirty="0"/>
+              <a:rPr lang="en-US" sz="1400" dirty="0">
+                <a:solidFill>
+                  <a:srgbClr val="F39200"/>
+                </a:solidFill>
+              </a:rPr>
+              <a:t>32. </a:t>
+            </a:r>
+            <a:r>
+              <a:rPr lang="en-US" sz="1400" dirty="0">
+                <a:solidFill>
+                  <a:srgbClr val="FFFFFF"/>
+                </a:solidFill>
+              </a:rPr>
+              <a:t>FABRICAR PROTECCIÓN PARTES MOVIL RH</a:t>
+            </a:r>
+            <a:endParaRPr lang="en-US" sz="1400" dirty="0"/>
           </a:p>
         </p:txBody>
       </p:sp>
@@ -3080,8 +2979,8 @@
         </p:nvSpPr>
         <p:spPr>
           <a:xfrm>
-            <a:off x="457200" y="2286000"/>
-            <a:ext cx="6858000" cy="0"/>
+            <a:off x="457200" y="5029200"/>
+            <a:ext cx="5829300" cy="0"/>
           </a:xfrm>
           <a:prstGeom prst="rect">
             <a:avLst/>
@@ -3093,18 +2992,26 @@
           <a:bodyPr wrap="square" rtlCol="0" anchor="ctr"/>
           <a:lstStyle/>
           <a:p>
-            <a:pPr algn="l" indent="0" marL="0">
+            <a:pPr marL="0" indent="0" algn="l">
               <a:buNone/>
             </a:pPr>
             <a:r>
-              <a:rPr lang="en-US" sz="2400" dirty="0">
-                <a:solidFill>
-                  <a:srgbClr val="000000"/>
-                </a:solidFill>
-              </a:rPr>
-              <a:t>REPONER LLANTA Y NEUMATICO DE REPUESTO</a:t>
-            </a:r>
-            <a:endParaRPr lang="en-US" sz="2400" dirty="0"/>
+              <a:rPr lang="en-US" sz="1400" dirty="0">
+                <a:solidFill>
+                  <a:srgbClr val="F39200"/>
+                </a:solidFill>
+              </a:rPr>
+              <a:t>33. </a:t>
+            </a:r>
+            <a:r>
+              <a:rPr lang="en-US" sz="1400" dirty="0">
+                <a:solidFill>
+                  <a:srgbClr val="FFFFFF"/>
+                </a:solidFill>
+              </a:rPr>
+              <a:t>CAMBIO DE REFRIGERANTE (DRENAJE Y LLENADO)</a:t>
+            </a:r>
+            <a:endParaRPr lang="en-US" sz="1400" dirty="0"/>
           </a:p>
         </p:txBody>
       </p:sp>
@@ -3119,6 +3026,14 @@
 <file path=ppt/slides/slide14.xml><?xml version="1.0" encoding="utf-8"?>
 <p:sld xmlns:a="http://schemas.openxmlformats.org/drawingml/2006/main" xmlns:r="http://schemas.openxmlformats.org/officeDocument/2006/relationships" xmlns:p="http://schemas.openxmlformats.org/presentationml/2006/main">
   <p:cSld name="Slide 14">
+    <p:bg>
+      <p:bgPr>
+        <a:solidFill>
+          <a:srgbClr val="616161"/>
+        </a:solidFill>
+        <a:effectLst/>
+      </p:bgPr>
+    </p:bg>
     <p:spTree>
       <p:nvGrpSpPr>
         <p:cNvPr id="1" name=""/>
@@ -3142,7 +3057,7 @@
         <p:spPr>
           <a:xfrm>
             <a:off x="457200" y="457200"/>
-            <a:ext cx="6858000" cy="0"/>
+            <a:ext cx="5829300" cy="0"/>
           </a:xfrm>
           <a:prstGeom prst="rect">
             <a:avLst/>
@@ -3154,18 +3069,26 @@
           <a:bodyPr wrap="square" rtlCol="0" anchor="ctr"/>
           <a:lstStyle/>
           <a:p>
-            <a:pPr algn="l" indent="0" marL="0">
+            <a:pPr marL="0" indent="0" algn="l">
               <a:buNone/>
             </a:pPr>
             <a:r>
-              <a:rPr lang="en-US" sz="2400" dirty="0">
-                <a:solidFill>
-                  <a:srgbClr val="000000"/>
-                </a:solidFill>
-              </a:rPr>
-              <a:t>RUTEAR CABLES DE LUCES TRASERAS</a:t>
-            </a:r>
-            <a:endParaRPr lang="en-US" sz="2400" dirty="0"/>
+              <a:rPr lang="en-US" sz="1400" dirty="0">
+                <a:solidFill>
+                  <a:srgbClr val="F39200"/>
+                </a:solidFill>
+              </a:rPr>
+              <a:t>34. </a:t>
+            </a:r>
+            <a:r>
+              <a:rPr lang="en-US" sz="1400" dirty="0">
+                <a:solidFill>
+                  <a:srgbClr val="FFFFFF"/>
+                </a:solidFill>
+              </a:rPr>
+              <a:t>REPONER CODO 90° DE ESCAPE Y ABRAZADERA</a:t>
+            </a:r>
+            <a:endParaRPr lang="en-US" sz="1400" dirty="0"/>
           </a:p>
         </p:txBody>
       </p:sp>
@@ -3177,8 +3100,8 @@
         </p:nvSpPr>
         <p:spPr>
           <a:xfrm>
-            <a:off x="457200" y="2286000"/>
-            <a:ext cx="6858000" cy="0"/>
+            <a:off x="457200" y="5029200"/>
+            <a:ext cx="5829300" cy="0"/>
           </a:xfrm>
           <a:prstGeom prst="rect">
             <a:avLst/>
@@ -3190,18 +3113,26 @@
           <a:bodyPr wrap="square" rtlCol="0" anchor="ctr"/>
           <a:lstStyle/>
           <a:p>
-            <a:pPr algn="l" indent="0" marL="0">
+            <a:pPr marL="0" indent="0" algn="l">
               <a:buNone/>
             </a:pPr>
             <a:r>
-              <a:rPr lang="en-US" sz="2400" dirty="0">
-                <a:solidFill>
-                  <a:srgbClr val="000000"/>
-                </a:solidFill>
-              </a:rPr>
-              <a:t>REPONER PERTIGA (EQUIPO SIN PERTIGA)</a:t>
-            </a:r>
-            <a:endParaRPr lang="en-US" sz="2400" dirty="0"/>
+              <a:rPr lang="en-US" sz="1400" dirty="0">
+                <a:solidFill>
+                  <a:srgbClr val="F39200"/>
+                </a:solidFill>
+              </a:rPr>
+              <a:t>35. </a:t>
+            </a:r>
+            <a:r>
+              <a:rPr lang="en-US" sz="1400" dirty="0">
+                <a:solidFill>
+                  <a:srgbClr val="FFFFFF"/>
+                </a:solidFill>
+              </a:rPr>
+              <a:t>REPONER LLANTA Y NEUMATICO DE REPUESTO</a:t>
+            </a:r>
+            <a:endParaRPr lang="en-US" sz="1400" dirty="0"/>
           </a:p>
         </p:txBody>
       </p:sp>
@@ -3216,6 +3147,14 @@
 <file path=ppt/slides/slide15.xml><?xml version="1.0" encoding="utf-8"?>
 <p:sld xmlns:a="http://schemas.openxmlformats.org/drawingml/2006/main" xmlns:r="http://schemas.openxmlformats.org/officeDocument/2006/relationships" xmlns:p="http://schemas.openxmlformats.org/presentationml/2006/main">
   <p:cSld name="Slide 15">
+    <p:bg>
+      <p:bgPr>
+        <a:solidFill>
+          <a:srgbClr val="616161"/>
+        </a:solidFill>
+        <a:effectLst/>
+      </p:bgPr>
+    </p:bg>
     <p:spTree>
       <p:nvGrpSpPr>
         <p:cNvPr id="1" name=""/>
@@ -3239,7 +3178,7 @@
         <p:spPr>
           <a:xfrm>
             <a:off x="457200" y="457200"/>
-            <a:ext cx="6858000" cy="0"/>
+            <a:ext cx="5829300" cy="0"/>
           </a:xfrm>
           <a:prstGeom prst="rect">
             <a:avLst/>
@@ -3251,18 +3190,26 @@
           <a:bodyPr wrap="square" rtlCol="0" anchor="ctr"/>
           <a:lstStyle/>
           <a:p>
-            <a:pPr algn="l" indent="0" marL="0">
+            <a:pPr marL="0" indent="0" algn="l">
               <a:buNone/>
             </a:pPr>
             <a:r>
-              <a:rPr lang="en-US" sz="2400" dirty="0">
-                <a:solidFill>
-                  <a:srgbClr val="000000"/>
-                </a:solidFill>
-              </a:rPr>
-              <a:t>CAMBIAR TROCHAS ESTANQUE RH MALA</a:t>
-            </a:r>
-            <a:endParaRPr lang="en-US" sz="2400" dirty="0"/>
+              <a:rPr lang="en-US" sz="1400" dirty="0">
+                <a:solidFill>
+                  <a:srgbClr val="F39200"/>
+                </a:solidFill>
+              </a:rPr>
+              <a:t>36. </a:t>
+            </a:r>
+            <a:r>
+              <a:rPr lang="en-US" sz="1400" dirty="0">
+                <a:solidFill>
+                  <a:srgbClr val="FFFFFF"/>
+                </a:solidFill>
+              </a:rPr>
+              <a:t>RUTEAR CABLES DE LUCES TRASERAS</a:t>
+            </a:r>
+            <a:endParaRPr lang="en-US" sz="1400" dirty="0"/>
           </a:p>
         </p:txBody>
       </p:sp>
@@ -3274,8 +3221,8 @@
         </p:nvSpPr>
         <p:spPr>
           <a:xfrm>
-            <a:off x="457200" y="2286000"/>
-            <a:ext cx="6858000" cy="0"/>
+            <a:off x="457200" y="5029200"/>
+            <a:ext cx="5829300" cy="0"/>
           </a:xfrm>
           <a:prstGeom prst="rect">
             <a:avLst/>
@@ -3287,18 +3234,26 @@
           <a:bodyPr wrap="square" rtlCol="0" anchor="ctr"/>
           <a:lstStyle/>
           <a:p>
-            <a:pPr algn="l" indent="0" marL="0">
+            <a:pPr marL="0" indent="0" algn="l">
               <a:buNone/>
             </a:pPr>
             <a:r>
-              <a:rPr lang="en-US" sz="2400" dirty="0">
-                <a:solidFill>
-                  <a:srgbClr val="000000"/>
-                </a:solidFill>
-              </a:rPr>
-              <a:t>NORMALIZAR SISTEMA ELÉCTRICO DE ESTANQUE</a:t>
-            </a:r>
-            <a:endParaRPr lang="en-US" sz="2400" dirty="0"/>
+              <a:rPr lang="en-US" sz="1400" dirty="0">
+                <a:solidFill>
+                  <a:srgbClr val="F39200"/>
+                </a:solidFill>
+              </a:rPr>
+              <a:t>37. </a:t>
+            </a:r>
+            <a:r>
+              <a:rPr lang="en-US" sz="1400" dirty="0">
+                <a:solidFill>
+                  <a:srgbClr val="FFFFFF"/>
+                </a:solidFill>
+              </a:rPr>
+              <a:t>REPONER PERTIGA (EQUIPO SIN PERTIGA)</a:t>
+            </a:r>
+            <a:endParaRPr lang="en-US" sz="1400" dirty="0"/>
           </a:p>
         </p:txBody>
       </p:sp>
@@ -3313,6 +3268,14 @@
 <file path=ppt/slides/slide16.xml><?xml version="1.0" encoding="utf-8"?>
 <p:sld xmlns:a="http://schemas.openxmlformats.org/drawingml/2006/main" xmlns:r="http://schemas.openxmlformats.org/officeDocument/2006/relationships" xmlns:p="http://schemas.openxmlformats.org/presentationml/2006/main">
   <p:cSld name="Slide 16">
+    <p:bg>
+      <p:bgPr>
+        <a:solidFill>
+          <a:srgbClr val="616161"/>
+        </a:solidFill>
+        <a:effectLst/>
+      </p:bgPr>
+    </p:bg>
     <p:spTree>
       <p:nvGrpSpPr>
         <p:cNvPr id="1" name=""/>
@@ -3336,7 +3299,7 @@
         <p:spPr>
           <a:xfrm>
             <a:off x="457200" y="457200"/>
-            <a:ext cx="6858000" cy="0"/>
+            <a:ext cx="5829300" cy="0"/>
           </a:xfrm>
           <a:prstGeom prst="rect">
             <a:avLst/>
@@ -3348,18 +3311,26 @@
           <a:bodyPr wrap="square" rtlCol="0" anchor="ctr"/>
           <a:lstStyle/>
           <a:p>
-            <a:pPr algn="l" indent="0" marL="0">
+            <a:pPr marL="0" indent="0" algn="l">
               <a:buNone/>
             </a:pPr>
             <a:r>
-              <a:rPr lang="en-US" sz="2400" dirty="0">
-                <a:solidFill>
-                  <a:srgbClr val="000000"/>
-                </a:solidFill>
-              </a:rPr>
-              <a:t>CAMBIAR PARADAS DE EMERGENCIAS MALAS RH Y LH</a:t>
-            </a:r>
-            <a:endParaRPr lang="en-US" sz="2400" dirty="0"/>
+              <a:rPr lang="en-US" sz="1400" dirty="0">
+                <a:solidFill>
+                  <a:srgbClr val="F39200"/>
+                </a:solidFill>
+              </a:rPr>
+              <a:t>38. </a:t>
+            </a:r>
+            <a:r>
+              <a:rPr lang="en-US" sz="1400" dirty="0">
+                <a:solidFill>
+                  <a:srgbClr val="FFFFFF"/>
+                </a:solidFill>
+              </a:rPr>
+              <a:t>CAMBIAR TROCHAS ESTANQUE RH MALA</a:t>
+            </a:r>
+            <a:endParaRPr lang="en-US" sz="1400" dirty="0"/>
           </a:p>
         </p:txBody>
       </p:sp>
@@ -3371,8 +3342,8 @@
         </p:nvSpPr>
         <p:spPr>
           <a:xfrm>
-            <a:off x="457200" y="2286000"/>
-            <a:ext cx="6858000" cy="0"/>
+            <a:off x="457200" y="5029200"/>
+            <a:ext cx="5829300" cy="0"/>
           </a:xfrm>
           <a:prstGeom prst="rect">
             <a:avLst/>
@@ -3384,18 +3355,26 @@
           <a:bodyPr wrap="square" rtlCol="0" anchor="ctr"/>
           <a:lstStyle/>
           <a:p>
-            <a:pPr algn="l" indent="0" marL="0">
+            <a:pPr marL="0" indent="0" algn="l">
               <a:buNone/>
             </a:pPr>
             <a:r>
-              <a:rPr lang="en-US" sz="2400" dirty="0">
-                <a:solidFill>
-                  <a:srgbClr val="000000"/>
-                </a:solidFill>
-              </a:rPr>
-              <a:t>RELLENAR HIDRÁULICO FALTANTE</a:t>
-            </a:r>
-            <a:endParaRPr lang="en-US" sz="2400" dirty="0"/>
+              <a:rPr lang="en-US" sz="1400" dirty="0">
+                <a:solidFill>
+                  <a:srgbClr val="F39200"/>
+                </a:solidFill>
+              </a:rPr>
+              <a:t>39. </a:t>
+            </a:r>
+            <a:r>
+              <a:rPr lang="en-US" sz="1400" dirty="0">
+                <a:solidFill>
+                  <a:srgbClr val="FFFFFF"/>
+                </a:solidFill>
+              </a:rPr>
+              <a:t>NORMALIZAR SISTEMA ELÉCTRICO DE ESTANQUE</a:t>
+            </a:r>
+            <a:endParaRPr lang="en-US" sz="1400" dirty="0"/>
           </a:p>
         </p:txBody>
       </p:sp>
@@ -3410,6 +3389,14 @@
 <file path=ppt/slides/slide17.xml><?xml version="1.0" encoding="utf-8"?>
 <p:sld xmlns:a="http://schemas.openxmlformats.org/drawingml/2006/main" xmlns:r="http://schemas.openxmlformats.org/officeDocument/2006/relationships" xmlns:p="http://schemas.openxmlformats.org/presentationml/2006/main">
   <p:cSld name="Slide 17">
+    <p:bg>
+      <p:bgPr>
+        <a:solidFill>
+          <a:srgbClr val="616161"/>
+        </a:solidFill>
+        <a:effectLst/>
+      </p:bgPr>
+    </p:bg>
     <p:spTree>
       <p:nvGrpSpPr>
         <p:cNvPr id="1" name=""/>
@@ -3433,7 +3420,7 @@
         <p:spPr>
           <a:xfrm>
             <a:off x="457200" y="457200"/>
-            <a:ext cx="6858000" cy="0"/>
+            <a:ext cx="5829300" cy="0"/>
           </a:xfrm>
           <a:prstGeom prst="rect">
             <a:avLst/>
@@ -3445,18 +3432,26 @@
           <a:bodyPr wrap="square" rtlCol="0" anchor="ctr"/>
           <a:lstStyle/>
           <a:p>
-            <a:pPr algn="l" indent="0" marL="0">
+            <a:pPr marL="0" indent="0" algn="l">
               <a:buNone/>
             </a:pPr>
             <a:r>
-              <a:rPr lang="en-US" sz="2400" dirty="0">
-                <a:solidFill>
-                  <a:srgbClr val="000000"/>
-                </a:solidFill>
-              </a:rPr>
-              <a:t>CAMBIO DE FILTRO RESPIRADERO HIDRÁULICO</a:t>
-            </a:r>
-            <a:endParaRPr lang="en-US" sz="2400" dirty="0"/>
+              <a:rPr lang="en-US" sz="1400" dirty="0">
+                <a:solidFill>
+                  <a:srgbClr val="F39200"/>
+                </a:solidFill>
+              </a:rPr>
+              <a:t>40. </a:t>
+            </a:r>
+            <a:r>
+              <a:rPr lang="en-US" sz="1400" dirty="0">
+                <a:solidFill>
+                  <a:srgbClr val="FFFFFF"/>
+                </a:solidFill>
+              </a:rPr>
+              <a:t>CAMBIAR PARADAS DE EMERGENCIAS MALAS RH Y LH</a:t>
+            </a:r>
+            <a:endParaRPr lang="en-US" sz="1400" dirty="0"/>
           </a:p>
         </p:txBody>
       </p:sp>
@@ -3468,8 +3463,8 @@
         </p:nvSpPr>
         <p:spPr>
           <a:xfrm>
-            <a:off x="457200" y="2286000"/>
-            <a:ext cx="6858000" cy="0"/>
+            <a:off x="457200" y="5029200"/>
+            <a:ext cx="5829300" cy="0"/>
           </a:xfrm>
           <a:prstGeom prst="rect">
             <a:avLst/>
@@ -3481,18 +3476,26 @@
           <a:bodyPr wrap="square" rtlCol="0" anchor="ctr"/>
           <a:lstStyle/>
           <a:p>
-            <a:pPr algn="l" indent="0" marL="0">
+            <a:pPr marL="0" indent="0" algn="l">
               <a:buNone/>
             </a:pPr>
             <a:r>
-              <a:rPr lang="en-US" sz="2400" dirty="0">
-                <a:solidFill>
-                  <a:srgbClr val="000000"/>
-                </a:solidFill>
-              </a:rPr>
-              <a:t>REPOSICIONAR EXTINTOR 10KG HORIZONTAL A VERTICAL</a:t>
-            </a:r>
-            <a:endParaRPr lang="en-US" sz="2400" dirty="0"/>
+              <a:rPr lang="en-US" sz="1400" dirty="0">
+                <a:solidFill>
+                  <a:srgbClr val="F39200"/>
+                </a:solidFill>
+              </a:rPr>
+              <a:t>41. </a:t>
+            </a:r>
+            <a:r>
+              <a:rPr lang="en-US" sz="1400" dirty="0">
+                <a:solidFill>
+                  <a:srgbClr val="FFFFFF"/>
+                </a:solidFill>
+              </a:rPr>
+              <a:t>RELLENAR HIDRÁULICO FALTANTE</a:t>
+            </a:r>
+            <a:endParaRPr lang="en-US" sz="1400" dirty="0"/>
           </a:p>
         </p:txBody>
       </p:sp>
@@ -3507,6 +3510,14 @@
 <file path=ppt/slides/slide18.xml><?xml version="1.0" encoding="utf-8"?>
 <p:sld xmlns:a="http://schemas.openxmlformats.org/drawingml/2006/main" xmlns:r="http://schemas.openxmlformats.org/officeDocument/2006/relationships" xmlns:p="http://schemas.openxmlformats.org/presentationml/2006/main">
   <p:cSld name="Slide 18">
+    <p:bg>
+      <p:bgPr>
+        <a:solidFill>
+          <a:srgbClr val="616161"/>
+        </a:solidFill>
+        <a:effectLst/>
+      </p:bgPr>
+    </p:bg>
     <p:spTree>
       <p:nvGrpSpPr>
         <p:cNvPr id="1" name=""/>
@@ -3530,7 +3541,7 @@
         <p:spPr>
           <a:xfrm>
             <a:off x="457200" y="457200"/>
-            <a:ext cx="6858000" cy="0"/>
+            <a:ext cx="5829300" cy="0"/>
           </a:xfrm>
           <a:prstGeom prst="rect">
             <a:avLst/>
@@ -3542,18 +3553,26 @@
           <a:bodyPr wrap="square" rtlCol="0" anchor="ctr"/>
           <a:lstStyle/>
           <a:p>
-            <a:pPr algn="l" indent="0" marL="0">
+            <a:pPr marL="0" indent="0" algn="l">
               <a:buNone/>
             </a:pPr>
             <a:r>
-              <a:rPr lang="en-US" sz="2400" dirty="0">
-                <a:solidFill>
-                  <a:srgbClr val="000000"/>
-                </a:solidFill>
-              </a:rPr>
-              <a:t>IMPLEMENTAR EXTINTOR INTERIOR DE CABINA</a:t>
-            </a:r>
-            <a:endParaRPr lang="en-US" sz="2400" dirty="0"/>
+              <a:rPr lang="en-US" sz="1400" dirty="0">
+                <a:solidFill>
+                  <a:srgbClr val="F39200"/>
+                </a:solidFill>
+              </a:rPr>
+              <a:t>42. </a:t>
+            </a:r>
+            <a:r>
+              <a:rPr lang="en-US" sz="1400" dirty="0">
+                <a:solidFill>
+                  <a:srgbClr val="FFFFFF"/>
+                </a:solidFill>
+              </a:rPr>
+              <a:t>CAMBIO DE FILTRO RESPIRADERO HIDRÁULICO</a:t>
+            </a:r>
+            <a:endParaRPr lang="en-US" sz="1400" dirty="0"/>
           </a:p>
         </p:txBody>
       </p:sp>
@@ -3565,8 +3584,8 @@
         </p:nvSpPr>
         <p:spPr>
           <a:xfrm>
-            <a:off x="457200" y="2286000"/>
-            <a:ext cx="6858000" cy="0"/>
+            <a:off x="457200" y="5029200"/>
+            <a:ext cx="5829300" cy="0"/>
           </a:xfrm>
           <a:prstGeom prst="rect">
             <a:avLst/>
@@ -3578,18 +3597,26 @@
           <a:bodyPr wrap="square" rtlCol="0" anchor="ctr"/>
           <a:lstStyle/>
           <a:p>
-            <a:pPr algn="l" indent="0" marL="0">
+            <a:pPr marL="0" indent="0" algn="l">
               <a:buNone/>
             </a:pPr>
             <a:r>
-              <a:rPr lang="en-US" sz="2400" dirty="0">
-                <a:solidFill>
-                  <a:srgbClr val="000000"/>
-                </a:solidFill>
-              </a:rPr>
-              <a:t>PULIDO FOCO DELANTERO RH</a:t>
-            </a:r>
-            <a:endParaRPr lang="en-US" sz="2400" dirty="0"/>
+              <a:rPr lang="en-US" sz="1400" dirty="0">
+                <a:solidFill>
+                  <a:srgbClr val="F39200"/>
+                </a:solidFill>
+              </a:rPr>
+              <a:t>43. </a:t>
+            </a:r>
+            <a:r>
+              <a:rPr lang="en-US" sz="1400" dirty="0">
+                <a:solidFill>
+                  <a:srgbClr val="FFFFFF"/>
+                </a:solidFill>
+              </a:rPr>
+              <a:t>REPOSICIONAR EXTINTOR 10KG HORIZONTAL A VERTICAL</a:t>
+            </a:r>
+            <a:endParaRPr lang="en-US" sz="1400" dirty="0"/>
           </a:p>
         </p:txBody>
       </p:sp>
@@ -3604,6 +3631,14 @@
 <file path=ppt/slides/slide19.xml><?xml version="1.0" encoding="utf-8"?>
 <p:sld xmlns:a="http://schemas.openxmlformats.org/drawingml/2006/main" xmlns:r="http://schemas.openxmlformats.org/officeDocument/2006/relationships" xmlns:p="http://schemas.openxmlformats.org/presentationml/2006/main">
   <p:cSld name="Slide 19">
+    <p:bg>
+      <p:bgPr>
+        <a:solidFill>
+          <a:srgbClr val="616161"/>
+        </a:solidFill>
+        <a:effectLst/>
+      </p:bgPr>
+    </p:bg>
     <p:spTree>
       <p:nvGrpSpPr>
         <p:cNvPr id="1" name=""/>
@@ -3627,7 +3662,7 @@
         <p:spPr>
           <a:xfrm>
             <a:off x="457200" y="457200"/>
-            <a:ext cx="6858000" cy="0"/>
+            <a:ext cx="5829300" cy="0"/>
           </a:xfrm>
           <a:prstGeom prst="rect">
             <a:avLst/>
@@ -3639,18 +3674,26 @@
           <a:bodyPr wrap="square" rtlCol="0" anchor="ctr"/>
           <a:lstStyle/>
           <a:p>
-            <a:pPr algn="l" indent="0" marL="0">
+            <a:pPr marL="0" indent="0" algn="l">
               <a:buNone/>
             </a:pPr>
             <a:r>
-              <a:rPr lang="en-US" sz="2400" dirty="0">
-                <a:solidFill>
-                  <a:srgbClr val="000000"/>
-                </a:solidFill>
-              </a:rPr>
-              <a:t>LIMPIEZA Y PINTURA ANTICORROSIVA SECTOR INTERIOR TRASERO DE ESTANQUE</a:t>
-            </a:r>
-            <a:endParaRPr lang="en-US" sz="2400" dirty="0"/>
+              <a:rPr lang="en-US" sz="1400" dirty="0">
+                <a:solidFill>
+                  <a:srgbClr val="F39200"/>
+                </a:solidFill>
+              </a:rPr>
+              <a:t>44. </a:t>
+            </a:r>
+            <a:r>
+              <a:rPr lang="en-US" sz="1400" dirty="0">
+                <a:solidFill>
+                  <a:srgbClr val="FFFFFF"/>
+                </a:solidFill>
+              </a:rPr>
+              <a:t>IMPLEMENTAR EXTINTOR INTERIOR DE CABINA</a:t>
+            </a:r>
+            <a:endParaRPr lang="en-US" sz="1400" dirty="0"/>
           </a:p>
         </p:txBody>
       </p:sp>
@@ -3662,8 +3705,8 @@
         </p:nvSpPr>
         <p:spPr>
           <a:xfrm>
-            <a:off x="457200" y="2286000"/>
-            <a:ext cx="6858000" cy="0"/>
+            <a:off x="457200" y="5029200"/>
+            <a:ext cx="5829300" cy="0"/>
           </a:xfrm>
           <a:prstGeom prst="rect">
             <a:avLst/>
@@ -3675,18 +3718,26 @@
           <a:bodyPr wrap="square" rtlCol="0" anchor="ctr"/>
           <a:lstStyle/>
           <a:p>
-            <a:pPr algn="l" indent="0" marL="0">
+            <a:pPr marL="0" indent="0" algn="l">
               <a:buNone/>
             </a:pPr>
             <a:r>
-              <a:rPr lang="en-US" sz="2400" dirty="0">
-                <a:solidFill>
-                  <a:srgbClr val="000000"/>
-                </a:solidFill>
-              </a:rPr>
-              <a:t>NORMALIZACIÓN DE SISTEMA DE REGADIO</a:t>
-            </a:r>
-            <a:endParaRPr lang="en-US" sz="2400" dirty="0"/>
+              <a:rPr lang="en-US" sz="1400" dirty="0">
+                <a:solidFill>
+                  <a:srgbClr val="F39200"/>
+                </a:solidFill>
+              </a:rPr>
+              <a:t>45. </a:t>
+            </a:r>
+            <a:r>
+              <a:rPr lang="en-US" sz="1400" dirty="0">
+                <a:solidFill>
+                  <a:srgbClr val="FFFFFF"/>
+                </a:solidFill>
+              </a:rPr>
+              <a:t>PULIDO FOCO DELANTERO RH</a:t>
+            </a:r>
+            <a:endParaRPr lang="en-US" sz="1400" dirty="0"/>
           </a:p>
         </p:txBody>
       </p:sp>
@@ -3701,6 +3752,14 @@
 <file path=ppt/slides/slide2.xml><?xml version="1.0" encoding="utf-8"?>
 <p:sld xmlns:a="http://schemas.openxmlformats.org/drawingml/2006/main" xmlns:r="http://schemas.openxmlformats.org/officeDocument/2006/relationships" xmlns:p="http://schemas.openxmlformats.org/presentationml/2006/main">
   <p:cSld name="Slide 2">
+    <p:bg>
+      <p:bgPr>
+        <a:solidFill>
+          <a:srgbClr val="616161"/>
+        </a:solidFill>
+        <a:effectLst/>
+      </p:bgPr>
+    </p:bg>
     <p:spTree>
       <p:nvGrpSpPr>
         <p:cNvPr id="1" name=""/>
@@ -3724,7 +3783,7 @@
         <p:spPr>
           <a:xfrm>
             <a:off x="457200" y="457200"/>
-            <a:ext cx="6858000" cy="0"/>
+            <a:ext cx="5829300" cy="0"/>
           </a:xfrm>
           <a:prstGeom prst="rect">
             <a:avLst/>
@@ -3736,18 +3795,26 @@
           <a:bodyPr wrap="square" rtlCol="0" anchor="ctr"/>
           <a:lstStyle/>
           <a:p>
-            <a:pPr algn="l" indent="0" marL="0">
+            <a:pPr marL="0" indent="0" algn="l">
               <a:buNone/>
             </a:pPr>
             <a:r>
-              <a:rPr lang="en-US" sz="2400" dirty="0">
-                <a:solidFill>
-                  <a:srgbClr val="000000"/>
-                </a:solidFill>
-              </a:rPr>
-              <a:t>CAMBIAR PLUMILLAS EN MAL ESTADO</a:t>
-            </a:r>
-            <a:endParaRPr lang="en-US" sz="2400" dirty="0"/>
+              <a:rPr lang="en-US" sz="1400" dirty="0">
+                <a:solidFill>
+                  <a:srgbClr val="F39200"/>
+                </a:solidFill>
+              </a:rPr>
+              <a:t>10. </a:t>
+            </a:r>
+            <a:r>
+              <a:rPr lang="en-US" sz="1400" dirty="0">
+                <a:solidFill>
+                  <a:srgbClr val="FFFFFF"/>
+                </a:solidFill>
+              </a:rPr>
+              <a:t>REPONER MANILLA INTERIORES APERTURA DE PUERTA RH</a:t>
+            </a:r>
+            <a:endParaRPr lang="en-US" sz="1400" dirty="0"/>
           </a:p>
         </p:txBody>
       </p:sp>
@@ -3759,8 +3826,8 @@
         </p:nvSpPr>
         <p:spPr>
           <a:xfrm>
-            <a:off x="457200" y="2286000"/>
-            <a:ext cx="6858000" cy="0"/>
+            <a:off x="457200" y="5029200"/>
+            <a:ext cx="5829300" cy="0"/>
           </a:xfrm>
           <a:prstGeom prst="rect">
             <a:avLst/>
@@ -3772,18 +3839,26 @@
           <a:bodyPr wrap="square" rtlCol="0" anchor="ctr"/>
           <a:lstStyle/>
           <a:p>
-            <a:pPr algn="l" indent="0" marL="0">
+            <a:pPr marL="0" indent="0" algn="l">
               <a:buNone/>
             </a:pPr>
             <a:r>
-              <a:rPr lang="en-US" sz="2400" dirty="0">
-                <a:solidFill>
-                  <a:srgbClr val="000000"/>
-                </a:solidFill>
-              </a:rPr>
-              <a:t>RELLENAR DEPOSITO DE LIMPIA PARABRISAS</a:t>
-            </a:r>
-            <a:endParaRPr lang="en-US" sz="2400" dirty="0"/>
+              <a:rPr lang="en-US" sz="1400" dirty="0">
+                <a:solidFill>
+                  <a:srgbClr val="F39200"/>
+                </a:solidFill>
+              </a:rPr>
+              <a:t>11. </a:t>
+            </a:r>
+            <a:r>
+              <a:rPr lang="en-US" sz="1400" dirty="0">
+                <a:solidFill>
+                  <a:srgbClr val="FFFFFF"/>
+                </a:solidFill>
+              </a:rPr>
+              <a:t>EVALUACIÓN DE A/C NO ENFRIA</a:t>
+            </a:r>
+            <a:endParaRPr lang="en-US" sz="1400" dirty="0"/>
           </a:p>
         </p:txBody>
       </p:sp>
@@ -3798,6 +3873,14 @@
 <file path=ppt/slides/slide20.xml><?xml version="1.0" encoding="utf-8"?>
 <p:sld xmlns:a="http://schemas.openxmlformats.org/drawingml/2006/main" xmlns:r="http://schemas.openxmlformats.org/officeDocument/2006/relationships" xmlns:p="http://schemas.openxmlformats.org/presentationml/2006/main">
   <p:cSld name="Slide 20">
+    <p:bg>
+      <p:bgPr>
+        <a:solidFill>
+          <a:srgbClr val="616161"/>
+        </a:solidFill>
+        <a:effectLst/>
+      </p:bgPr>
+    </p:bg>
     <p:spTree>
       <p:nvGrpSpPr>
         <p:cNvPr id="1" name=""/>
@@ -3821,7 +3904,7 @@
         <p:spPr>
           <a:xfrm>
             <a:off x="457200" y="457200"/>
-            <a:ext cx="6858000" cy="0"/>
+            <a:ext cx="5829300" cy="0"/>
           </a:xfrm>
           <a:prstGeom prst="rect">
             <a:avLst/>
@@ -3833,18 +3916,26 @@
           <a:bodyPr wrap="square" rtlCol="0" anchor="ctr"/>
           <a:lstStyle/>
           <a:p>
-            <a:pPr algn="l" indent="0" marL="0">
+            <a:pPr marL="0" indent="0" algn="l">
               <a:buNone/>
             </a:pPr>
             <a:r>
-              <a:rPr lang="en-US" sz="2400" dirty="0">
-                <a:solidFill>
-                  <a:srgbClr val="000000"/>
-                </a:solidFill>
-              </a:rPr>
-              <a:t>REALIZAR PRUEBAS OPERACIONALES DE EQUIPO</a:t>
-            </a:r>
-            <a:endParaRPr lang="en-US" sz="2400" dirty="0"/>
+              <a:rPr lang="en-US" sz="1400" dirty="0">
+                <a:solidFill>
+                  <a:srgbClr val="F39200"/>
+                </a:solidFill>
+              </a:rPr>
+              <a:t>46. </a:t>
+            </a:r>
+            <a:r>
+              <a:rPr lang="en-US" sz="1400" dirty="0">
+                <a:solidFill>
+                  <a:srgbClr val="FFFFFF"/>
+                </a:solidFill>
+              </a:rPr>
+              <a:t>LIMPIEZA Y PINTURA ANTICORROSIVA SECTOR INTERIOR TRASERO DE ESTANQUE</a:t>
+            </a:r>
+            <a:endParaRPr lang="en-US" sz="1400" dirty="0"/>
           </a:p>
         </p:txBody>
       </p:sp>
@@ -3856,8 +3947,8 @@
         </p:nvSpPr>
         <p:spPr>
           <a:xfrm>
-            <a:off x="457200" y="2286000"/>
-            <a:ext cx="6858000" cy="0"/>
+            <a:off x="457200" y="5029200"/>
+            <a:ext cx="5829300" cy="0"/>
           </a:xfrm>
           <a:prstGeom prst="rect">
             <a:avLst/>
@@ -3869,18 +3960,26 @@
           <a:bodyPr wrap="square" rtlCol="0" anchor="ctr"/>
           <a:lstStyle/>
           <a:p>
-            <a:pPr algn="l" indent="0" marL="0">
+            <a:pPr marL="0" indent="0" algn="l">
               <a:buNone/>
             </a:pPr>
             <a:r>
-              <a:rPr lang="en-US" sz="2400" dirty="0">
-                <a:solidFill>
-                  <a:srgbClr val="000000"/>
-                </a:solidFill>
-              </a:rPr>
-              <a:t>LAVADO GENERAL</a:t>
-            </a:r>
-            <a:endParaRPr lang="en-US" sz="2400" dirty="0"/>
+              <a:rPr lang="en-US" sz="1400" dirty="0">
+                <a:solidFill>
+                  <a:srgbClr val="F39200"/>
+                </a:solidFill>
+              </a:rPr>
+              <a:t>47. </a:t>
+            </a:r>
+            <a:r>
+              <a:rPr lang="en-US" sz="1400" dirty="0">
+                <a:solidFill>
+                  <a:srgbClr val="FFFFFF"/>
+                </a:solidFill>
+              </a:rPr>
+              <a:t>NORMALIZACIÓN DE SISTEMA DE REGADIO</a:t>
+            </a:r>
+            <a:endParaRPr lang="en-US" sz="1400" dirty="0"/>
           </a:p>
         </p:txBody>
       </p:sp>
@@ -3895,6 +3994,14 @@
 <file path=ppt/slides/slide21.xml><?xml version="1.0" encoding="utf-8"?>
 <p:sld xmlns:a="http://schemas.openxmlformats.org/drawingml/2006/main" xmlns:r="http://schemas.openxmlformats.org/officeDocument/2006/relationships" xmlns:p="http://schemas.openxmlformats.org/presentationml/2006/main">
   <p:cSld name="Slide 21">
+    <p:bg>
+      <p:bgPr>
+        <a:solidFill>
+          <a:srgbClr val="616161"/>
+        </a:solidFill>
+        <a:effectLst/>
+      </p:bgPr>
+    </p:bg>
     <p:spTree>
       <p:nvGrpSpPr>
         <p:cNvPr id="1" name=""/>
@@ -3918,7 +4025,7 @@
         <p:spPr>
           <a:xfrm>
             <a:off x="457200" y="457200"/>
-            <a:ext cx="6858000" cy="0"/>
+            <a:ext cx="5829300" cy="0"/>
           </a:xfrm>
           <a:prstGeom prst="rect">
             <a:avLst/>
@@ -3930,18 +4037,26 @@
           <a:bodyPr wrap="square" rtlCol="0" anchor="ctr"/>
           <a:lstStyle/>
           <a:p>
-            <a:pPr algn="l" indent="0" marL="0">
+            <a:pPr marL="0" indent="0" algn="l">
               <a:buNone/>
             </a:pPr>
             <a:r>
-              <a:rPr lang="en-US" sz="2400" dirty="0">
-                <a:solidFill>
-                  <a:srgbClr val="000000"/>
+              <a:rPr lang="en-US" sz="1400" dirty="0">
+                <a:solidFill>
+                  <a:srgbClr val="F39200"/>
+                </a:solidFill>
+              </a:rPr>
+              <a:t>48. </a:t>
+            </a:r>
+            <a:r>
+              <a:rPr lang="en-US" sz="1400" dirty="0">
+                <a:solidFill>
+                  <a:srgbClr val="FFFFFF"/>
                 </a:solidFill>
               </a:rPr>
               <a:t>REALIZAR PRUEBAS OPERACIONALES DE EQUIPO</a:t>
             </a:r>
-            <a:endParaRPr lang="en-US" sz="2400" dirty="0"/>
+            <a:endParaRPr lang="en-US" sz="1400" dirty="0"/>
           </a:p>
         </p:txBody>
       </p:sp>
@@ -3953,8 +4068,8 @@
         </p:nvSpPr>
         <p:spPr>
           <a:xfrm>
-            <a:off x="457200" y="2286000"/>
-            <a:ext cx="6858000" cy="0"/>
+            <a:off x="457200" y="5029200"/>
+            <a:ext cx="5829300" cy="0"/>
           </a:xfrm>
           <a:prstGeom prst="rect">
             <a:avLst/>
@@ -3966,18 +4081,26 @@
           <a:bodyPr wrap="square" rtlCol="0" anchor="ctr"/>
           <a:lstStyle/>
           <a:p>
-            <a:pPr algn="l" indent="0" marL="0">
+            <a:pPr marL="0" indent="0" algn="l">
               <a:buNone/>
             </a:pPr>
             <a:r>
-              <a:rPr lang="en-US" sz="2400" dirty="0">
-                <a:solidFill>
-                  <a:srgbClr val="000000"/>
-                </a:solidFill>
-              </a:rPr>
-              <a:t>CONFECCIÓN INFORME DE REPARACIÓN</a:t>
-            </a:r>
-            <a:endParaRPr lang="en-US" sz="2400" dirty="0"/>
+              <a:rPr lang="en-US" sz="1400" dirty="0">
+                <a:solidFill>
+                  <a:srgbClr val="F39200"/>
+                </a:solidFill>
+              </a:rPr>
+              <a:t>49. </a:t>
+            </a:r>
+            <a:r>
+              <a:rPr lang="en-US" sz="1400" dirty="0">
+                <a:solidFill>
+                  <a:srgbClr val="FFFFFF"/>
+                </a:solidFill>
+              </a:rPr>
+              <a:t>LAVADO GENERAL</a:t>
+            </a:r>
+            <a:endParaRPr lang="en-US" sz="1400" dirty="0"/>
           </a:p>
         </p:txBody>
       </p:sp>
@@ -3989,9 +4112,17 @@
 </p:sld>
 </file>
 
-<file path=ppt/slides/slide3.xml><?xml version="1.0" encoding="utf-8"?>
+<file path=ppt/slides/slide22.xml><?xml version="1.0" encoding="utf-8"?>
 <p:sld xmlns:a="http://schemas.openxmlformats.org/drawingml/2006/main" xmlns:r="http://schemas.openxmlformats.org/officeDocument/2006/relationships" xmlns:p="http://schemas.openxmlformats.org/presentationml/2006/main">
-  <p:cSld name="Slide 3">
+  <p:cSld name="Slide 22">
+    <p:bg>
+      <p:bgPr>
+        <a:solidFill>
+          <a:srgbClr val="616161"/>
+        </a:solidFill>
+        <a:effectLst/>
+      </p:bgPr>
+    </p:bg>
     <p:spTree>
       <p:nvGrpSpPr>
         <p:cNvPr id="1" name=""/>
@@ -4015,7 +4146,7 @@
         <p:spPr>
           <a:xfrm>
             <a:off x="457200" y="457200"/>
-            <a:ext cx="6858000" cy="0"/>
+            <a:ext cx="5829300" cy="0"/>
           </a:xfrm>
           <a:prstGeom prst="rect">
             <a:avLst/>
@@ -4027,18 +4158,26 @@
           <a:bodyPr wrap="square" rtlCol="0" anchor="ctr"/>
           <a:lstStyle/>
           <a:p>
-            <a:pPr algn="l" indent="0" marL="0">
+            <a:pPr marL="0" indent="0" algn="l">
               <a:buNone/>
             </a:pPr>
             <a:r>
-              <a:rPr lang="en-US" sz="2400" dirty="0">
-                <a:solidFill>
-                  <a:srgbClr val="000000"/>
-                </a:solidFill>
-              </a:rPr>
-              <a:t>FABRICACIÓN PROTECCIÓN ESTANQUE HIDRÁULICO </a:t>
-            </a:r>
-            <a:endParaRPr lang="en-US" sz="2400" dirty="0"/>
+              <a:rPr lang="en-US" sz="1400" dirty="0">
+                <a:solidFill>
+                  <a:srgbClr val="F39200"/>
+                </a:solidFill>
+              </a:rPr>
+              <a:t>50. </a:t>
+            </a:r>
+            <a:r>
+              <a:rPr lang="en-US" sz="1400" dirty="0">
+                <a:solidFill>
+                  <a:srgbClr val="FFFFFF"/>
+                </a:solidFill>
+              </a:rPr>
+              <a:t>REALIZAR PRUEBAS OPERACIONALES DE EQUIPO</a:t>
+            </a:r>
+            <a:endParaRPr lang="en-US" sz="1400" dirty="0"/>
           </a:p>
         </p:txBody>
       </p:sp>
@@ -4050,8 +4189,8 @@
         </p:nvSpPr>
         <p:spPr>
           <a:xfrm>
-            <a:off x="457200" y="2286000"/>
-            <a:ext cx="6858000" cy="0"/>
+            <a:off x="457200" y="5029200"/>
+            <a:ext cx="5829300" cy="0"/>
           </a:xfrm>
           <a:prstGeom prst="rect">
             <a:avLst/>
@@ -4063,18 +4202,26 @@
           <a:bodyPr wrap="square" rtlCol="0" anchor="ctr"/>
           <a:lstStyle/>
           <a:p>
-            <a:pPr algn="l" indent="0" marL="0">
+            <a:pPr marL="0" indent="0" algn="l">
               <a:buNone/>
             </a:pPr>
             <a:r>
-              <a:rPr lang="en-US" sz="2400" dirty="0">
-                <a:solidFill>
-                  <a:srgbClr val="000000"/>
-                </a:solidFill>
-              </a:rPr>
-              <a:t>FABRICACIÓN PROTECCIÓN AD-BLUE </a:t>
-            </a:r>
-            <a:endParaRPr lang="en-US" sz="2400" dirty="0"/>
+              <a:rPr lang="en-US" sz="1400" dirty="0">
+                <a:solidFill>
+                  <a:srgbClr val="F39200"/>
+                </a:solidFill>
+              </a:rPr>
+              <a:t>51. </a:t>
+            </a:r>
+            <a:r>
+              <a:rPr lang="en-US" sz="1400" dirty="0">
+                <a:solidFill>
+                  <a:srgbClr val="FFFFFF"/>
+                </a:solidFill>
+              </a:rPr>
+              <a:t>CONFECCIÓN INFORME DE REPARACIÓN</a:t>
+            </a:r>
+            <a:endParaRPr lang="en-US" sz="1400" dirty="0"/>
           </a:p>
         </p:txBody>
       </p:sp>
@@ -4086,9 +4233,17 @@
 </p:sld>
 </file>
 
-<file path=ppt/slides/slide4.xml><?xml version="1.0" encoding="utf-8"?>
+<file path=ppt/slides/slide3.xml><?xml version="1.0" encoding="utf-8"?>
 <p:sld xmlns:a="http://schemas.openxmlformats.org/drawingml/2006/main" xmlns:r="http://schemas.openxmlformats.org/officeDocument/2006/relationships" xmlns:p="http://schemas.openxmlformats.org/presentationml/2006/main">
-  <p:cSld name="Slide 4">
+  <p:cSld name="Slide 3">
+    <p:bg>
+      <p:bgPr>
+        <a:solidFill>
+          <a:srgbClr val="616161"/>
+        </a:solidFill>
+        <a:effectLst/>
+      </p:bgPr>
+    </p:bg>
     <p:spTree>
       <p:nvGrpSpPr>
         <p:cNvPr id="1" name=""/>
@@ -4112,7 +4267,7 @@
         <p:spPr>
           <a:xfrm>
             <a:off x="457200" y="457200"/>
-            <a:ext cx="6858000" cy="0"/>
+            <a:ext cx="5829300" cy="0"/>
           </a:xfrm>
           <a:prstGeom prst="rect">
             <a:avLst/>
@@ -4124,18 +4279,26 @@
           <a:bodyPr wrap="square" rtlCol="0" anchor="ctr"/>
           <a:lstStyle/>
           <a:p>
-            <a:pPr algn="l" indent="0" marL="0">
+            <a:pPr marL="0" indent="0" algn="l">
               <a:buNone/>
             </a:pPr>
             <a:r>
-              <a:rPr lang="en-US" sz="2400" dirty="0">
-                <a:solidFill>
-                  <a:srgbClr val="000000"/>
-                </a:solidFill>
-              </a:rPr>
-              <a:t>FABRICACIÓN PROTECCIÓN ESTANQUE DE PETROLEO </a:t>
-            </a:r>
-            <a:endParaRPr lang="en-US" sz="2400" dirty="0"/>
+              <a:rPr lang="en-US" sz="1400" dirty="0">
+                <a:solidFill>
+                  <a:srgbClr val="F39200"/>
+                </a:solidFill>
+              </a:rPr>
+              <a:t>12. </a:t>
+            </a:r>
+            <a:r>
+              <a:rPr lang="en-US" sz="1400" dirty="0">
+                <a:solidFill>
+                  <a:srgbClr val="FFFFFF"/>
+                </a:solidFill>
+              </a:rPr>
+              <a:t>CAMBIAR PLUMILLAS EN MAL ESTADO</a:t>
+            </a:r>
+            <a:endParaRPr lang="en-US" sz="1400" dirty="0"/>
           </a:p>
         </p:txBody>
       </p:sp>
@@ -4147,8 +4310,8 @@
         </p:nvSpPr>
         <p:spPr>
           <a:xfrm>
-            <a:off x="457200" y="2286000"/>
-            <a:ext cx="6858000" cy="0"/>
+            <a:off x="457200" y="5029200"/>
+            <a:ext cx="5829300" cy="0"/>
           </a:xfrm>
           <a:prstGeom prst="rect">
             <a:avLst/>
@@ -4160,18 +4323,26 @@
           <a:bodyPr wrap="square" rtlCol="0" anchor="ctr"/>
           <a:lstStyle/>
           <a:p>
-            <a:pPr algn="l" indent="0" marL="0">
+            <a:pPr marL="0" indent="0" algn="l">
               <a:buNone/>
             </a:pPr>
             <a:r>
-              <a:rPr lang="en-US" sz="2400" dirty="0">
-                <a:solidFill>
-                  <a:srgbClr val="000000"/>
-                </a:solidFill>
-              </a:rPr>
-              <a:t>REPARACIÓN DE LLAVE DE PASO MAL ESTADO Y FALTA DE LUBRICACIÓN</a:t>
-            </a:r>
-            <a:endParaRPr lang="en-US" sz="2400" dirty="0"/>
+              <a:rPr lang="en-US" sz="1400" dirty="0">
+                <a:solidFill>
+                  <a:srgbClr val="F39200"/>
+                </a:solidFill>
+              </a:rPr>
+              <a:t>13. </a:t>
+            </a:r>
+            <a:r>
+              <a:rPr lang="en-US" sz="1400" dirty="0">
+                <a:solidFill>
+                  <a:srgbClr val="FFFFFF"/>
+                </a:solidFill>
+              </a:rPr>
+              <a:t>RELLENAR DEPOSITO DE LIMPIA PARABRISAS</a:t>
+            </a:r>
+            <a:endParaRPr lang="en-US" sz="1400" dirty="0"/>
           </a:p>
         </p:txBody>
       </p:sp>
@@ -4183,9 +4354,17 @@
 </p:sld>
 </file>
 
-<file path=ppt/slides/slide5.xml><?xml version="1.0" encoding="utf-8"?>
+<file path=ppt/slides/slide4.xml><?xml version="1.0" encoding="utf-8"?>
 <p:sld xmlns:a="http://schemas.openxmlformats.org/drawingml/2006/main" xmlns:r="http://schemas.openxmlformats.org/officeDocument/2006/relationships" xmlns:p="http://schemas.openxmlformats.org/presentationml/2006/main">
-  <p:cSld name="Slide 5">
+  <p:cSld name="Slide 4">
+    <p:bg>
+      <p:bgPr>
+        <a:solidFill>
+          <a:srgbClr val="616161"/>
+        </a:solidFill>
+        <a:effectLst/>
+      </p:bgPr>
+    </p:bg>
     <p:spTree>
       <p:nvGrpSpPr>
         <p:cNvPr id="1" name=""/>
@@ -4209,7 +4388,7 @@
         <p:spPr>
           <a:xfrm>
             <a:off x="457200" y="457200"/>
-            <a:ext cx="6858000" cy="0"/>
+            <a:ext cx="5829300" cy="0"/>
           </a:xfrm>
           <a:prstGeom prst="rect">
             <a:avLst/>
@@ -4221,18 +4400,26 @@
           <a:bodyPr wrap="square" rtlCol="0" anchor="ctr"/>
           <a:lstStyle/>
           <a:p>
-            <a:pPr algn="l" indent="0" marL="0">
+            <a:pPr marL="0" indent="0" algn="l">
               <a:buNone/>
             </a:pPr>
             <a:r>
-              <a:rPr lang="en-US" sz="2400" dirty="0">
-                <a:solidFill>
-                  <a:srgbClr val="000000"/>
-                </a:solidFill>
-              </a:rPr>
-              <a:t>REPONER CINTA REFLECTANTE BICOLOR Y VERDE LIMÓN</a:t>
-            </a:r>
-            <a:endParaRPr lang="en-US" sz="2400" dirty="0"/>
+              <a:rPr lang="en-US" sz="1400" dirty="0">
+                <a:solidFill>
+                  <a:srgbClr val="F39200"/>
+                </a:solidFill>
+              </a:rPr>
+              <a:t>14. </a:t>
+            </a:r>
+            <a:r>
+              <a:rPr lang="en-US" sz="1400" dirty="0">
+                <a:solidFill>
+                  <a:srgbClr val="FFFFFF"/>
+                </a:solidFill>
+              </a:rPr>
+              <a:t>FABRICACIÓN PROTECCIÓN ESTANQUE HIDRÁULICO </a:t>
+            </a:r>
+            <a:endParaRPr lang="en-US" sz="1400" dirty="0"/>
           </a:p>
         </p:txBody>
       </p:sp>
@@ -4244,8 +4431,8 @@
         </p:nvSpPr>
         <p:spPr>
           <a:xfrm>
-            <a:off x="457200" y="2286000"/>
-            <a:ext cx="6858000" cy="0"/>
+            <a:off x="457200" y="5029200"/>
+            <a:ext cx="5829300" cy="0"/>
           </a:xfrm>
           <a:prstGeom prst="rect">
             <a:avLst/>
@@ -4257,18 +4444,26 @@
           <a:bodyPr wrap="square" rtlCol="0" anchor="ctr"/>
           <a:lstStyle/>
           <a:p>
-            <a:pPr algn="l" indent="0" marL="0">
+            <a:pPr marL="0" indent="0" algn="l">
               <a:buNone/>
             </a:pPr>
             <a:r>
-              <a:rPr lang="en-US" sz="2400" dirty="0">
-                <a:solidFill>
-                  <a:srgbClr val="000000"/>
-                </a:solidFill>
-              </a:rPr>
-              <a:t>FABRICAR TAPA Y BARANDAS DE ESTANQUE</a:t>
-            </a:r>
-            <a:endParaRPr lang="en-US" sz="2400" dirty="0"/>
+              <a:rPr lang="en-US" sz="1400" dirty="0">
+                <a:solidFill>
+                  <a:srgbClr val="F39200"/>
+                </a:solidFill>
+              </a:rPr>
+              <a:t>15. </a:t>
+            </a:r>
+            <a:r>
+              <a:rPr lang="en-US" sz="1400" dirty="0">
+                <a:solidFill>
+                  <a:srgbClr val="FFFFFF"/>
+                </a:solidFill>
+              </a:rPr>
+              <a:t>FABRICACIÓN PROTECCIÓN AD-BLUE </a:t>
+            </a:r>
+            <a:endParaRPr lang="en-US" sz="1400" dirty="0"/>
           </a:p>
         </p:txBody>
       </p:sp>
@@ -4280,9 +4475,17 @@
 </p:sld>
 </file>
 
-<file path=ppt/slides/slide6.xml><?xml version="1.0" encoding="utf-8"?>
+<file path=ppt/slides/slide5.xml><?xml version="1.0" encoding="utf-8"?>
 <p:sld xmlns:a="http://schemas.openxmlformats.org/drawingml/2006/main" xmlns:r="http://schemas.openxmlformats.org/officeDocument/2006/relationships" xmlns:p="http://schemas.openxmlformats.org/presentationml/2006/main">
-  <p:cSld name="Slide 6">
+  <p:cSld name="Slide 5">
+    <p:bg>
+      <p:bgPr>
+        <a:solidFill>
+          <a:srgbClr val="616161"/>
+        </a:solidFill>
+        <a:effectLst/>
+      </p:bgPr>
+    </p:bg>
     <p:spTree>
       <p:nvGrpSpPr>
         <p:cNvPr id="1" name=""/>
@@ -4306,7 +4509,7 @@
         <p:spPr>
           <a:xfrm>
             <a:off x="457200" y="457200"/>
-            <a:ext cx="6858000" cy="0"/>
+            <a:ext cx="5829300" cy="0"/>
           </a:xfrm>
           <a:prstGeom prst="rect">
             <a:avLst/>
@@ -4318,18 +4521,26 @@
           <a:bodyPr wrap="square" rtlCol="0" anchor="ctr"/>
           <a:lstStyle/>
           <a:p>
-            <a:pPr algn="l" indent="0" marL="0">
+            <a:pPr marL="0" indent="0" algn="l">
               <a:buNone/>
             </a:pPr>
             <a:r>
-              <a:rPr lang="en-US" sz="2400" dirty="0">
-                <a:solidFill>
-                  <a:srgbClr val="000000"/>
-                </a:solidFill>
-              </a:rPr>
-              <a:t>CAMBIAR PIOLA DE LEVANTE CON ABRAZADERAS Y GANCHO</a:t>
-            </a:r>
-            <a:endParaRPr lang="en-US" sz="2400" dirty="0"/>
+              <a:rPr lang="en-US" sz="1400" dirty="0">
+                <a:solidFill>
+                  <a:srgbClr val="F39200"/>
+                </a:solidFill>
+              </a:rPr>
+              <a:t>16. </a:t>
+            </a:r>
+            <a:r>
+              <a:rPr lang="en-US" sz="1400" dirty="0">
+                <a:solidFill>
+                  <a:srgbClr val="FFFFFF"/>
+                </a:solidFill>
+              </a:rPr>
+              <a:t>FABRICACIÓN PROTECCIÓN ESTANQUE DE PETROLEO </a:t>
+            </a:r>
+            <a:endParaRPr lang="en-US" sz="1400" dirty="0"/>
           </a:p>
         </p:txBody>
       </p:sp>
@@ -4341,8 +4552,8 @@
         </p:nvSpPr>
         <p:spPr>
           <a:xfrm>
-            <a:off x="457200" y="2286000"/>
-            <a:ext cx="6858000" cy="0"/>
+            <a:off x="457200" y="5029200"/>
+            <a:ext cx="5829300" cy="0"/>
           </a:xfrm>
           <a:prstGeom prst="rect">
             <a:avLst/>
@@ -4354,18 +4565,26 @@
           <a:bodyPr wrap="square" rtlCol="0" anchor="ctr"/>
           <a:lstStyle/>
           <a:p>
-            <a:pPr algn="l" indent="0" marL="0">
+            <a:pPr marL="0" indent="0" algn="l">
               <a:buNone/>
             </a:pPr>
             <a:r>
-              <a:rPr lang="en-US" sz="2400" dirty="0">
-                <a:solidFill>
-                  <a:srgbClr val="000000"/>
-                </a:solidFill>
-              </a:rPr>
-              <a:t>REPONER TAPABARRO RH POSICIÓN N°2</a:t>
-            </a:r>
-            <a:endParaRPr lang="en-US" sz="2400" dirty="0"/>
+              <a:rPr lang="en-US" sz="1400" dirty="0">
+                <a:solidFill>
+                  <a:srgbClr val="F39200"/>
+                </a:solidFill>
+              </a:rPr>
+              <a:t>17. </a:t>
+            </a:r>
+            <a:r>
+              <a:rPr lang="en-US" sz="1400" dirty="0">
+                <a:solidFill>
+                  <a:srgbClr val="FFFFFF"/>
+                </a:solidFill>
+              </a:rPr>
+              <a:t>REPARACIÓN DE LLAVE DE PASO MAL ESTADO Y FALTA DE LUBRICACIÓN</a:t>
+            </a:r>
+            <a:endParaRPr lang="en-US" sz="1400" dirty="0"/>
           </a:p>
         </p:txBody>
       </p:sp>
@@ -4377,9 +4596,17 @@
 </p:sld>
 </file>
 
-<file path=ppt/slides/slide7.xml><?xml version="1.0" encoding="utf-8"?>
+<file path=ppt/slides/slide6.xml><?xml version="1.0" encoding="utf-8"?>
 <p:sld xmlns:a="http://schemas.openxmlformats.org/drawingml/2006/main" xmlns:r="http://schemas.openxmlformats.org/officeDocument/2006/relationships" xmlns:p="http://schemas.openxmlformats.org/presentationml/2006/main">
-  <p:cSld name="Slide 7">
+  <p:cSld name="Slide 6">
+    <p:bg>
+      <p:bgPr>
+        <a:solidFill>
+          <a:srgbClr val="616161"/>
+        </a:solidFill>
+        <a:effectLst/>
+      </p:bgPr>
+    </p:bg>
     <p:spTree>
       <p:nvGrpSpPr>
         <p:cNvPr id="1" name=""/>
@@ -4403,7 +4630,7 @@
         <p:spPr>
           <a:xfrm>
             <a:off x="457200" y="457200"/>
-            <a:ext cx="6858000" cy="0"/>
+            <a:ext cx="5829300" cy="0"/>
           </a:xfrm>
           <a:prstGeom prst="rect">
             <a:avLst/>
@@ -4415,18 +4642,26 @@
           <a:bodyPr wrap="square" rtlCol="0" anchor="ctr"/>
           <a:lstStyle/>
           <a:p>
-            <a:pPr algn="l" indent="0" marL="0">
+            <a:pPr marL="0" indent="0" algn="l">
               <a:buNone/>
             </a:pPr>
             <a:r>
-              <a:rPr lang="en-US" sz="2400" dirty="0">
-                <a:solidFill>
-                  <a:srgbClr val="000000"/>
-                </a:solidFill>
-              </a:rPr>
-              <a:t>CAMBIAR RADIADOR A/C CON DESPRENDIMIENTO DE MATERIAL</a:t>
-            </a:r>
-            <a:endParaRPr lang="en-US" sz="2400" dirty="0"/>
+              <a:rPr lang="en-US" sz="1400" dirty="0">
+                <a:solidFill>
+                  <a:srgbClr val="F39200"/>
+                </a:solidFill>
+              </a:rPr>
+              <a:t>18. </a:t>
+            </a:r>
+            <a:r>
+              <a:rPr lang="en-US" sz="1400" dirty="0">
+                <a:solidFill>
+                  <a:srgbClr val="FFFFFF"/>
+                </a:solidFill>
+              </a:rPr>
+              <a:t>REPONER CINTA REFLECTANTE BICOLOR Y VERDE LIMÓN</a:t>
+            </a:r>
+            <a:endParaRPr lang="en-US" sz="1400" dirty="0"/>
           </a:p>
         </p:txBody>
       </p:sp>
@@ -4438,8 +4673,8 @@
         </p:nvSpPr>
         <p:spPr>
           <a:xfrm>
-            <a:off x="457200" y="2286000"/>
-            <a:ext cx="6858000" cy="0"/>
+            <a:off x="457200" y="5029200"/>
+            <a:ext cx="5829300" cy="0"/>
           </a:xfrm>
           <a:prstGeom prst="rect">
             <a:avLst/>
@@ -4451,18 +4686,26 @@
           <a:bodyPr wrap="square" rtlCol="0" anchor="ctr"/>
           <a:lstStyle/>
           <a:p>
-            <a:pPr algn="l" indent="0" marL="0">
+            <a:pPr marL="0" indent="0" algn="l">
               <a:buNone/>
             </a:pPr>
             <a:r>
-              <a:rPr lang="en-US" sz="2400" dirty="0">
-                <a:solidFill>
-                  <a:srgbClr val="000000"/>
-                </a:solidFill>
-              </a:rPr>
-              <a:t>REPONER PASADOR DE TIRO DELANTERO</a:t>
-            </a:r>
-            <a:endParaRPr lang="en-US" sz="2400" dirty="0"/>
+              <a:rPr lang="en-US" sz="1400" dirty="0">
+                <a:solidFill>
+                  <a:srgbClr val="F39200"/>
+                </a:solidFill>
+              </a:rPr>
+              <a:t>19. </a:t>
+            </a:r>
+            <a:r>
+              <a:rPr lang="en-US" sz="1400" dirty="0">
+                <a:solidFill>
+                  <a:srgbClr val="FFFFFF"/>
+                </a:solidFill>
+              </a:rPr>
+              <a:t>FABRICAR TAPA Y BARANDAS DE ESTANQUE</a:t>
+            </a:r>
+            <a:endParaRPr lang="en-US" sz="1400" dirty="0"/>
           </a:p>
         </p:txBody>
       </p:sp>
@@ -4474,9 +4717,17 @@
 </p:sld>
 </file>
 
-<file path=ppt/slides/slide8.xml><?xml version="1.0" encoding="utf-8"?>
+<file path=ppt/slides/slide7.xml><?xml version="1.0" encoding="utf-8"?>
 <p:sld xmlns:a="http://schemas.openxmlformats.org/drawingml/2006/main" xmlns:r="http://schemas.openxmlformats.org/officeDocument/2006/relationships" xmlns:p="http://schemas.openxmlformats.org/presentationml/2006/main">
-  <p:cSld name="Slide 8">
+  <p:cSld name="Slide 7">
+    <p:bg>
+      <p:bgPr>
+        <a:solidFill>
+          <a:srgbClr val="616161"/>
+        </a:solidFill>
+        <a:effectLst/>
+      </p:bgPr>
+    </p:bg>
     <p:spTree>
       <p:nvGrpSpPr>
         <p:cNvPr id="1" name=""/>
@@ -4500,7 +4751,7 @@
         <p:spPr>
           <a:xfrm>
             <a:off x="457200" y="457200"/>
-            <a:ext cx="6858000" cy="0"/>
+            <a:ext cx="5829300" cy="0"/>
           </a:xfrm>
           <a:prstGeom prst="rect">
             <a:avLst/>
@@ -4512,18 +4763,26 @@
           <a:bodyPr wrap="square" rtlCol="0" anchor="ctr"/>
           <a:lstStyle/>
           <a:p>
-            <a:pPr algn="l" indent="0" marL="0">
+            <a:pPr marL="0" indent="0" algn="l">
               <a:buNone/>
             </a:pPr>
             <a:r>
-              <a:rPr lang="en-US" sz="2400" dirty="0">
-                <a:solidFill>
-                  <a:srgbClr val="000000"/>
-                </a:solidFill>
-              </a:rPr>
-              <a:t>NORMALIZAR PASADOR DE TIRO TRASERO AGRIPADO</a:t>
-            </a:r>
-            <a:endParaRPr lang="en-US" sz="2400" dirty="0"/>
+              <a:rPr lang="en-US" sz="1400" dirty="0">
+                <a:solidFill>
+                  <a:srgbClr val="F39200"/>
+                </a:solidFill>
+              </a:rPr>
+              <a:t>20. </a:t>
+            </a:r>
+            <a:r>
+              <a:rPr lang="en-US" sz="1400" dirty="0">
+                <a:solidFill>
+                  <a:srgbClr val="FFFFFF"/>
+                </a:solidFill>
+              </a:rPr>
+              <a:t>CAMBIAR PIOLA DE LEVANTE CON ABRAZADERAS Y GANCHO</a:t>
+            </a:r>
+            <a:endParaRPr lang="en-US" sz="1400" dirty="0"/>
           </a:p>
         </p:txBody>
       </p:sp>
@@ -4535,8 +4794,8 @@
         </p:nvSpPr>
         <p:spPr>
           <a:xfrm>
-            <a:off x="457200" y="2286000"/>
-            <a:ext cx="6858000" cy="0"/>
+            <a:off x="457200" y="5029200"/>
+            <a:ext cx="5829300" cy="0"/>
           </a:xfrm>
           <a:prstGeom prst="rect">
             <a:avLst/>
@@ -4548,18 +4807,26 @@
           <a:bodyPr wrap="square" rtlCol="0" anchor="ctr"/>
           <a:lstStyle/>
           <a:p>
-            <a:pPr algn="l" indent="0" marL="0">
+            <a:pPr marL="0" indent="0" algn="l">
               <a:buNone/>
             </a:pPr>
             <a:r>
-              <a:rPr lang="en-US" sz="2400" dirty="0">
-                <a:solidFill>
-                  <a:srgbClr val="000000"/>
-                </a:solidFill>
-              </a:rPr>
-              <a:t>FABRICAR PROTECCIÓN DE FOCOS TRASEROS FALTANTES</a:t>
-            </a:r>
-            <a:endParaRPr lang="en-US" sz="2400" dirty="0"/>
+              <a:rPr lang="en-US" sz="1400" dirty="0">
+                <a:solidFill>
+                  <a:srgbClr val="F39200"/>
+                </a:solidFill>
+              </a:rPr>
+              <a:t>21. </a:t>
+            </a:r>
+            <a:r>
+              <a:rPr lang="en-US" sz="1400" dirty="0">
+                <a:solidFill>
+                  <a:srgbClr val="FFFFFF"/>
+                </a:solidFill>
+              </a:rPr>
+              <a:t>REPONER TAPABARRO RH POSICIÓN N°2</a:t>
+            </a:r>
+            <a:endParaRPr lang="en-US" sz="1400" dirty="0"/>
           </a:p>
         </p:txBody>
       </p:sp>
@@ -4571,9 +4838,17 @@
 </p:sld>
 </file>
 
-<file path=ppt/slides/slide9.xml><?xml version="1.0" encoding="utf-8"?>
+<file path=ppt/slides/slide8.xml><?xml version="1.0" encoding="utf-8"?>
 <p:sld xmlns:a="http://schemas.openxmlformats.org/drawingml/2006/main" xmlns:r="http://schemas.openxmlformats.org/officeDocument/2006/relationships" xmlns:p="http://schemas.openxmlformats.org/presentationml/2006/main">
-  <p:cSld name="Slide 9">
+  <p:cSld name="Slide 8">
+    <p:bg>
+      <p:bgPr>
+        <a:solidFill>
+          <a:srgbClr val="616161"/>
+        </a:solidFill>
+        <a:effectLst/>
+      </p:bgPr>
+    </p:bg>
     <p:spTree>
       <p:nvGrpSpPr>
         <p:cNvPr id="1" name=""/>
@@ -4597,7 +4872,7 @@
         <p:spPr>
           <a:xfrm>
             <a:off x="457200" y="457200"/>
-            <a:ext cx="6858000" cy="0"/>
+            <a:ext cx="5829300" cy="0"/>
           </a:xfrm>
           <a:prstGeom prst="rect">
             <a:avLst/>
@@ -4609,18 +4884,26 @@
           <a:bodyPr wrap="square" rtlCol="0" anchor="ctr"/>
           <a:lstStyle/>
           <a:p>
-            <a:pPr algn="l" indent="0" marL="0">
+            <a:pPr marL="0" indent="0" algn="l">
               <a:buNone/>
             </a:pPr>
             <a:r>
-              <a:rPr lang="en-US" sz="2400" dirty="0">
-                <a:solidFill>
-                  <a:srgbClr val="000000"/>
-                </a:solidFill>
-              </a:rPr>
-              <a:t>REPONER BOMBA CENTRIFUGA Y FABRICAR SOPORTE PARA DUCTO CAIDO</a:t>
-            </a:r>
-            <a:endParaRPr lang="en-US" sz="2400" dirty="0"/>
+              <a:rPr lang="en-US" sz="1400" dirty="0">
+                <a:solidFill>
+                  <a:srgbClr val="F39200"/>
+                </a:solidFill>
+              </a:rPr>
+              <a:t>22. </a:t>
+            </a:r>
+            <a:r>
+              <a:rPr lang="en-US" sz="1400" dirty="0">
+                <a:solidFill>
+                  <a:srgbClr val="FFFFFF"/>
+                </a:solidFill>
+              </a:rPr>
+              <a:t>CAMBIAR RADIADOR A/C CON DESPRENDIMIENTO DE MATERIAL</a:t>
+            </a:r>
+            <a:endParaRPr lang="en-US" sz="1400" dirty="0"/>
           </a:p>
         </p:txBody>
       </p:sp>
@@ -4632,8 +4915,8 @@
         </p:nvSpPr>
         <p:spPr>
           <a:xfrm>
-            <a:off x="457200" y="2286000"/>
-            <a:ext cx="6858000" cy="0"/>
+            <a:off x="457200" y="5029200"/>
+            <a:ext cx="5829300" cy="0"/>
           </a:xfrm>
           <a:prstGeom prst="rect">
             <a:avLst/>
@@ -4645,18 +4928,147 @@
           <a:bodyPr wrap="square" rtlCol="0" anchor="ctr"/>
           <a:lstStyle/>
           <a:p>
-            <a:pPr algn="l" indent="0" marL="0">
+            <a:pPr marL="0" indent="0" algn="l">
               <a:buNone/>
             </a:pPr>
             <a:r>
-              <a:rPr lang="en-US" sz="2400" dirty="0">
-                <a:solidFill>
-                  <a:srgbClr val="000000"/>
-                </a:solidFill>
-              </a:rPr>
-              <a:t>NORMALIZAR ESTANQUE CON CONTAMINACIÓN EXCESIVA Y LINEAS DE FLUJO TAPADAS</a:t>
-            </a:r>
-            <a:endParaRPr lang="en-US" sz="2400" dirty="0"/>
+              <a:rPr lang="en-US" sz="1400" dirty="0">
+                <a:solidFill>
+                  <a:srgbClr val="F39200"/>
+                </a:solidFill>
+              </a:rPr>
+              <a:t>23. </a:t>
+            </a:r>
+            <a:r>
+              <a:rPr lang="en-US" sz="1400" dirty="0">
+                <a:solidFill>
+                  <a:srgbClr val="FFFFFF"/>
+                </a:solidFill>
+              </a:rPr>
+              <a:t>REPONER PASADOR DE TIRO DELANTERO</a:t>
+            </a:r>
+            <a:endParaRPr lang="en-US" sz="1400" dirty="0"/>
+          </a:p>
+        </p:txBody>
+      </p:sp>
+    </p:spTree>
+  </p:cSld>
+  <p:clrMapOvr>
+    <a:masterClrMapping/>
+  </p:clrMapOvr>
+</p:sld>
+</file>
+
+<file path=ppt/slides/slide9.xml><?xml version="1.0" encoding="utf-8"?>
+<p:sld xmlns:a="http://schemas.openxmlformats.org/drawingml/2006/main" xmlns:r="http://schemas.openxmlformats.org/officeDocument/2006/relationships" xmlns:p="http://schemas.openxmlformats.org/presentationml/2006/main">
+  <p:cSld name="Slide 9">
+    <p:bg>
+      <p:bgPr>
+        <a:solidFill>
+          <a:srgbClr val="616161"/>
+        </a:solidFill>
+        <a:effectLst/>
+      </p:bgPr>
+    </p:bg>
+    <p:spTree>
+      <p:nvGrpSpPr>
+        <p:cNvPr id="1" name=""/>
+        <p:cNvGrpSpPr/>
+        <p:nvPr/>
+      </p:nvGrpSpPr>
+      <p:grpSpPr>
+        <a:xfrm>
+          <a:off x="0" y="0"/>
+          <a:ext cx="0" cy="0"/>
+          <a:chOff x="0" y="0"/>
+          <a:chExt cx="0" cy="0"/>
+        </a:xfrm>
+      </p:grpSpPr>
+      <p:sp>
+        <p:nvSpPr>
+          <p:cNvPr id="2" name="Text 0"/>
+          <p:cNvSpPr/>
+          <p:nvPr/>
+        </p:nvSpPr>
+        <p:spPr>
+          <a:xfrm>
+            <a:off x="457200" y="457200"/>
+            <a:ext cx="5829300" cy="0"/>
+          </a:xfrm>
+          <a:prstGeom prst="rect">
+            <a:avLst/>
+          </a:prstGeom>
+          <a:noFill/>
+          <a:ln/>
+        </p:spPr>
+        <p:txBody>
+          <a:bodyPr wrap="square" rtlCol="0" anchor="ctr"/>
+          <a:lstStyle/>
+          <a:p>
+            <a:pPr marL="0" indent="0" algn="l">
+              <a:buNone/>
+            </a:pPr>
+            <a:r>
+              <a:rPr lang="en-US" sz="1400" dirty="0">
+                <a:solidFill>
+                  <a:srgbClr val="F39200"/>
+                </a:solidFill>
+              </a:rPr>
+              <a:t>24. </a:t>
+            </a:r>
+            <a:r>
+              <a:rPr lang="en-US" sz="1400" dirty="0">
+                <a:solidFill>
+                  <a:srgbClr val="FFFFFF"/>
+                </a:solidFill>
+              </a:rPr>
+              <a:t>NORMALIZAR PASADOR DE TIRO TRASERO AGRIPADO</a:t>
+            </a:r>
+            <a:endParaRPr lang="en-US" sz="1400" dirty="0"/>
+          </a:p>
+        </p:txBody>
+      </p:sp>
+      <p:sp>
+        <p:nvSpPr>
+          <p:cNvPr id="3" name="Text 1"/>
+          <p:cNvSpPr/>
+          <p:nvPr/>
+        </p:nvSpPr>
+        <p:spPr>
+          <a:xfrm>
+            <a:off x="457200" y="5029200"/>
+            <a:ext cx="5829300" cy="0"/>
+          </a:xfrm>
+          <a:prstGeom prst="rect">
+            <a:avLst/>
+          </a:prstGeom>
+          <a:noFill/>
+          <a:ln/>
+        </p:spPr>
+        <p:txBody>
+          <a:bodyPr wrap="square" rtlCol="0" anchor="ctr"/>
+          <a:lstStyle/>
+          <a:p>
+            <a:pPr marL="0" indent="0" algn="l">
+              <a:buNone/>
+            </a:pPr>
+            <a:r>
+              <a:rPr lang="en-US" sz="1400" dirty="0">
+                <a:solidFill>
+                  <a:srgbClr val="F39200"/>
+                </a:solidFill>
+              </a:rPr>
+              <a:t>25. </a:t>
+            </a:r>
+            <a:r>
+              <a:rPr lang="en-US" sz="1400" dirty="0">
+                <a:solidFill>
+                  <a:srgbClr val="FFFFFF"/>
+                </a:solidFill>
+              </a:rPr>
+              <a:t>FABRICAR PROTECCIÓN DE FOCOS TRASEROS FALTANTES</a:t>
+            </a:r>
+            <a:endParaRPr lang="en-US" sz="1400" dirty="0"/>
           </a:p>
         </p:txBody>
       </p:sp>
@@ -4961,4 +5373,299 @@
     </a:ext>
   </a:extLst>
 </a:theme>
+</file>
+
+<file path=ppt/theme/theme2.xml><?xml version="1.0" encoding="utf-8"?>
+<a:theme xmlns:a="http://schemas.openxmlformats.org/drawingml/2006/main" name="Tema de Office">
+  <a:themeElements>
+    <a:clrScheme name="Office">
+      <a:dk1>
+        <a:sysClr val="windowText" lastClr="000000"/>
+      </a:dk1>
+      <a:lt1>
+        <a:sysClr val="window" lastClr="FFFFFF"/>
+      </a:lt1>
+      <a:dk2>
+        <a:srgbClr val="44546A"/>
+      </a:dk2>
+      <a:lt2>
+        <a:srgbClr val="E7E6E6"/>
+      </a:lt2>
+      <a:accent1>
+        <a:srgbClr val="4472C4"/>
+      </a:accent1>
+      <a:accent2>
+        <a:srgbClr val="ED7D31"/>
+      </a:accent2>
+      <a:accent3>
+        <a:srgbClr val="A5A5A5"/>
+      </a:accent3>
+      <a:accent4>
+        <a:srgbClr val="FFC000"/>
+      </a:accent4>
+      <a:accent5>
+        <a:srgbClr val="5B9BD5"/>
+      </a:accent5>
+      <a:accent6>
+        <a:srgbClr val="70AD47"/>
+      </a:accent6>
+      <a:hlink>
+        <a:srgbClr val="0563C1"/>
+      </a:hlink>
+      <a:folHlink>
+        <a:srgbClr val="954F72"/>
+      </a:folHlink>
+    </a:clrScheme>
+    <a:fontScheme name="Office">
+      <a:majorFont>
+        <a:latin typeface="Calibri Light" panose="020F0302020204030204"/>
+        <a:ea typeface=""/>
+        <a:cs typeface=""/>
+        <a:font script="Jpan" typeface="游ゴシック Light"/>
+        <a:font script="Hang" typeface="맑은 고딕"/>
+        <a:font script="Hans" typeface="等线 Light"/>
+        <a:font script="Hant" typeface="新細明體"/>
+        <a:font script="Arab" typeface="Times New Roman"/>
+        <a:font script="Hebr" typeface="Times New Roman"/>
+        <a:font script="Thai" typeface="Angsana New"/>
+        <a:font script="Ethi" typeface="Nyala"/>
+        <a:font script="Beng" typeface="Vrinda"/>
+        <a:font script="Gujr" typeface="Shruti"/>
+        <a:font script="Khmr" typeface="MoolBoran"/>
+        <a:font script="Knda" typeface="Tunga"/>
+        <a:font script="Guru" typeface="Raavi"/>
+        <a:font script="Cans" typeface="Euphemia"/>
+        <a:font script="Cher" typeface="Plantagenet Cherokee"/>
+        <a:font script="Yiii" typeface="Microsoft Yi Baiti"/>
+        <a:font script="Tibt" typeface="Microsoft Himalaya"/>
+        <a:font script="Thaa" typeface="MV Boli"/>
+        <a:font script="Deva" typeface="Mangal"/>
+        <a:font script="Telu" typeface="Gautami"/>
+        <a:font script="Taml" typeface="Latha"/>
+        <a:font script="Syrc" typeface="Estrangelo Edessa"/>
+        <a:font script="Orya" typeface="Kalinga"/>
+        <a:font script="Mlym" typeface="Kartika"/>
+        <a:font script="Laoo" typeface="DokChampa"/>
+        <a:font script="Sinh" typeface="Iskoola Pota"/>
+        <a:font script="Mong" typeface="Mongolian Baiti"/>
+        <a:font script="Viet" typeface="Times New Roman"/>
+        <a:font script="Uigh" typeface="Microsoft Uighur"/>
+        <a:font script="Geor" typeface="Sylfaen"/>
+        <a:font script="Armn" typeface="Arial"/>
+        <a:font script="Bugi" typeface="Leelawadee UI"/>
+        <a:font script="Bopo" typeface="Microsoft JhengHei"/>
+        <a:font script="Java" typeface="Javanese Text"/>
+        <a:font script="Lisu" typeface="Segoe UI"/>
+        <a:font script="Mymr" typeface="Myanmar Text"/>
+        <a:font script="Nkoo" typeface="Ebrima"/>
+        <a:font script="Olck" typeface="Nirmala UI"/>
+        <a:font script="Osma" typeface="Ebrima"/>
+        <a:font script="Phag" typeface="Phagspa"/>
+        <a:font script="Syrn" typeface="Estrangelo Edessa"/>
+        <a:font script="Syrj" typeface="Estrangelo Edessa"/>
+        <a:font script="Syre" typeface="Estrangelo Edessa"/>
+        <a:font script="Sora" typeface="Nirmala UI"/>
+        <a:font script="Tale" typeface="Microsoft Tai Le"/>
+        <a:font script="Talu" typeface="Microsoft New Tai Lue"/>
+        <a:font script="Tfng" typeface="Ebrima"/>
+      </a:majorFont>
+      <a:minorFont>
+        <a:latin typeface="Calibri" panose="020F0502020204030204"/>
+        <a:ea typeface=""/>
+        <a:cs typeface=""/>
+        <a:font script="Jpan" typeface="游ゴシック"/>
+        <a:font script="Hang" typeface="맑은 고딕"/>
+        <a:font script="Hans" typeface="等线"/>
+        <a:font script="Hant" typeface="新細明體"/>
+        <a:font script="Arab" typeface="Arial"/>
+        <a:font script="Hebr" typeface="Arial"/>
+        <a:font script="Thai" typeface="Cordia New"/>
+        <a:font script="Ethi" typeface="Nyala"/>
+        <a:font script="Beng" typeface="Vrinda"/>
+        <a:font script="Gujr" typeface="Shruti"/>
+        <a:font script="Khmr" typeface="DaunPenh"/>
+        <a:font script="Knda" typeface="Tunga"/>
+        <a:font script="Guru" typeface="Raavi"/>
+        <a:font script="Cans" typeface="Euphemia"/>
+        <a:font script="Cher" typeface="Plantagenet Cherokee"/>
+        <a:font script="Yiii" typeface="Microsoft Yi Baiti"/>
+        <a:font script="Tibt" typeface="Microsoft Himalaya"/>
+        <a:font script="Thaa" typeface="MV Boli"/>
+        <a:font script="Deva" typeface="Mangal"/>
+        <a:font script="Telu" typeface="Gautami"/>
+        <a:font script="Taml" typeface="Latha"/>
+        <a:font script="Syrc" typeface="Estrangelo Edessa"/>
+        <a:font script="Orya" typeface="Kalinga"/>
+        <a:font script="Mlym" typeface="Kartika"/>
+        <a:font script="Laoo" typeface="DokChampa"/>
+        <a:font script="Sinh" typeface="Iskoola Pota"/>
+        <a:font script="Mong" typeface="Mongolian Baiti"/>
+        <a:font script="Viet" typeface="Arial"/>
+        <a:font script="Uigh" typeface="Microsoft Uighur"/>
+        <a:font script="Geor" typeface="Sylfaen"/>
+        <a:font script="Armn" typeface="Arial"/>
+        <a:font script="Bugi" typeface="Leelawadee UI"/>
+        <a:font script="Bopo" typeface="Microsoft JhengHei"/>
+        <a:font script="Java" typeface="Javanese Text"/>
+        <a:font script="Lisu" typeface="Segoe UI"/>
+        <a:font script="Mymr" typeface="Myanmar Text"/>
+        <a:font script="Nkoo" typeface="Ebrima"/>
+        <a:font script="Olck" typeface="Nirmala UI"/>
+        <a:font script="Osma" typeface="Ebrima"/>
+        <a:font script="Phag" typeface="Phagspa"/>
+        <a:font script="Syrn" typeface="Estrangelo Edessa"/>
+        <a:font script="Syrj" typeface="Estrangelo Edessa"/>
+        <a:font script="Syre" typeface="Estrangelo Edessa"/>
+        <a:font script="Sora" typeface="Nirmala UI"/>
+        <a:font script="Tale" typeface="Microsoft Tai Le"/>
+        <a:font script="Talu" typeface="Microsoft New Tai Lue"/>
+        <a:font script="Tfng" typeface="Ebrima"/>
+      </a:minorFont>
+    </a:fontScheme>
+    <a:fmtScheme name="Office">
+      <a:fillStyleLst>
+        <a:solidFill>
+          <a:schemeClr val="phClr"/>
+        </a:solidFill>
+        <a:gradFill rotWithShape="1">
+          <a:gsLst>
+            <a:gs pos="0">
+              <a:schemeClr val="phClr">
+                <a:lumMod val="110000"/>
+                <a:satMod val="105000"/>
+                <a:tint val="67000"/>
+              </a:schemeClr>
+            </a:gs>
+            <a:gs pos="50000">
+              <a:schemeClr val="phClr">
+                <a:lumMod val="105000"/>
+                <a:satMod val="103000"/>
+                <a:tint val="73000"/>
+              </a:schemeClr>
+            </a:gs>
+            <a:gs pos="100000">
+              <a:schemeClr val="phClr">
+                <a:lumMod val="105000"/>
+                <a:satMod val="109000"/>
+                <a:tint val="81000"/>
+              </a:schemeClr>
+            </a:gs>
+          </a:gsLst>
+          <a:lin ang="5400000" scaled="0"/>
+        </a:gradFill>
+        <a:gradFill rotWithShape="1">
+          <a:gsLst>
+            <a:gs pos="0">
+              <a:schemeClr val="phClr">
+                <a:satMod val="103000"/>
+                <a:lumMod val="102000"/>
+                <a:tint val="94000"/>
+              </a:schemeClr>
+            </a:gs>
+            <a:gs pos="50000">
+              <a:schemeClr val="phClr">
+                <a:satMod val="110000"/>
+                <a:lumMod val="100000"/>
+                <a:shade val="100000"/>
+              </a:schemeClr>
+            </a:gs>
+            <a:gs pos="100000">
+              <a:schemeClr val="phClr">
+                <a:lumMod val="99000"/>
+                <a:satMod val="120000"/>
+                <a:shade val="78000"/>
+              </a:schemeClr>
+            </a:gs>
+          </a:gsLst>
+          <a:lin ang="5400000" scaled="0"/>
+        </a:gradFill>
+      </a:fillStyleLst>
+      <a:lnStyleLst>
+        <a:ln w="6350" cap="flat" cmpd="sng" algn="ctr">
+          <a:solidFill>
+            <a:schemeClr val="phClr"/>
+          </a:solidFill>
+          <a:prstDash val="solid"/>
+          <a:miter lim="800000"/>
+        </a:ln>
+        <a:ln w="12700" cap="flat" cmpd="sng" algn="ctr">
+          <a:solidFill>
+            <a:schemeClr val="phClr"/>
+          </a:solidFill>
+          <a:prstDash val="solid"/>
+          <a:miter lim="800000"/>
+        </a:ln>
+        <a:ln w="19050" cap="flat" cmpd="sng" algn="ctr">
+          <a:solidFill>
+            <a:schemeClr val="phClr"/>
+          </a:solidFill>
+          <a:prstDash val="solid"/>
+          <a:miter lim="800000"/>
+        </a:ln>
+      </a:lnStyleLst>
+      <a:effectStyleLst>
+        <a:effectStyle>
+          <a:effectLst/>
+        </a:effectStyle>
+        <a:effectStyle>
+          <a:effectLst/>
+        </a:effectStyle>
+        <a:effectStyle>
+          <a:effectLst>
+            <a:outerShdw blurRad="57150" dist="19050" dir="5400000" algn="ctr" rotWithShape="0">
+              <a:srgbClr val="000000">
+                <a:alpha val="63000"/>
+              </a:srgbClr>
+            </a:outerShdw>
+          </a:effectLst>
+        </a:effectStyle>
+      </a:effectStyleLst>
+      <a:bgFillStyleLst>
+        <a:solidFill>
+          <a:schemeClr val="phClr"/>
+        </a:solidFill>
+        <a:solidFill>
+          <a:schemeClr val="phClr">
+            <a:tint val="95000"/>
+            <a:satMod val="170000"/>
+          </a:schemeClr>
+        </a:solidFill>
+        <a:gradFill rotWithShape="1">
+          <a:gsLst>
+            <a:gs pos="0">
+              <a:schemeClr val="phClr">
+                <a:tint val="93000"/>
+                <a:satMod val="150000"/>
+                <a:shade val="98000"/>
+                <a:lumMod val="102000"/>
+              </a:schemeClr>
+            </a:gs>
+            <a:gs pos="50000">
+              <a:schemeClr val="phClr">
+                <a:tint val="98000"/>
+                <a:satMod val="130000"/>
+                <a:shade val="90000"/>
+                <a:lumMod val="103000"/>
+              </a:schemeClr>
+            </a:gs>
+            <a:gs pos="100000">
+              <a:schemeClr val="phClr">
+                <a:shade val="63000"/>
+                <a:satMod val="120000"/>
+              </a:schemeClr>
+            </a:gs>
+          </a:gsLst>
+          <a:lin ang="5400000" scaled="0"/>
+        </a:gradFill>
+      </a:bgFillStyleLst>
+    </a:fmtScheme>
+  </a:themeElements>
+  <a:objectDefaults/>
+  <a:extraClrSchemeLst/>
+  <a:extLst>
+    <a:ext uri="{05A4C25C-085E-4340-85A3-A5531E510DB2}">
+      <thm15:themeFamily xmlns:thm15="http://schemas.microsoft.com/office/thememl/2012/main" name="Office Theme" id="{62F939B6-93AF-4DB8-9C6B-D6C7DFDC589F}" vid="{4A3C46E8-61CC-4603-A589-7422A47A8E4A}"/>
+    </a:ext>
+  </a:extLst>
+</a:theme>
 </file>
</xml_diff>

<commit_message>
changing desing for slide
</commit_message>
<xml_diff>
--- a/assets/archivo.pptx
+++ b/assets/archivo.pptx
@@ -4,9 +4,6 @@
   <p:sldMasterIdLst>
     <p:sldMasterId id="2147483648" r:id="rId1"/>
   </p:sldMasterIdLst>
-  <p:notesMasterIdLst>
-    <p:notesMasterId r:id="rId24"/>
-  </p:notesMasterIdLst>
   <p:sldIdLst>
     <p:sldId id="256" r:id="rId2"/>
     <p:sldId id="257" r:id="rId3"/>
@@ -31,6 +28,9 @@
     <p:sldId id="276" r:id="rId22"/>
     <p:sldId id="277" r:id="rId23"/>
   </p:sldIdLst>
+  <p:notesMasterIdLst>
+    <p:notesMasterId r:id="rId24"/>
+  </p:notesMasterIdLst>
   <p:sldSz cx="7772400" cy="10058400"/>
   <p:notesSz cx="10058400" cy="7772400"/>
   <p:defaultTextStyle>
@@ -125,11 +125,6 @@
       </a:defRPr>
     </a:lvl9pPr>
   </p:defaultTextStyle>
-  <p:extLst>
-    <p:ext uri="{EFAFB233-063F-42B5-8137-9DF3F51BA10A}">
-      <p15:sldGuideLst xmlns:p15="http://schemas.microsoft.com/office/powerpoint/2012/main"/>
-    </p:ext>
-  </p:extLst>
 </p:presentation>
 </file>
 
@@ -155,10 +150,234 @@
           <a:chExt cx="0" cy="0"/>
         </a:xfrm>
       </p:grpSpPr>
+      <p:sp>
+        <p:nvSpPr>
+          <p:cNvPr id="2" name="Header Placeholder 1"/>
+          <p:cNvSpPr>
+            <a:spLocks noGrp="1"/>
+          </p:cNvSpPr>
+          <p:nvPr>
+            <p:ph type="hdr" sz="quarter"/>
+          </p:nvPr>
+        </p:nvSpPr>
+        <p:spPr>
+          <a:xfrm>
+            <a:off x="0" y="0"/>
+            <a:ext cx="2971800" cy="458788"/>
+          </a:xfrm>
+          <a:prstGeom prst="rect">
+            <a:avLst/>
+          </a:prstGeom>
+        </p:spPr>
+        <p:txBody>
+          <a:bodyPr vert="horz" lIns="91440" tIns="45720" rIns="91440" bIns="45720" rtlCol="0"/>
+          <a:lstStyle>
+            <a:lvl1pPr algn="l">
+              <a:defRPr sz="1200"/>
+            </a:lvl1pPr>
+          </a:lstStyle>
+          <a:p>
+            <a:endParaRPr lang="en-US"/>
+          </a:p>
+        </p:txBody>
+      </p:sp>
+      <p:sp>
+        <p:nvSpPr>
+          <p:cNvPr id="3" name="Date Placeholder 2"/>
+          <p:cNvSpPr>
+            <a:spLocks noGrp="1"/>
+          </p:cNvSpPr>
+          <p:nvPr>
+            <p:ph type="dt" idx="1"/>
+          </p:nvPr>
+        </p:nvSpPr>
+        <p:spPr>
+          <a:xfrm>
+            <a:off x="3884613" y="0"/>
+            <a:ext cx="2971800" cy="458788"/>
+          </a:xfrm>
+          <a:prstGeom prst="rect">
+            <a:avLst/>
+          </a:prstGeom>
+        </p:spPr>
+        <p:txBody>
+          <a:bodyPr vert="horz" lIns="91440" tIns="45720" rIns="91440" bIns="45720" rtlCol="0"/>
+          <a:lstStyle>
+            <a:lvl1pPr algn="r">
+              <a:defRPr sz="1200"/>
+            </a:lvl1pPr>
+          </a:lstStyle>
+          <a:p>
+            <a:fld id="{5282F153-3F37-0F45-9E97-73ACFA13230C}" type="datetimeFigureOut">
+              <a:rPr lang="en-US"/>
+              <a:t>7/23/19</a:t>
+            </a:fld>
+            <a:endParaRPr lang="en-US"/>
+          </a:p>
+        </p:txBody>
+      </p:sp>
+      <p:sp>
+        <p:nvSpPr>
+          <p:cNvPr id="4" name="Slide Image Placeholder 3"/>
+          <p:cNvSpPr>
+            <a:spLocks noGrp="1" noRot="1" noChangeAspect="1"/>
+          </p:cNvSpPr>
+          <p:nvPr>
+            <p:ph type="sldImg" idx="2"/>
+          </p:nvPr>
+        </p:nvSpPr>
+        <p:spPr>
+          <a:xfrm>
+            <a:off x="685800" y="1143000"/>
+            <a:ext cx="5486400" cy="3086100"/>
+          </a:xfrm>
+          <a:prstGeom prst="rect">
+            <a:avLst/>
+          </a:prstGeom>
+          <a:noFill/>
+          <a:ln w="12700">
+            <a:solidFill>
+              <a:prstClr val="black"/>
+            </a:solidFill>
+          </a:ln>
+        </p:spPr>
+        <p:txBody>
+          <a:bodyPr vert="horz" lIns="91440" tIns="45720" rIns="91440" bIns="45720" rtlCol="0" anchor="ctr"/>
+          <a:lstStyle/>
+          <a:p>
+            <a:endParaRPr lang="en-US"/>
+          </a:p>
+        </p:txBody>
+      </p:sp>
+      <p:sp>
+        <p:nvSpPr>
+          <p:cNvPr id="5" name="Notes Placeholder 4"/>
+          <p:cNvSpPr>
+            <a:spLocks noGrp="1"/>
+          </p:cNvSpPr>
+          <p:nvPr>
+            <p:ph type="body" sz="quarter" idx="3"/>
+          </p:nvPr>
+        </p:nvSpPr>
+        <p:spPr>
+          <a:xfrm>
+            <a:off x="685800" y="4400550"/>
+            <a:ext cx="5486400" cy="3600450"/>
+          </a:xfrm>
+          <a:prstGeom prst="rect">
+            <a:avLst/>
+          </a:prstGeom>
+        </p:spPr>
+        <p:txBody>
+          <a:bodyPr vert="horz" lIns="91440" tIns="45720" rIns="91440" bIns="45720" rtlCol="0"/>
+          <a:lstStyle/>
+          <a:p>
+            <a:pPr lvl="0"/>
+            <a:r>
+              <a:rPr lang="en-US"/>
+              <a:t>Click to edit Master text styles</a:t>
+            </a:r>
+          </a:p>
+          <a:p>
+            <a:pPr lvl="1"/>
+            <a:r>
+              <a:rPr lang="en-US"/>
+              <a:t>Second level</a:t>
+            </a:r>
+          </a:p>
+          <a:p>
+            <a:pPr lvl="2"/>
+            <a:r>
+              <a:rPr lang="en-US"/>
+              <a:t>Third level</a:t>
+            </a:r>
+          </a:p>
+          <a:p>
+            <a:pPr lvl="3"/>
+            <a:r>
+              <a:rPr lang="en-US"/>
+              <a:t>Fourth level</a:t>
+            </a:r>
+          </a:p>
+          <a:p>
+            <a:pPr lvl="4"/>
+            <a:r>
+              <a:rPr lang="en-US"/>
+              <a:t>Fifth level</a:t>
+            </a:r>
+          </a:p>
+        </p:txBody>
+      </p:sp>
+      <p:sp>
+        <p:nvSpPr>
+          <p:cNvPr id="6" name="Footer Placeholder 5"/>
+          <p:cNvSpPr>
+            <a:spLocks noGrp="1"/>
+          </p:cNvSpPr>
+          <p:nvPr>
+            <p:ph type="ftr" sz="quarter" idx="4"/>
+          </p:nvPr>
+        </p:nvSpPr>
+        <p:spPr>
+          <a:xfrm>
+            <a:off x="0" y="8685213"/>
+            <a:ext cx="2971800" cy="458787"/>
+          </a:xfrm>
+          <a:prstGeom prst="rect">
+            <a:avLst/>
+          </a:prstGeom>
+        </p:spPr>
+        <p:txBody>
+          <a:bodyPr vert="horz" lIns="91440" tIns="45720" rIns="91440" bIns="45720" rtlCol="0" anchor="b"/>
+          <a:lstStyle>
+            <a:lvl1pPr algn="l">
+              <a:defRPr sz="1200"/>
+            </a:lvl1pPr>
+          </a:lstStyle>
+          <a:p>
+            <a:endParaRPr lang="en-US"/>
+          </a:p>
+        </p:txBody>
+      </p:sp>
+      <p:sp>
+        <p:nvSpPr>
+          <p:cNvPr id="7" name="Slide Number Placeholder 6"/>
+          <p:cNvSpPr>
+            <a:spLocks noGrp="1"/>
+          </p:cNvSpPr>
+          <p:nvPr>
+            <p:ph type="sldNum" sz="quarter" idx="5"/>
+          </p:nvPr>
+        </p:nvSpPr>
+        <p:spPr>
+          <a:xfrm>
+            <a:off x="3884613" y="8685213"/>
+            <a:ext cx="2971800" cy="458787"/>
+          </a:xfrm>
+          <a:prstGeom prst="rect">
+            <a:avLst/>
+          </a:prstGeom>
+        </p:spPr>
+        <p:txBody>
+          <a:bodyPr vert="horz" lIns="91440" tIns="45720" rIns="91440" bIns="45720" rtlCol="0" anchor="b"/>
+          <a:lstStyle>
+            <a:lvl1pPr algn="r">
+              <a:defRPr sz="1200"/>
+            </a:lvl1pPr>
+          </a:lstStyle>
+          <a:p>
+            <a:fld id="{CE5E9CC1-C706-0F49-92D6-E571CC5EEA8F}" type="slidenum">
+              <a:rPr lang="en-US"/>
+              <a:t>‹#›</a:t>
+            </a:fld>
+            <a:endParaRPr lang="en-US"/>
+          </a:p>
+        </p:txBody>
+      </p:sp>
     </p:spTree>
     <p:extLst>
       <p:ext uri="{BB962C8B-B14F-4D97-AF65-F5344CB8AC3E}">
-        <p14:creationId xmlns:p14="http://schemas.microsoft.com/office/powerpoint/2010/main" val="2182764328"/>
+        <p14:creationId xmlns:p14="http://schemas.microsoft.com/office/powerpoint/2010/main" val="1024086991"/>
       </p:ext>
     </p:extLst>
   </p:cSld>
@@ -302,6 +521,10 @@
           <a:bodyPr/>
           <a:lstStyle/>
           <a:p>
+            <a:r>
+              <a:rPr lang="en-US" dirty="0"/>
+              <a:t/>
+            </a:r>
             <a:endParaRPr lang="en-US" dirty="0"/>
           </a:p>
         </p:txBody>
@@ -386,6 +609,10 @@
           <a:bodyPr/>
           <a:lstStyle/>
           <a:p>
+            <a:r>
+              <a:rPr lang="en-US" dirty="0"/>
+              <a:t/>
+            </a:r>
             <a:endParaRPr lang="en-US" dirty="0"/>
           </a:p>
         </p:txBody>
@@ -470,6 +697,10 @@
           <a:bodyPr/>
           <a:lstStyle/>
           <a:p>
+            <a:r>
+              <a:rPr lang="en-US" dirty="0"/>
+              <a:t/>
+            </a:r>
             <a:endParaRPr lang="en-US" dirty="0"/>
           </a:p>
         </p:txBody>
@@ -554,6 +785,10 @@
           <a:bodyPr/>
           <a:lstStyle/>
           <a:p>
+            <a:r>
+              <a:rPr lang="en-US" dirty="0"/>
+              <a:t/>
+            </a:r>
             <a:endParaRPr lang="en-US" dirty="0"/>
           </a:p>
         </p:txBody>
@@ -638,6 +873,10 @@
           <a:bodyPr/>
           <a:lstStyle/>
           <a:p>
+            <a:r>
+              <a:rPr lang="en-US" dirty="0"/>
+              <a:t/>
+            </a:r>
             <a:endParaRPr lang="en-US" dirty="0"/>
           </a:p>
         </p:txBody>
@@ -722,6 +961,10 @@
           <a:bodyPr/>
           <a:lstStyle/>
           <a:p>
+            <a:r>
+              <a:rPr lang="en-US" dirty="0"/>
+              <a:t/>
+            </a:r>
             <a:endParaRPr lang="en-US" dirty="0"/>
           </a:p>
         </p:txBody>
@@ -806,6 +1049,10 @@
           <a:bodyPr/>
           <a:lstStyle/>
           <a:p>
+            <a:r>
+              <a:rPr lang="en-US" dirty="0"/>
+              <a:t/>
+            </a:r>
             <a:endParaRPr lang="en-US" dirty="0"/>
           </a:p>
         </p:txBody>
@@ -890,6 +1137,10 @@
           <a:bodyPr/>
           <a:lstStyle/>
           <a:p>
+            <a:r>
+              <a:rPr lang="en-US" dirty="0"/>
+              <a:t/>
+            </a:r>
             <a:endParaRPr lang="en-US" dirty="0"/>
           </a:p>
         </p:txBody>
@@ -974,6 +1225,10 @@
           <a:bodyPr/>
           <a:lstStyle/>
           <a:p>
+            <a:r>
+              <a:rPr lang="en-US" dirty="0"/>
+              <a:t/>
+            </a:r>
             <a:endParaRPr lang="en-US" dirty="0"/>
           </a:p>
         </p:txBody>
@@ -1058,6 +1313,10 @@
           <a:bodyPr/>
           <a:lstStyle/>
           <a:p>
+            <a:r>
+              <a:rPr lang="en-US" dirty="0"/>
+              <a:t/>
+            </a:r>
             <a:endParaRPr lang="en-US" dirty="0"/>
           </a:p>
         </p:txBody>
@@ -1142,6 +1401,10 @@
           <a:bodyPr/>
           <a:lstStyle/>
           <a:p>
+            <a:r>
+              <a:rPr lang="en-US" dirty="0"/>
+              <a:t/>
+            </a:r>
             <a:endParaRPr lang="en-US" dirty="0"/>
           </a:p>
         </p:txBody>
@@ -1226,6 +1489,10 @@
           <a:bodyPr/>
           <a:lstStyle/>
           <a:p>
+            <a:r>
+              <a:rPr lang="en-US" dirty="0"/>
+              <a:t/>
+            </a:r>
             <a:endParaRPr lang="en-US" dirty="0"/>
           </a:p>
         </p:txBody>
@@ -1310,6 +1577,10 @@
           <a:bodyPr/>
           <a:lstStyle/>
           <a:p>
+            <a:r>
+              <a:rPr lang="en-US" dirty="0"/>
+              <a:t/>
+            </a:r>
             <a:endParaRPr lang="en-US" dirty="0"/>
           </a:p>
         </p:txBody>
@@ -1394,6 +1665,10 @@
           <a:bodyPr/>
           <a:lstStyle/>
           <a:p>
+            <a:r>
+              <a:rPr lang="en-US" dirty="0"/>
+              <a:t/>
+            </a:r>
             <a:endParaRPr lang="en-US" dirty="0"/>
           </a:p>
         </p:txBody>
@@ -1478,6 +1753,10 @@
           <a:bodyPr/>
           <a:lstStyle/>
           <a:p>
+            <a:r>
+              <a:rPr lang="en-US" dirty="0"/>
+              <a:t/>
+            </a:r>
             <a:endParaRPr lang="en-US" dirty="0"/>
           </a:p>
         </p:txBody>
@@ -1562,6 +1841,10 @@
           <a:bodyPr/>
           <a:lstStyle/>
           <a:p>
+            <a:r>
+              <a:rPr lang="en-US" dirty="0"/>
+              <a:t/>
+            </a:r>
             <a:endParaRPr lang="en-US" dirty="0"/>
           </a:p>
         </p:txBody>
@@ -1646,6 +1929,10 @@
           <a:bodyPr/>
           <a:lstStyle/>
           <a:p>
+            <a:r>
+              <a:rPr lang="en-US" dirty="0"/>
+              <a:t/>
+            </a:r>
             <a:endParaRPr lang="en-US" dirty="0"/>
           </a:p>
         </p:txBody>
@@ -1730,6 +2017,10 @@
           <a:bodyPr/>
           <a:lstStyle/>
           <a:p>
+            <a:r>
+              <a:rPr lang="en-US" dirty="0"/>
+              <a:t/>
+            </a:r>
             <a:endParaRPr lang="en-US" dirty="0"/>
           </a:p>
         </p:txBody>
@@ -1814,6 +2105,10 @@
           <a:bodyPr/>
           <a:lstStyle/>
           <a:p>
+            <a:r>
+              <a:rPr lang="en-US" dirty="0"/>
+              <a:t/>
+            </a:r>
             <a:endParaRPr lang="en-US" dirty="0"/>
           </a:p>
         </p:txBody>
@@ -1898,6 +2193,10 @@
           <a:bodyPr/>
           <a:lstStyle/>
           <a:p>
+            <a:r>
+              <a:rPr lang="en-US" dirty="0"/>
+              <a:t/>
+            </a:r>
             <a:endParaRPr lang="en-US" dirty="0"/>
           </a:p>
         </p:txBody>
@@ -1982,6 +2281,10 @@
           <a:bodyPr/>
           <a:lstStyle/>
           <a:p>
+            <a:r>
+              <a:rPr lang="en-US" dirty="0"/>
+              <a:t/>
+            </a:r>
             <a:endParaRPr lang="en-US" dirty="0"/>
           </a:p>
         </p:txBody>
@@ -2066,6 +2369,10 @@
           <a:bodyPr/>
           <a:lstStyle/>
           <a:p>
+            <a:r>
+              <a:rPr lang="en-US" dirty="0"/>
+              <a:t/>
+            </a:r>
             <a:endParaRPr lang="en-US" dirty="0"/>
           </a:p>
         </p:txBody>
@@ -2139,11 +2446,6 @@
 <file path=ppt/slideMasters/slideMaster1.xml><?xml version="1.0" encoding="utf-8"?>
 <p:sldMaster xmlns:a="http://schemas.openxmlformats.org/drawingml/2006/main" xmlns:r="http://schemas.openxmlformats.org/officeDocument/2006/relationships" xmlns:p="http://schemas.openxmlformats.org/presentationml/2006/main">
   <p:cSld>
-    <p:bg>
-      <p:bgRef idx="1001">
-        <a:schemeClr val="bg1"/>
-      </p:bgRef>
-    </p:bg>
     <p:spTree>
       <p:nvGrpSpPr>
         <p:cNvPr id="1" name=""/>
@@ -2426,7 +2728,6 @@
         <a:solidFill>
           <a:srgbClr val="616161"/>
         </a:solidFill>
-        <a:effectLst/>
       </p:bgPr>
     </p:bg>
     <p:spTree>
@@ -2451,7 +2752,7 @@
         </p:nvSpPr>
         <p:spPr>
           <a:xfrm>
-            <a:off x="457200" y="457200"/>
+            <a:off x="274320" y="2286000"/>
             <a:ext cx="5829300" cy="0"/>
           </a:xfrm>
           <a:prstGeom prst="rect">
@@ -2464,7 +2765,7 @@
           <a:bodyPr wrap="square" rtlCol="0" anchor="ctr"/>
           <a:lstStyle/>
           <a:p>
-            <a:pPr marL="0" indent="0" algn="l">
+            <a:pPr algn="l" indent="0" marL="0">
               <a:buNone/>
             </a:pPr>
             <a:r>
@@ -2473,8 +2774,11 @@
                   <a:srgbClr val="F39200"/>
                 </a:solidFill>
               </a:rPr>
-              <a:t>8. </a:t>
-            </a:r>
+              <a:t>1. </a:t>
+            </a:r>
+            <a:pPr algn="l" indent="0" marL="0">
+              <a:buNone/>
+            </a:pPr>
             <a:r>
               <a:rPr lang="en-US" sz="1400" dirty="0">
                 <a:solidFill>
@@ -2495,7 +2799,7 @@
         </p:nvSpPr>
         <p:spPr>
           <a:xfrm>
-            <a:off x="457200" y="5029200"/>
+            <a:off x="274320" y="5029200"/>
             <a:ext cx="5829300" cy="0"/>
           </a:xfrm>
           <a:prstGeom prst="rect">
@@ -2508,7 +2812,7 @@
           <a:bodyPr wrap="square" rtlCol="0" anchor="ctr"/>
           <a:lstStyle/>
           <a:p>
-            <a:pPr marL="0" indent="0" algn="l">
+            <a:pPr algn="l" indent="0" marL="0">
               <a:buNone/>
             </a:pPr>
             <a:r>
@@ -2517,8 +2821,11 @@
                   <a:srgbClr val="F39200"/>
                 </a:solidFill>
               </a:rPr>
-              <a:t>9. </a:t>
-            </a:r>
+              <a:t>2. </a:t>
+            </a:r>
+            <a:pPr algn="l" indent="0" marL="0">
+              <a:buNone/>
+            </a:pPr>
             <a:r>
               <a:rPr lang="en-US" sz="1400" dirty="0">
                 <a:solidFill>
@@ -2526,6 +2833,82 @@
                 </a:solidFill>
               </a:rPr>
               <a:t>CAMBIAR FILTRO DE A/C</a:t>
+            </a:r>
+            <a:endParaRPr lang="en-US" sz="1400" dirty="0"/>
+          </a:p>
+        </p:txBody>
+      </p:sp>
+      <p:sp>
+        <p:nvSpPr>
+          <p:cNvPr id="4" name="Shape 2"/>
+          <p:cNvSpPr/>
+          <p:nvPr/>
+        </p:nvSpPr>
+        <p:spPr>
+          <a:xfrm>
+            <a:off x="457200" y="731520"/>
+            <a:ext cx="6766560" cy="45720"/>
+          </a:xfrm>
+          <a:prstGeom prst="rect">
+            <a:avLst/>
+          </a:prstGeom>
+          <a:solidFill>
+            <a:srgbClr val="F39200"/>
+          </a:solidFill>
+          <a:ln/>
+        </p:spPr>
+      </p:sp>
+      <p:sp>
+        <p:nvSpPr>
+          <p:cNvPr id="5" name="Shape 3"/>
+          <p:cNvSpPr/>
+          <p:nvPr/>
+        </p:nvSpPr>
+        <p:spPr>
+          <a:xfrm>
+            <a:off x="0" y="9692640"/>
+            <a:ext cx="7772400" cy="210312"/>
+          </a:xfrm>
+          <a:prstGeom prst="rect">
+            <a:avLst/>
+          </a:prstGeom>
+          <a:solidFill>
+            <a:srgbClr val="F39200"/>
+          </a:solidFill>
+          <a:ln/>
+        </p:spPr>
+      </p:sp>
+      <p:sp>
+        <p:nvSpPr>
+          <p:cNvPr id="6" name="Text 4"/>
+          <p:cNvSpPr/>
+          <p:nvPr/>
+        </p:nvSpPr>
+        <p:spPr>
+          <a:xfrm>
+            <a:off x="1280160" y="9793224"/>
+            <a:ext cx="5829300" cy="0"/>
+          </a:xfrm>
+          <a:prstGeom prst="rect">
+            <a:avLst/>
+          </a:prstGeom>
+          <a:noFill/>
+          <a:ln/>
+        </p:spPr>
+        <p:txBody>
+          <a:bodyPr wrap="square" rtlCol="0" anchor="ctr"/>
+          <a:lstStyle/>
+          <a:p>
+            <a:pPr algn="r" indent="0" marL="0">
+              <a:buNone/>
+            </a:pPr>
+            <a:r>
+              <a:rPr lang="en-US" sz="1400" dirty="0">
+                <a:solidFill>
+                  <a:srgbClr val="FFFFFF"/>
+                </a:solidFill>
+              </a:rPr>
+              <a:t>Página 1 de 22</a:t>
             </a:r>
             <a:endParaRPr lang="en-US" sz="1400" dirty="0"/>
           </a:p>
@@ -2547,7 +2930,6 @@
         <a:solidFill>
           <a:srgbClr val="616161"/>
         </a:solidFill>
-        <a:effectLst/>
       </p:bgPr>
     </p:bg>
     <p:spTree>
@@ -2572,7 +2954,7 @@
         </p:nvSpPr>
         <p:spPr>
           <a:xfrm>
-            <a:off x="457200" y="457200"/>
+            <a:off x="274320" y="2286000"/>
             <a:ext cx="5829300" cy="0"/>
           </a:xfrm>
           <a:prstGeom prst="rect">
@@ -2585,7 +2967,7 @@
           <a:bodyPr wrap="square" rtlCol="0" anchor="ctr"/>
           <a:lstStyle/>
           <a:p>
-            <a:pPr marL="0" indent="0" algn="l">
+            <a:pPr algn="l" indent="0" marL="0">
               <a:buNone/>
             </a:pPr>
             <a:r>
@@ -2594,8 +2976,11 @@
                   <a:srgbClr val="F39200"/>
                 </a:solidFill>
               </a:rPr>
-              <a:t>26. </a:t>
-            </a:r>
+              <a:t>19. </a:t>
+            </a:r>
+            <a:pPr algn="l" indent="0" marL="0">
+              <a:buNone/>
+            </a:pPr>
             <a:r>
               <a:rPr lang="en-US" sz="1400" dirty="0">
                 <a:solidFill>
@@ -2616,7 +3001,7 @@
         </p:nvSpPr>
         <p:spPr>
           <a:xfrm>
-            <a:off x="457200" y="5029200"/>
+            <a:off x="274320" y="5029200"/>
             <a:ext cx="5829300" cy="0"/>
           </a:xfrm>
           <a:prstGeom prst="rect">
@@ -2629,7 +3014,7 @@
           <a:bodyPr wrap="square" rtlCol="0" anchor="ctr"/>
           <a:lstStyle/>
           <a:p>
-            <a:pPr marL="0" indent="0" algn="l">
+            <a:pPr algn="l" indent="0" marL="0">
               <a:buNone/>
             </a:pPr>
             <a:r>
@@ -2638,8 +3023,11 @@
                   <a:srgbClr val="F39200"/>
                 </a:solidFill>
               </a:rPr>
-              <a:t>27. </a:t>
-            </a:r>
+              <a:t>20. </a:t>
+            </a:r>
+            <a:pPr algn="l" indent="0" marL="0">
+              <a:buNone/>
+            </a:pPr>
             <a:r>
               <a:rPr lang="en-US" sz="1400" dirty="0">
                 <a:solidFill>
@@ -2647,6 +3035,82 @@
                 </a:solidFill>
               </a:rPr>
               <a:t>NORMALIZAR ESTANQUE CON CONTAMINACIÓN EXCESIVA Y LINEAS DE FLUJO TAPADAS</a:t>
+            </a:r>
+            <a:endParaRPr lang="en-US" sz="1400" dirty="0"/>
+          </a:p>
+        </p:txBody>
+      </p:sp>
+      <p:sp>
+        <p:nvSpPr>
+          <p:cNvPr id="4" name="Shape 2"/>
+          <p:cNvSpPr/>
+          <p:nvPr/>
+        </p:nvSpPr>
+        <p:spPr>
+          <a:xfrm>
+            <a:off x="457200" y="731520"/>
+            <a:ext cx="6766560" cy="45720"/>
+          </a:xfrm>
+          <a:prstGeom prst="rect">
+            <a:avLst/>
+          </a:prstGeom>
+          <a:solidFill>
+            <a:srgbClr val="F39200"/>
+          </a:solidFill>
+          <a:ln/>
+        </p:spPr>
+      </p:sp>
+      <p:sp>
+        <p:nvSpPr>
+          <p:cNvPr id="5" name="Shape 3"/>
+          <p:cNvSpPr/>
+          <p:nvPr/>
+        </p:nvSpPr>
+        <p:spPr>
+          <a:xfrm>
+            <a:off x="0" y="9692640"/>
+            <a:ext cx="7772400" cy="210312"/>
+          </a:xfrm>
+          <a:prstGeom prst="rect">
+            <a:avLst/>
+          </a:prstGeom>
+          <a:solidFill>
+            <a:srgbClr val="F39200"/>
+          </a:solidFill>
+          <a:ln/>
+        </p:spPr>
+      </p:sp>
+      <p:sp>
+        <p:nvSpPr>
+          <p:cNvPr id="6" name="Text 4"/>
+          <p:cNvSpPr/>
+          <p:nvPr/>
+        </p:nvSpPr>
+        <p:spPr>
+          <a:xfrm>
+            <a:off x="1280160" y="9793224"/>
+            <a:ext cx="5829300" cy="0"/>
+          </a:xfrm>
+          <a:prstGeom prst="rect">
+            <a:avLst/>
+          </a:prstGeom>
+          <a:noFill/>
+          <a:ln/>
+        </p:spPr>
+        <p:txBody>
+          <a:bodyPr wrap="square" rtlCol="0" anchor="ctr"/>
+          <a:lstStyle/>
+          <a:p>
+            <a:pPr algn="r" indent="0" marL="0">
+              <a:buNone/>
+            </a:pPr>
+            <a:r>
+              <a:rPr lang="en-US" sz="1400" dirty="0">
+                <a:solidFill>
+                  <a:srgbClr val="FFFFFF"/>
+                </a:solidFill>
+              </a:rPr>
+              <a:t>Página 10 de 22</a:t>
             </a:r>
             <a:endParaRPr lang="en-US" sz="1400" dirty="0"/>
           </a:p>
@@ -2668,7 +3132,6 @@
         <a:solidFill>
           <a:srgbClr val="616161"/>
         </a:solidFill>
-        <a:effectLst/>
       </p:bgPr>
     </p:bg>
     <p:spTree>
@@ -2693,7 +3156,7 @@
         </p:nvSpPr>
         <p:spPr>
           <a:xfrm>
-            <a:off x="457200" y="457200"/>
+            <a:off x="274320" y="2286000"/>
             <a:ext cx="5829300" cy="0"/>
           </a:xfrm>
           <a:prstGeom prst="rect">
@@ -2706,7 +3169,7 @@
           <a:bodyPr wrap="square" rtlCol="0" anchor="ctr"/>
           <a:lstStyle/>
           <a:p>
-            <a:pPr marL="0" indent="0" algn="l">
+            <a:pPr algn="l" indent="0" marL="0">
               <a:buNone/>
             </a:pPr>
             <a:r>
@@ -2715,8 +3178,11 @@
                   <a:srgbClr val="F39200"/>
                 </a:solidFill>
               </a:rPr>
-              <a:t>28. </a:t>
-            </a:r>
+              <a:t>21. </a:t>
+            </a:r>
+            <a:pPr algn="l" indent="0" marL="0">
+              <a:buNone/>
+            </a:pPr>
             <a:r>
               <a:rPr lang="en-US" sz="1400" dirty="0">
                 <a:solidFill>
@@ -2737,7 +3203,7 @@
         </p:nvSpPr>
         <p:spPr>
           <a:xfrm>
-            <a:off x="457200" y="5029200"/>
+            <a:off x="274320" y="5029200"/>
             <a:ext cx="5829300" cy="0"/>
           </a:xfrm>
           <a:prstGeom prst="rect">
@@ -2750,7 +3216,7 @@
           <a:bodyPr wrap="square" rtlCol="0" anchor="ctr"/>
           <a:lstStyle/>
           <a:p>
-            <a:pPr marL="0" indent="0" algn="l">
+            <a:pPr algn="l" indent="0" marL="0">
               <a:buNone/>
             </a:pPr>
             <a:r>
@@ -2759,8 +3225,11 @@
                   <a:srgbClr val="F39200"/>
                 </a:solidFill>
               </a:rPr>
-              <a:t>29. </a:t>
-            </a:r>
+              <a:t>22. </a:t>
+            </a:r>
+            <a:pPr algn="l" indent="0" marL="0">
+              <a:buNone/>
+            </a:pPr>
             <a:r>
               <a:rPr lang="en-US" sz="1400" dirty="0">
                 <a:solidFill>
@@ -2768,6 +3237,82 @@
                 </a:solidFill>
               </a:rPr>
               <a:t>REPONER 02 PORTACUÑAS RH Y LH</a:t>
+            </a:r>
+            <a:endParaRPr lang="en-US" sz="1400" dirty="0"/>
+          </a:p>
+        </p:txBody>
+      </p:sp>
+      <p:sp>
+        <p:nvSpPr>
+          <p:cNvPr id="4" name="Shape 2"/>
+          <p:cNvSpPr/>
+          <p:nvPr/>
+        </p:nvSpPr>
+        <p:spPr>
+          <a:xfrm>
+            <a:off x="457200" y="731520"/>
+            <a:ext cx="6766560" cy="45720"/>
+          </a:xfrm>
+          <a:prstGeom prst="rect">
+            <a:avLst/>
+          </a:prstGeom>
+          <a:solidFill>
+            <a:srgbClr val="F39200"/>
+          </a:solidFill>
+          <a:ln/>
+        </p:spPr>
+      </p:sp>
+      <p:sp>
+        <p:nvSpPr>
+          <p:cNvPr id="5" name="Shape 3"/>
+          <p:cNvSpPr/>
+          <p:nvPr/>
+        </p:nvSpPr>
+        <p:spPr>
+          <a:xfrm>
+            <a:off x="0" y="9692640"/>
+            <a:ext cx="7772400" cy="210312"/>
+          </a:xfrm>
+          <a:prstGeom prst="rect">
+            <a:avLst/>
+          </a:prstGeom>
+          <a:solidFill>
+            <a:srgbClr val="F39200"/>
+          </a:solidFill>
+          <a:ln/>
+        </p:spPr>
+      </p:sp>
+      <p:sp>
+        <p:nvSpPr>
+          <p:cNvPr id="6" name="Text 4"/>
+          <p:cNvSpPr/>
+          <p:nvPr/>
+        </p:nvSpPr>
+        <p:spPr>
+          <a:xfrm>
+            <a:off x="1280160" y="9793224"/>
+            <a:ext cx="5829300" cy="0"/>
+          </a:xfrm>
+          <a:prstGeom prst="rect">
+            <a:avLst/>
+          </a:prstGeom>
+          <a:noFill/>
+          <a:ln/>
+        </p:spPr>
+        <p:txBody>
+          <a:bodyPr wrap="square" rtlCol="0" anchor="ctr"/>
+          <a:lstStyle/>
+          <a:p>
+            <a:pPr algn="r" indent="0" marL="0">
+              <a:buNone/>
+            </a:pPr>
+            <a:r>
+              <a:rPr lang="en-US" sz="1400" dirty="0">
+                <a:solidFill>
+                  <a:srgbClr val="FFFFFF"/>
+                </a:solidFill>
+              </a:rPr>
+              <a:t>Página 11 de 22</a:t>
             </a:r>
             <a:endParaRPr lang="en-US" sz="1400" dirty="0"/>
           </a:p>
@@ -2789,7 +3334,6 @@
         <a:solidFill>
           <a:srgbClr val="616161"/>
         </a:solidFill>
-        <a:effectLst/>
       </p:bgPr>
     </p:bg>
     <p:spTree>
@@ -2814,7 +3358,7 @@
         </p:nvSpPr>
         <p:spPr>
           <a:xfrm>
-            <a:off x="457200" y="457200"/>
+            <a:off x="274320" y="2286000"/>
             <a:ext cx="5829300" cy="0"/>
           </a:xfrm>
           <a:prstGeom prst="rect">
@@ -2827,7 +3371,7 @@
           <a:bodyPr wrap="square" rtlCol="0" anchor="ctr"/>
           <a:lstStyle/>
           <a:p>
-            <a:pPr marL="0" indent="0" algn="l">
+            <a:pPr algn="l" indent="0" marL="0">
               <a:buNone/>
             </a:pPr>
             <a:r>
@@ -2836,8 +3380,11 @@
                   <a:srgbClr val="F39200"/>
                 </a:solidFill>
               </a:rPr>
-              <a:t>30. </a:t>
-            </a:r>
+              <a:t>23. </a:t>
+            </a:r>
+            <a:pPr algn="l" indent="0" marL="0">
+              <a:buNone/>
+            </a:pPr>
             <a:r>
               <a:rPr lang="en-US" sz="1400" dirty="0">
                 <a:solidFill>
@@ -2858,7 +3405,7 @@
         </p:nvSpPr>
         <p:spPr>
           <a:xfrm>
-            <a:off x="457200" y="5029200"/>
+            <a:off x="274320" y="5029200"/>
             <a:ext cx="5829300" cy="0"/>
           </a:xfrm>
           <a:prstGeom prst="rect">
@@ -2871,7 +3418,7 @@
           <a:bodyPr wrap="square" rtlCol="0" anchor="ctr"/>
           <a:lstStyle/>
           <a:p>
-            <a:pPr marL="0" indent="0" algn="l">
+            <a:pPr algn="l" indent="0" marL="0">
               <a:buNone/>
             </a:pPr>
             <a:r>
@@ -2880,8 +3427,11 @@
                   <a:srgbClr val="F39200"/>
                 </a:solidFill>
               </a:rPr>
-              <a:t>31. </a:t>
-            </a:r>
+              <a:t>24. </a:t>
+            </a:r>
+            <a:pPr algn="l" indent="0" marL="0">
+              <a:buNone/>
+            </a:pPr>
             <a:r>
               <a:rPr lang="en-US" sz="1400" dirty="0">
                 <a:solidFill>
@@ -2889,6 +3439,82 @@
                 </a:solidFill>
               </a:rPr>
               <a:t>REPARAR TAPABARROS LADO CHOFER SUELTO</a:t>
+            </a:r>
+            <a:endParaRPr lang="en-US" sz="1400" dirty="0"/>
+          </a:p>
+        </p:txBody>
+      </p:sp>
+      <p:sp>
+        <p:nvSpPr>
+          <p:cNvPr id="4" name="Shape 2"/>
+          <p:cNvSpPr/>
+          <p:nvPr/>
+        </p:nvSpPr>
+        <p:spPr>
+          <a:xfrm>
+            <a:off x="457200" y="731520"/>
+            <a:ext cx="6766560" cy="45720"/>
+          </a:xfrm>
+          <a:prstGeom prst="rect">
+            <a:avLst/>
+          </a:prstGeom>
+          <a:solidFill>
+            <a:srgbClr val="F39200"/>
+          </a:solidFill>
+          <a:ln/>
+        </p:spPr>
+      </p:sp>
+      <p:sp>
+        <p:nvSpPr>
+          <p:cNvPr id="5" name="Shape 3"/>
+          <p:cNvSpPr/>
+          <p:nvPr/>
+        </p:nvSpPr>
+        <p:spPr>
+          <a:xfrm>
+            <a:off x="0" y="9692640"/>
+            <a:ext cx="7772400" cy="210312"/>
+          </a:xfrm>
+          <a:prstGeom prst="rect">
+            <a:avLst/>
+          </a:prstGeom>
+          <a:solidFill>
+            <a:srgbClr val="F39200"/>
+          </a:solidFill>
+          <a:ln/>
+        </p:spPr>
+      </p:sp>
+      <p:sp>
+        <p:nvSpPr>
+          <p:cNvPr id="6" name="Text 4"/>
+          <p:cNvSpPr/>
+          <p:nvPr/>
+        </p:nvSpPr>
+        <p:spPr>
+          <a:xfrm>
+            <a:off x="1280160" y="9793224"/>
+            <a:ext cx="5829300" cy="0"/>
+          </a:xfrm>
+          <a:prstGeom prst="rect">
+            <a:avLst/>
+          </a:prstGeom>
+          <a:noFill/>
+          <a:ln/>
+        </p:spPr>
+        <p:txBody>
+          <a:bodyPr wrap="square" rtlCol="0" anchor="ctr"/>
+          <a:lstStyle/>
+          <a:p>
+            <a:pPr algn="r" indent="0" marL="0">
+              <a:buNone/>
+            </a:pPr>
+            <a:r>
+              <a:rPr lang="en-US" sz="1400" dirty="0">
+                <a:solidFill>
+                  <a:srgbClr val="FFFFFF"/>
+                </a:solidFill>
+              </a:rPr>
+              <a:t>Página 12 de 22</a:t>
             </a:r>
             <a:endParaRPr lang="en-US" sz="1400" dirty="0"/>
           </a:p>
@@ -2910,7 +3536,6 @@
         <a:solidFill>
           <a:srgbClr val="616161"/>
         </a:solidFill>
-        <a:effectLst/>
       </p:bgPr>
     </p:bg>
     <p:spTree>
@@ -2935,7 +3560,7 @@
         </p:nvSpPr>
         <p:spPr>
           <a:xfrm>
-            <a:off x="457200" y="457200"/>
+            <a:off x="274320" y="2286000"/>
             <a:ext cx="5829300" cy="0"/>
           </a:xfrm>
           <a:prstGeom prst="rect">
@@ -2948,7 +3573,7 @@
           <a:bodyPr wrap="square" rtlCol="0" anchor="ctr"/>
           <a:lstStyle/>
           <a:p>
-            <a:pPr marL="0" indent="0" algn="l">
+            <a:pPr algn="l" indent="0" marL="0">
               <a:buNone/>
             </a:pPr>
             <a:r>
@@ -2957,8 +3582,11 @@
                   <a:srgbClr val="F39200"/>
                 </a:solidFill>
               </a:rPr>
-              <a:t>32. </a:t>
-            </a:r>
+              <a:t>25. </a:t>
+            </a:r>
+            <a:pPr algn="l" indent="0" marL="0">
+              <a:buNone/>
+            </a:pPr>
             <a:r>
               <a:rPr lang="en-US" sz="1400" dirty="0">
                 <a:solidFill>
@@ -2979,7 +3607,7 @@
         </p:nvSpPr>
         <p:spPr>
           <a:xfrm>
-            <a:off x="457200" y="5029200"/>
+            <a:off x="274320" y="5029200"/>
             <a:ext cx="5829300" cy="0"/>
           </a:xfrm>
           <a:prstGeom prst="rect">
@@ -2992,7 +3620,7 @@
           <a:bodyPr wrap="square" rtlCol="0" anchor="ctr"/>
           <a:lstStyle/>
           <a:p>
-            <a:pPr marL="0" indent="0" algn="l">
+            <a:pPr algn="l" indent="0" marL="0">
               <a:buNone/>
             </a:pPr>
             <a:r>
@@ -3001,8 +3629,11 @@
                   <a:srgbClr val="F39200"/>
                 </a:solidFill>
               </a:rPr>
-              <a:t>33. </a:t>
-            </a:r>
+              <a:t>26. </a:t>
+            </a:r>
+            <a:pPr algn="l" indent="0" marL="0">
+              <a:buNone/>
+            </a:pPr>
             <a:r>
               <a:rPr lang="en-US" sz="1400" dirty="0">
                 <a:solidFill>
@@ -3010,6 +3641,82 @@
                 </a:solidFill>
               </a:rPr>
               <a:t>CAMBIO DE REFRIGERANTE (DRENAJE Y LLENADO)</a:t>
+            </a:r>
+            <a:endParaRPr lang="en-US" sz="1400" dirty="0"/>
+          </a:p>
+        </p:txBody>
+      </p:sp>
+      <p:sp>
+        <p:nvSpPr>
+          <p:cNvPr id="4" name="Shape 2"/>
+          <p:cNvSpPr/>
+          <p:nvPr/>
+        </p:nvSpPr>
+        <p:spPr>
+          <a:xfrm>
+            <a:off x="457200" y="731520"/>
+            <a:ext cx="6766560" cy="45720"/>
+          </a:xfrm>
+          <a:prstGeom prst="rect">
+            <a:avLst/>
+          </a:prstGeom>
+          <a:solidFill>
+            <a:srgbClr val="F39200"/>
+          </a:solidFill>
+          <a:ln/>
+        </p:spPr>
+      </p:sp>
+      <p:sp>
+        <p:nvSpPr>
+          <p:cNvPr id="5" name="Shape 3"/>
+          <p:cNvSpPr/>
+          <p:nvPr/>
+        </p:nvSpPr>
+        <p:spPr>
+          <a:xfrm>
+            <a:off x="0" y="9692640"/>
+            <a:ext cx="7772400" cy="210312"/>
+          </a:xfrm>
+          <a:prstGeom prst="rect">
+            <a:avLst/>
+          </a:prstGeom>
+          <a:solidFill>
+            <a:srgbClr val="F39200"/>
+          </a:solidFill>
+          <a:ln/>
+        </p:spPr>
+      </p:sp>
+      <p:sp>
+        <p:nvSpPr>
+          <p:cNvPr id="6" name="Text 4"/>
+          <p:cNvSpPr/>
+          <p:nvPr/>
+        </p:nvSpPr>
+        <p:spPr>
+          <a:xfrm>
+            <a:off x="1280160" y="9793224"/>
+            <a:ext cx="5829300" cy="0"/>
+          </a:xfrm>
+          <a:prstGeom prst="rect">
+            <a:avLst/>
+          </a:prstGeom>
+          <a:noFill/>
+          <a:ln/>
+        </p:spPr>
+        <p:txBody>
+          <a:bodyPr wrap="square" rtlCol="0" anchor="ctr"/>
+          <a:lstStyle/>
+          <a:p>
+            <a:pPr algn="r" indent="0" marL="0">
+              <a:buNone/>
+            </a:pPr>
+            <a:r>
+              <a:rPr lang="en-US" sz="1400" dirty="0">
+                <a:solidFill>
+                  <a:srgbClr val="FFFFFF"/>
+                </a:solidFill>
+              </a:rPr>
+              <a:t>Página 13 de 22</a:t>
             </a:r>
             <a:endParaRPr lang="en-US" sz="1400" dirty="0"/>
           </a:p>
@@ -3031,7 +3738,6 @@
         <a:solidFill>
           <a:srgbClr val="616161"/>
         </a:solidFill>
-        <a:effectLst/>
       </p:bgPr>
     </p:bg>
     <p:spTree>
@@ -3056,7 +3762,7 @@
         </p:nvSpPr>
         <p:spPr>
           <a:xfrm>
-            <a:off x="457200" y="457200"/>
+            <a:off x="274320" y="2286000"/>
             <a:ext cx="5829300" cy="0"/>
           </a:xfrm>
           <a:prstGeom prst="rect">
@@ -3069,7 +3775,7 @@
           <a:bodyPr wrap="square" rtlCol="0" anchor="ctr"/>
           <a:lstStyle/>
           <a:p>
-            <a:pPr marL="0" indent="0" algn="l">
+            <a:pPr algn="l" indent="0" marL="0">
               <a:buNone/>
             </a:pPr>
             <a:r>
@@ -3078,8 +3784,11 @@
                   <a:srgbClr val="F39200"/>
                 </a:solidFill>
               </a:rPr>
-              <a:t>34. </a:t>
-            </a:r>
+              <a:t>27. </a:t>
+            </a:r>
+            <a:pPr algn="l" indent="0" marL="0">
+              <a:buNone/>
+            </a:pPr>
             <a:r>
               <a:rPr lang="en-US" sz="1400" dirty="0">
                 <a:solidFill>
@@ -3100,7 +3809,7 @@
         </p:nvSpPr>
         <p:spPr>
           <a:xfrm>
-            <a:off x="457200" y="5029200"/>
+            <a:off x="274320" y="5029200"/>
             <a:ext cx="5829300" cy="0"/>
           </a:xfrm>
           <a:prstGeom prst="rect">
@@ -3113,7 +3822,7 @@
           <a:bodyPr wrap="square" rtlCol="0" anchor="ctr"/>
           <a:lstStyle/>
           <a:p>
-            <a:pPr marL="0" indent="0" algn="l">
+            <a:pPr algn="l" indent="0" marL="0">
               <a:buNone/>
             </a:pPr>
             <a:r>
@@ -3122,8 +3831,11 @@
                   <a:srgbClr val="F39200"/>
                 </a:solidFill>
               </a:rPr>
-              <a:t>35. </a:t>
-            </a:r>
+              <a:t>28. </a:t>
+            </a:r>
+            <a:pPr algn="l" indent="0" marL="0">
+              <a:buNone/>
+            </a:pPr>
             <a:r>
               <a:rPr lang="en-US" sz="1400" dirty="0">
                 <a:solidFill>
@@ -3131,6 +3843,82 @@
                 </a:solidFill>
               </a:rPr>
               <a:t>REPONER LLANTA Y NEUMATICO DE REPUESTO</a:t>
+            </a:r>
+            <a:endParaRPr lang="en-US" sz="1400" dirty="0"/>
+          </a:p>
+        </p:txBody>
+      </p:sp>
+      <p:sp>
+        <p:nvSpPr>
+          <p:cNvPr id="4" name="Shape 2"/>
+          <p:cNvSpPr/>
+          <p:nvPr/>
+        </p:nvSpPr>
+        <p:spPr>
+          <a:xfrm>
+            <a:off x="457200" y="731520"/>
+            <a:ext cx="6766560" cy="45720"/>
+          </a:xfrm>
+          <a:prstGeom prst="rect">
+            <a:avLst/>
+          </a:prstGeom>
+          <a:solidFill>
+            <a:srgbClr val="F39200"/>
+          </a:solidFill>
+          <a:ln/>
+        </p:spPr>
+      </p:sp>
+      <p:sp>
+        <p:nvSpPr>
+          <p:cNvPr id="5" name="Shape 3"/>
+          <p:cNvSpPr/>
+          <p:nvPr/>
+        </p:nvSpPr>
+        <p:spPr>
+          <a:xfrm>
+            <a:off x="0" y="9692640"/>
+            <a:ext cx="7772400" cy="210312"/>
+          </a:xfrm>
+          <a:prstGeom prst="rect">
+            <a:avLst/>
+          </a:prstGeom>
+          <a:solidFill>
+            <a:srgbClr val="F39200"/>
+          </a:solidFill>
+          <a:ln/>
+        </p:spPr>
+      </p:sp>
+      <p:sp>
+        <p:nvSpPr>
+          <p:cNvPr id="6" name="Text 4"/>
+          <p:cNvSpPr/>
+          <p:nvPr/>
+        </p:nvSpPr>
+        <p:spPr>
+          <a:xfrm>
+            <a:off x="1280160" y="9793224"/>
+            <a:ext cx="5829300" cy="0"/>
+          </a:xfrm>
+          <a:prstGeom prst="rect">
+            <a:avLst/>
+          </a:prstGeom>
+          <a:noFill/>
+          <a:ln/>
+        </p:spPr>
+        <p:txBody>
+          <a:bodyPr wrap="square" rtlCol="0" anchor="ctr"/>
+          <a:lstStyle/>
+          <a:p>
+            <a:pPr algn="r" indent="0" marL="0">
+              <a:buNone/>
+            </a:pPr>
+            <a:r>
+              <a:rPr lang="en-US" sz="1400" dirty="0">
+                <a:solidFill>
+                  <a:srgbClr val="FFFFFF"/>
+                </a:solidFill>
+              </a:rPr>
+              <a:t>Página 14 de 22</a:t>
             </a:r>
             <a:endParaRPr lang="en-US" sz="1400" dirty="0"/>
           </a:p>
@@ -3152,7 +3940,6 @@
         <a:solidFill>
           <a:srgbClr val="616161"/>
         </a:solidFill>
-        <a:effectLst/>
       </p:bgPr>
     </p:bg>
     <p:spTree>
@@ -3177,7 +3964,7 @@
         </p:nvSpPr>
         <p:spPr>
           <a:xfrm>
-            <a:off x="457200" y="457200"/>
+            <a:off x="274320" y="2286000"/>
             <a:ext cx="5829300" cy="0"/>
           </a:xfrm>
           <a:prstGeom prst="rect">
@@ -3190,7 +3977,7 @@
           <a:bodyPr wrap="square" rtlCol="0" anchor="ctr"/>
           <a:lstStyle/>
           <a:p>
-            <a:pPr marL="0" indent="0" algn="l">
+            <a:pPr algn="l" indent="0" marL="0">
               <a:buNone/>
             </a:pPr>
             <a:r>
@@ -3199,8 +3986,11 @@
                   <a:srgbClr val="F39200"/>
                 </a:solidFill>
               </a:rPr>
-              <a:t>36. </a:t>
-            </a:r>
+              <a:t>29. </a:t>
+            </a:r>
+            <a:pPr algn="l" indent="0" marL="0">
+              <a:buNone/>
+            </a:pPr>
             <a:r>
               <a:rPr lang="en-US" sz="1400" dirty="0">
                 <a:solidFill>
@@ -3221,7 +4011,7 @@
         </p:nvSpPr>
         <p:spPr>
           <a:xfrm>
-            <a:off x="457200" y="5029200"/>
+            <a:off x="274320" y="5029200"/>
             <a:ext cx="5829300" cy="0"/>
           </a:xfrm>
           <a:prstGeom prst="rect">
@@ -3234,7 +4024,7 @@
           <a:bodyPr wrap="square" rtlCol="0" anchor="ctr"/>
           <a:lstStyle/>
           <a:p>
-            <a:pPr marL="0" indent="0" algn="l">
+            <a:pPr algn="l" indent="0" marL="0">
               <a:buNone/>
             </a:pPr>
             <a:r>
@@ -3243,8 +4033,11 @@
                   <a:srgbClr val="F39200"/>
                 </a:solidFill>
               </a:rPr>
-              <a:t>37. </a:t>
-            </a:r>
+              <a:t>30. </a:t>
+            </a:r>
+            <a:pPr algn="l" indent="0" marL="0">
+              <a:buNone/>
+            </a:pPr>
             <a:r>
               <a:rPr lang="en-US" sz="1400" dirty="0">
                 <a:solidFill>
@@ -3252,6 +4045,82 @@
                 </a:solidFill>
               </a:rPr>
               <a:t>REPONER PERTIGA (EQUIPO SIN PERTIGA)</a:t>
+            </a:r>
+            <a:endParaRPr lang="en-US" sz="1400" dirty="0"/>
+          </a:p>
+        </p:txBody>
+      </p:sp>
+      <p:sp>
+        <p:nvSpPr>
+          <p:cNvPr id="4" name="Shape 2"/>
+          <p:cNvSpPr/>
+          <p:nvPr/>
+        </p:nvSpPr>
+        <p:spPr>
+          <a:xfrm>
+            <a:off x="457200" y="731520"/>
+            <a:ext cx="6766560" cy="45720"/>
+          </a:xfrm>
+          <a:prstGeom prst="rect">
+            <a:avLst/>
+          </a:prstGeom>
+          <a:solidFill>
+            <a:srgbClr val="F39200"/>
+          </a:solidFill>
+          <a:ln/>
+        </p:spPr>
+      </p:sp>
+      <p:sp>
+        <p:nvSpPr>
+          <p:cNvPr id="5" name="Shape 3"/>
+          <p:cNvSpPr/>
+          <p:nvPr/>
+        </p:nvSpPr>
+        <p:spPr>
+          <a:xfrm>
+            <a:off x="0" y="9692640"/>
+            <a:ext cx="7772400" cy="210312"/>
+          </a:xfrm>
+          <a:prstGeom prst="rect">
+            <a:avLst/>
+          </a:prstGeom>
+          <a:solidFill>
+            <a:srgbClr val="F39200"/>
+          </a:solidFill>
+          <a:ln/>
+        </p:spPr>
+      </p:sp>
+      <p:sp>
+        <p:nvSpPr>
+          <p:cNvPr id="6" name="Text 4"/>
+          <p:cNvSpPr/>
+          <p:nvPr/>
+        </p:nvSpPr>
+        <p:spPr>
+          <a:xfrm>
+            <a:off x="1280160" y="9793224"/>
+            <a:ext cx="5829300" cy="0"/>
+          </a:xfrm>
+          <a:prstGeom prst="rect">
+            <a:avLst/>
+          </a:prstGeom>
+          <a:noFill/>
+          <a:ln/>
+        </p:spPr>
+        <p:txBody>
+          <a:bodyPr wrap="square" rtlCol="0" anchor="ctr"/>
+          <a:lstStyle/>
+          <a:p>
+            <a:pPr algn="r" indent="0" marL="0">
+              <a:buNone/>
+            </a:pPr>
+            <a:r>
+              <a:rPr lang="en-US" sz="1400" dirty="0">
+                <a:solidFill>
+                  <a:srgbClr val="FFFFFF"/>
+                </a:solidFill>
+              </a:rPr>
+              <a:t>Página 15 de 22</a:t>
             </a:r>
             <a:endParaRPr lang="en-US" sz="1400" dirty="0"/>
           </a:p>
@@ -3273,7 +4142,6 @@
         <a:solidFill>
           <a:srgbClr val="616161"/>
         </a:solidFill>
-        <a:effectLst/>
       </p:bgPr>
     </p:bg>
     <p:spTree>
@@ -3298,7 +4166,7 @@
         </p:nvSpPr>
         <p:spPr>
           <a:xfrm>
-            <a:off x="457200" y="457200"/>
+            <a:off x="274320" y="2286000"/>
             <a:ext cx="5829300" cy="0"/>
           </a:xfrm>
           <a:prstGeom prst="rect">
@@ -3311,7 +4179,7 @@
           <a:bodyPr wrap="square" rtlCol="0" anchor="ctr"/>
           <a:lstStyle/>
           <a:p>
-            <a:pPr marL="0" indent="0" algn="l">
+            <a:pPr algn="l" indent="0" marL="0">
               <a:buNone/>
             </a:pPr>
             <a:r>
@@ -3320,8 +4188,11 @@
                   <a:srgbClr val="F39200"/>
                 </a:solidFill>
               </a:rPr>
-              <a:t>38. </a:t>
-            </a:r>
+              <a:t>31. </a:t>
+            </a:r>
+            <a:pPr algn="l" indent="0" marL="0">
+              <a:buNone/>
+            </a:pPr>
             <a:r>
               <a:rPr lang="en-US" sz="1400" dirty="0">
                 <a:solidFill>
@@ -3342,7 +4213,7 @@
         </p:nvSpPr>
         <p:spPr>
           <a:xfrm>
-            <a:off x="457200" y="5029200"/>
+            <a:off x="274320" y="5029200"/>
             <a:ext cx="5829300" cy="0"/>
           </a:xfrm>
           <a:prstGeom prst="rect">
@@ -3355,7 +4226,7 @@
           <a:bodyPr wrap="square" rtlCol="0" anchor="ctr"/>
           <a:lstStyle/>
           <a:p>
-            <a:pPr marL="0" indent="0" algn="l">
+            <a:pPr algn="l" indent="0" marL="0">
               <a:buNone/>
             </a:pPr>
             <a:r>
@@ -3364,8 +4235,11 @@
                   <a:srgbClr val="F39200"/>
                 </a:solidFill>
               </a:rPr>
-              <a:t>39. </a:t>
-            </a:r>
+              <a:t>32. </a:t>
+            </a:r>
+            <a:pPr algn="l" indent="0" marL="0">
+              <a:buNone/>
+            </a:pPr>
             <a:r>
               <a:rPr lang="en-US" sz="1400" dirty="0">
                 <a:solidFill>
@@ -3373,6 +4247,82 @@
                 </a:solidFill>
               </a:rPr>
               <a:t>NORMALIZAR SISTEMA ELÉCTRICO DE ESTANQUE</a:t>
+            </a:r>
+            <a:endParaRPr lang="en-US" sz="1400" dirty="0"/>
+          </a:p>
+        </p:txBody>
+      </p:sp>
+      <p:sp>
+        <p:nvSpPr>
+          <p:cNvPr id="4" name="Shape 2"/>
+          <p:cNvSpPr/>
+          <p:nvPr/>
+        </p:nvSpPr>
+        <p:spPr>
+          <a:xfrm>
+            <a:off x="457200" y="731520"/>
+            <a:ext cx="6766560" cy="45720"/>
+          </a:xfrm>
+          <a:prstGeom prst="rect">
+            <a:avLst/>
+          </a:prstGeom>
+          <a:solidFill>
+            <a:srgbClr val="F39200"/>
+          </a:solidFill>
+          <a:ln/>
+        </p:spPr>
+      </p:sp>
+      <p:sp>
+        <p:nvSpPr>
+          <p:cNvPr id="5" name="Shape 3"/>
+          <p:cNvSpPr/>
+          <p:nvPr/>
+        </p:nvSpPr>
+        <p:spPr>
+          <a:xfrm>
+            <a:off x="0" y="9692640"/>
+            <a:ext cx="7772400" cy="210312"/>
+          </a:xfrm>
+          <a:prstGeom prst="rect">
+            <a:avLst/>
+          </a:prstGeom>
+          <a:solidFill>
+            <a:srgbClr val="F39200"/>
+          </a:solidFill>
+          <a:ln/>
+        </p:spPr>
+      </p:sp>
+      <p:sp>
+        <p:nvSpPr>
+          <p:cNvPr id="6" name="Text 4"/>
+          <p:cNvSpPr/>
+          <p:nvPr/>
+        </p:nvSpPr>
+        <p:spPr>
+          <a:xfrm>
+            <a:off x="1280160" y="9793224"/>
+            <a:ext cx="5829300" cy="0"/>
+          </a:xfrm>
+          <a:prstGeom prst="rect">
+            <a:avLst/>
+          </a:prstGeom>
+          <a:noFill/>
+          <a:ln/>
+        </p:spPr>
+        <p:txBody>
+          <a:bodyPr wrap="square" rtlCol="0" anchor="ctr"/>
+          <a:lstStyle/>
+          <a:p>
+            <a:pPr algn="r" indent="0" marL="0">
+              <a:buNone/>
+            </a:pPr>
+            <a:r>
+              <a:rPr lang="en-US" sz="1400" dirty="0">
+                <a:solidFill>
+                  <a:srgbClr val="FFFFFF"/>
+                </a:solidFill>
+              </a:rPr>
+              <a:t>Página 16 de 22</a:t>
             </a:r>
             <a:endParaRPr lang="en-US" sz="1400" dirty="0"/>
           </a:p>
@@ -3394,7 +4344,6 @@
         <a:solidFill>
           <a:srgbClr val="616161"/>
         </a:solidFill>
-        <a:effectLst/>
       </p:bgPr>
     </p:bg>
     <p:spTree>
@@ -3419,7 +4368,7 @@
         </p:nvSpPr>
         <p:spPr>
           <a:xfrm>
-            <a:off x="457200" y="457200"/>
+            <a:off x="274320" y="2286000"/>
             <a:ext cx="5829300" cy="0"/>
           </a:xfrm>
           <a:prstGeom prst="rect">
@@ -3432,7 +4381,7 @@
           <a:bodyPr wrap="square" rtlCol="0" anchor="ctr"/>
           <a:lstStyle/>
           <a:p>
-            <a:pPr marL="0" indent="0" algn="l">
+            <a:pPr algn="l" indent="0" marL="0">
               <a:buNone/>
             </a:pPr>
             <a:r>
@@ -3441,8 +4390,11 @@
                   <a:srgbClr val="F39200"/>
                 </a:solidFill>
               </a:rPr>
-              <a:t>40. </a:t>
-            </a:r>
+              <a:t>33. </a:t>
+            </a:r>
+            <a:pPr algn="l" indent="0" marL="0">
+              <a:buNone/>
+            </a:pPr>
             <a:r>
               <a:rPr lang="en-US" sz="1400" dirty="0">
                 <a:solidFill>
@@ -3463,7 +4415,7 @@
         </p:nvSpPr>
         <p:spPr>
           <a:xfrm>
-            <a:off x="457200" y="5029200"/>
+            <a:off x="274320" y="5029200"/>
             <a:ext cx="5829300" cy="0"/>
           </a:xfrm>
           <a:prstGeom prst="rect">
@@ -3476,7 +4428,7 @@
           <a:bodyPr wrap="square" rtlCol="0" anchor="ctr"/>
           <a:lstStyle/>
           <a:p>
-            <a:pPr marL="0" indent="0" algn="l">
+            <a:pPr algn="l" indent="0" marL="0">
               <a:buNone/>
             </a:pPr>
             <a:r>
@@ -3485,8 +4437,11 @@
                   <a:srgbClr val="F39200"/>
                 </a:solidFill>
               </a:rPr>
-              <a:t>41. </a:t>
-            </a:r>
+              <a:t>34. </a:t>
+            </a:r>
+            <a:pPr algn="l" indent="0" marL="0">
+              <a:buNone/>
+            </a:pPr>
             <a:r>
               <a:rPr lang="en-US" sz="1400" dirty="0">
                 <a:solidFill>
@@ -3494,6 +4449,82 @@
                 </a:solidFill>
               </a:rPr>
               <a:t>RELLENAR HIDRÁULICO FALTANTE</a:t>
+            </a:r>
+            <a:endParaRPr lang="en-US" sz="1400" dirty="0"/>
+          </a:p>
+        </p:txBody>
+      </p:sp>
+      <p:sp>
+        <p:nvSpPr>
+          <p:cNvPr id="4" name="Shape 2"/>
+          <p:cNvSpPr/>
+          <p:nvPr/>
+        </p:nvSpPr>
+        <p:spPr>
+          <a:xfrm>
+            <a:off x="457200" y="731520"/>
+            <a:ext cx="6766560" cy="45720"/>
+          </a:xfrm>
+          <a:prstGeom prst="rect">
+            <a:avLst/>
+          </a:prstGeom>
+          <a:solidFill>
+            <a:srgbClr val="F39200"/>
+          </a:solidFill>
+          <a:ln/>
+        </p:spPr>
+      </p:sp>
+      <p:sp>
+        <p:nvSpPr>
+          <p:cNvPr id="5" name="Shape 3"/>
+          <p:cNvSpPr/>
+          <p:nvPr/>
+        </p:nvSpPr>
+        <p:spPr>
+          <a:xfrm>
+            <a:off x="0" y="9692640"/>
+            <a:ext cx="7772400" cy="210312"/>
+          </a:xfrm>
+          <a:prstGeom prst="rect">
+            <a:avLst/>
+          </a:prstGeom>
+          <a:solidFill>
+            <a:srgbClr val="F39200"/>
+          </a:solidFill>
+          <a:ln/>
+        </p:spPr>
+      </p:sp>
+      <p:sp>
+        <p:nvSpPr>
+          <p:cNvPr id="6" name="Text 4"/>
+          <p:cNvSpPr/>
+          <p:nvPr/>
+        </p:nvSpPr>
+        <p:spPr>
+          <a:xfrm>
+            <a:off x="1280160" y="9793224"/>
+            <a:ext cx="5829300" cy="0"/>
+          </a:xfrm>
+          <a:prstGeom prst="rect">
+            <a:avLst/>
+          </a:prstGeom>
+          <a:noFill/>
+          <a:ln/>
+        </p:spPr>
+        <p:txBody>
+          <a:bodyPr wrap="square" rtlCol="0" anchor="ctr"/>
+          <a:lstStyle/>
+          <a:p>
+            <a:pPr algn="r" indent="0" marL="0">
+              <a:buNone/>
+            </a:pPr>
+            <a:r>
+              <a:rPr lang="en-US" sz="1400" dirty="0">
+                <a:solidFill>
+                  <a:srgbClr val="FFFFFF"/>
+                </a:solidFill>
+              </a:rPr>
+              <a:t>Página 17 de 22</a:t>
             </a:r>
             <a:endParaRPr lang="en-US" sz="1400" dirty="0"/>
           </a:p>
@@ -3515,7 +4546,6 @@
         <a:solidFill>
           <a:srgbClr val="616161"/>
         </a:solidFill>
-        <a:effectLst/>
       </p:bgPr>
     </p:bg>
     <p:spTree>
@@ -3540,7 +4570,7 @@
         </p:nvSpPr>
         <p:spPr>
           <a:xfrm>
-            <a:off x="457200" y="457200"/>
+            <a:off x="274320" y="2286000"/>
             <a:ext cx="5829300" cy="0"/>
           </a:xfrm>
           <a:prstGeom prst="rect">
@@ -3553,7 +4583,7 @@
           <a:bodyPr wrap="square" rtlCol="0" anchor="ctr"/>
           <a:lstStyle/>
           <a:p>
-            <a:pPr marL="0" indent="0" algn="l">
+            <a:pPr algn="l" indent="0" marL="0">
               <a:buNone/>
             </a:pPr>
             <a:r>
@@ -3562,8 +4592,11 @@
                   <a:srgbClr val="F39200"/>
                 </a:solidFill>
               </a:rPr>
-              <a:t>42. </a:t>
-            </a:r>
+              <a:t>35. </a:t>
+            </a:r>
+            <a:pPr algn="l" indent="0" marL="0">
+              <a:buNone/>
+            </a:pPr>
             <a:r>
               <a:rPr lang="en-US" sz="1400" dirty="0">
                 <a:solidFill>
@@ -3584,7 +4617,7 @@
         </p:nvSpPr>
         <p:spPr>
           <a:xfrm>
-            <a:off x="457200" y="5029200"/>
+            <a:off x="274320" y="5029200"/>
             <a:ext cx="5829300" cy="0"/>
           </a:xfrm>
           <a:prstGeom prst="rect">
@@ -3597,7 +4630,7 @@
           <a:bodyPr wrap="square" rtlCol="0" anchor="ctr"/>
           <a:lstStyle/>
           <a:p>
-            <a:pPr marL="0" indent="0" algn="l">
+            <a:pPr algn="l" indent="0" marL="0">
               <a:buNone/>
             </a:pPr>
             <a:r>
@@ -3606,8 +4639,11 @@
                   <a:srgbClr val="F39200"/>
                 </a:solidFill>
               </a:rPr>
-              <a:t>43. </a:t>
-            </a:r>
+              <a:t>36. </a:t>
+            </a:r>
+            <a:pPr algn="l" indent="0" marL="0">
+              <a:buNone/>
+            </a:pPr>
             <a:r>
               <a:rPr lang="en-US" sz="1400" dirty="0">
                 <a:solidFill>
@@ -3615,6 +4651,82 @@
                 </a:solidFill>
               </a:rPr>
               <a:t>REPOSICIONAR EXTINTOR 10KG HORIZONTAL A VERTICAL</a:t>
+            </a:r>
+            <a:endParaRPr lang="en-US" sz="1400" dirty="0"/>
+          </a:p>
+        </p:txBody>
+      </p:sp>
+      <p:sp>
+        <p:nvSpPr>
+          <p:cNvPr id="4" name="Shape 2"/>
+          <p:cNvSpPr/>
+          <p:nvPr/>
+        </p:nvSpPr>
+        <p:spPr>
+          <a:xfrm>
+            <a:off x="457200" y="731520"/>
+            <a:ext cx="6766560" cy="45720"/>
+          </a:xfrm>
+          <a:prstGeom prst="rect">
+            <a:avLst/>
+          </a:prstGeom>
+          <a:solidFill>
+            <a:srgbClr val="F39200"/>
+          </a:solidFill>
+          <a:ln/>
+        </p:spPr>
+      </p:sp>
+      <p:sp>
+        <p:nvSpPr>
+          <p:cNvPr id="5" name="Shape 3"/>
+          <p:cNvSpPr/>
+          <p:nvPr/>
+        </p:nvSpPr>
+        <p:spPr>
+          <a:xfrm>
+            <a:off x="0" y="9692640"/>
+            <a:ext cx="7772400" cy="210312"/>
+          </a:xfrm>
+          <a:prstGeom prst="rect">
+            <a:avLst/>
+          </a:prstGeom>
+          <a:solidFill>
+            <a:srgbClr val="F39200"/>
+          </a:solidFill>
+          <a:ln/>
+        </p:spPr>
+      </p:sp>
+      <p:sp>
+        <p:nvSpPr>
+          <p:cNvPr id="6" name="Text 4"/>
+          <p:cNvSpPr/>
+          <p:nvPr/>
+        </p:nvSpPr>
+        <p:spPr>
+          <a:xfrm>
+            <a:off x="1280160" y="9793224"/>
+            <a:ext cx="5829300" cy="0"/>
+          </a:xfrm>
+          <a:prstGeom prst="rect">
+            <a:avLst/>
+          </a:prstGeom>
+          <a:noFill/>
+          <a:ln/>
+        </p:spPr>
+        <p:txBody>
+          <a:bodyPr wrap="square" rtlCol="0" anchor="ctr"/>
+          <a:lstStyle/>
+          <a:p>
+            <a:pPr algn="r" indent="0" marL="0">
+              <a:buNone/>
+            </a:pPr>
+            <a:r>
+              <a:rPr lang="en-US" sz="1400" dirty="0">
+                <a:solidFill>
+                  <a:srgbClr val="FFFFFF"/>
+                </a:solidFill>
+              </a:rPr>
+              <a:t>Página 18 de 22</a:t>
             </a:r>
             <a:endParaRPr lang="en-US" sz="1400" dirty="0"/>
           </a:p>
@@ -3636,7 +4748,6 @@
         <a:solidFill>
           <a:srgbClr val="616161"/>
         </a:solidFill>
-        <a:effectLst/>
       </p:bgPr>
     </p:bg>
     <p:spTree>
@@ -3661,7 +4772,7 @@
         </p:nvSpPr>
         <p:spPr>
           <a:xfrm>
-            <a:off x="457200" y="457200"/>
+            <a:off x="274320" y="2286000"/>
             <a:ext cx="5829300" cy="0"/>
           </a:xfrm>
           <a:prstGeom prst="rect">
@@ -3674,7 +4785,7 @@
           <a:bodyPr wrap="square" rtlCol="0" anchor="ctr"/>
           <a:lstStyle/>
           <a:p>
-            <a:pPr marL="0" indent="0" algn="l">
+            <a:pPr algn="l" indent="0" marL="0">
               <a:buNone/>
             </a:pPr>
             <a:r>
@@ -3683,8 +4794,11 @@
                   <a:srgbClr val="F39200"/>
                 </a:solidFill>
               </a:rPr>
-              <a:t>44. </a:t>
-            </a:r>
+              <a:t>37. </a:t>
+            </a:r>
+            <a:pPr algn="l" indent="0" marL="0">
+              <a:buNone/>
+            </a:pPr>
             <a:r>
               <a:rPr lang="en-US" sz="1400" dirty="0">
                 <a:solidFill>
@@ -3705,7 +4819,7 @@
         </p:nvSpPr>
         <p:spPr>
           <a:xfrm>
-            <a:off x="457200" y="5029200"/>
+            <a:off x="274320" y="5029200"/>
             <a:ext cx="5829300" cy="0"/>
           </a:xfrm>
           <a:prstGeom prst="rect">
@@ -3718,7 +4832,7 @@
           <a:bodyPr wrap="square" rtlCol="0" anchor="ctr"/>
           <a:lstStyle/>
           <a:p>
-            <a:pPr marL="0" indent="0" algn="l">
+            <a:pPr algn="l" indent="0" marL="0">
               <a:buNone/>
             </a:pPr>
             <a:r>
@@ -3727,8 +4841,11 @@
                   <a:srgbClr val="F39200"/>
                 </a:solidFill>
               </a:rPr>
-              <a:t>45. </a:t>
-            </a:r>
+              <a:t>38. </a:t>
+            </a:r>
+            <a:pPr algn="l" indent="0" marL="0">
+              <a:buNone/>
+            </a:pPr>
             <a:r>
               <a:rPr lang="en-US" sz="1400" dirty="0">
                 <a:solidFill>
@@ -3736,6 +4853,82 @@
                 </a:solidFill>
               </a:rPr>
               <a:t>PULIDO FOCO DELANTERO RH</a:t>
+            </a:r>
+            <a:endParaRPr lang="en-US" sz="1400" dirty="0"/>
+          </a:p>
+        </p:txBody>
+      </p:sp>
+      <p:sp>
+        <p:nvSpPr>
+          <p:cNvPr id="4" name="Shape 2"/>
+          <p:cNvSpPr/>
+          <p:nvPr/>
+        </p:nvSpPr>
+        <p:spPr>
+          <a:xfrm>
+            <a:off x="457200" y="731520"/>
+            <a:ext cx="6766560" cy="45720"/>
+          </a:xfrm>
+          <a:prstGeom prst="rect">
+            <a:avLst/>
+          </a:prstGeom>
+          <a:solidFill>
+            <a:srgbClr val="F39200"/>
+          </a:solidFill>
+          <a:ln/>
+        </p:spPr>
+      </p:sp>
+      <p:sp>
+        <p:nvSpPr>
+          <p:cNvPr id="5" name="Shape 3"/>
+          <p:cNvSpPr/>
+          <p:nvPr/>
+        </p:nvSpPr>
+        <p:spPr>
+          <a:xfrm>
+            <a:off x="0" y="9692640"/>
+            <a:ext cx="7772400" cy="210312"/>
+          </a:xfrm>
+          <a:prstGeom prst="rect">
+            <a:avLst/>
+          </a:prstGeom>
+          <a:solidFill>
+            <a:srgbClr val="F39200"/>
+          </a:solidFill>
+          <a:ln/>
+        </p:spPr>
+      </p:sp>
+      <p:sp>
+        <p:nvSpPr>
+          <p:cNvPr id="6" name="Text 4"/>
+          <p:cNvSpPr/>
+          <p:nvPr/>
+        </p:nvSpPr>
+        <p:spPr>
+          <a:xfrm>
+            <a:off x="1280160" y="9793224"/>
+            <a:ext cx="5829300" cy="0"/>
+          </a:xfrm>
+          <a:prstGeom prst="rect">
+            <a:avLst/>
+          </a:prstGeom>
+          <a:noFill/>
+          <a:ln/>
+        </p:spPr>
+        <p:txBody>
+          <a:bodyPr wrap="square" rtlCol="0" anchor="ctr"/>
+          <a:lstStyle/>
+          <a:p>
+            <a:pPr algn="r" indent="0" marL="0">
+              <a:buNone/>
+            </a:pPr>
+            <a:r>
+              <a:rPr lang="en-US" sz="1400" dirty="0">
+                <a:solidFill>
+                  <a:srgbClr val="FFFFFF"/>
+                </a:solidFill>
+              </a:rPr>
+              <a:t>Página 19 de 22</a:t>
             </a:r>
             <a:endParaRPr lang="en-US" sz="1400" dirty="0"/>
           </a:p>
@@ -3757,7 +4950,6 @@
         <a:solidFill>
           <a:srgbClr val="616161"/>
         </a:solidFill>
-        <a:effectLst/>
       </p:bgPr>
     </p:bg>
     <p:spTree>
@@ -3782,7 +4974,7 @@
         </p:nvSpPr>
         <p:spPr>
           <a:xfrm>
-            <a:off x="457200" y="457200"/>
+            <a:off x="274320" y="2286000"/>
             <a:ext cx="5829300" cy="0"/>
           </a:xfrm>
           <a:prstGeom prst="rect">
@@ -3795,7 +4987,7 @@
           <a:bodyPr wrap="square" rtlCol="0" anchor="ctr"/>
           <a:lstStyle/>
           <a:p>
-            <a:pPr marL="0" indent="0" algn="l">
+            <a:pPr algn="l" indent="0" marL="0">
               <a:buNone/>
             </a:pPr>
             <a:r>
@@ -3804,8 +4996,11 @@
                   <a:srgbClr val="F39200"/>
                 </a:solidFill>
               </a:rPr>
-              <a:t>10. </a:t>
-            </a:r>
+              <a:t>3. </a:t>
+            </a:r>
+            <a:pPr algn="l" indent="0" marL="0">
+              <a:buNone/>
+            </a:pPr>
             <a:r>
               <a:rPr lang="en-US" sz="1400" dirty="0">
                 <a:solidFill>
@@ -3826,7 +5021,7 @@
         </p:nvSpPr>
         <p:spPr>
           <a:xfrm>
-            <a:off x="457200" y="5029200"/>
+            <a:off x="274320" y="5029200"/>
             <a:ext cx="5829300" cy="0"/>
           </a:xfrm>
           <a:prstGeom prst="rect">
@@ -3839,7 +5034,7 @@
           <a:bodyPr wrap="square" rtlCol="0" anchor="ctr"/>
           <a:lstStyle/>
           <a:p>
-            <a:pPr marL="0" indent="0" algn="l">
+            <a:pPr algn="l" indent="0" marL="0">
               <a:buNone/>
             </a:pPr>
             <a:r>
@@ -3848,8 +5043,11 @@
                   <a:srgbClr val="F39200"/>
                 </a:solidFill>
               </a:rPr>
-              <a:t>11. </a:t>
-            </a:r>
+              <a:t>4. </a:t>
+            </a:r>
+            <a:pPr algn="l" indent="0" marL="0">
+              <a:buNone/>
+            </a:pPr>
             <a:r>
               <a:rPr lang="en-US" sz="1400" dirty="0">
                 <a:solidFill>
@@ -3857,6 +5055,82 @@
                 </a:solidFill>
               </a:rPr>
               <a:t>EVALUACIÓN DE A/C NO ENFRIA</a:t>
+            </a:r>
+            <a:endParaRPr lang="en-US" sz="1400" dirty="0"/>
+          </a:p>
+        </p:txBody>
+      </p:sp>
+      <p:sp>
+        <p:nvSpPr>
+          <p:cNvPr id="4" name="Shape 2"/>
+          <p:cNvSpPr/>
+          <p:nvPr/>
+        </p:nvSpPr>
+        <p:spPr>
+          <a:xfrm>
+            <a:off x="457200" y="731520"/>
+            <a:ext cx="6766560" cy="45720"/>
+          </a:xfrm>
+          <a:prstGeom prst="rect">
+            <a:avLst/>
+          </a:prstGeom>
+          <a:solidFill>
+            <a:srgbClr val="F39200"/>
+          </a:solidFill>
+          <a:ln/>
+        </p:spPr>
+      </p:sp>
+      <p:sp>
+        <p:nvSpPr>
+          <p:cNvPr id="5" name="Shape 3"/>
+          <p:cNvSpPr/>
+          <p:nvPr/>
+        </p:nvSpPr>
+        <p:spPr>
+          <a:xfrm>
+            <a:off x="0" y="9692640"/>
+            <a:ext cx="7772400" cy="210312"/>
+          </a:xfrm>
+          <a:prstGeom prst="rect">
+            <a:avLst/>
+          </a:prstGeom>
+          <a:solidFill>
+            <a:srgbClr val="F39200"/>
+          </a:solidFill>
+          <a:ln/>
+        </p:spPr>
+      </p:sp>
+      <p:sp>
+        <p:nvSpPr>
+          <p:cNvPr id="6" name="Text 4"/>
+          <p:cNvSpPr/>
+          <p:nvPr/>
+        </p:nvSpPr>
+        <p:spPr>
+          <a:xfrm>
+            <a:off x="1280160" y="9793224"/>
+            <a:ext cx="5829300" cy="0"/>
+          </a:xfrm>
+          <a:prstGeom prst="rect">
+            <a:avLst/>
+          </a:prstGeom>
+          <a:noFill/>
+          <a:ln/>
+        </p:spPr>
+        <p:txBody>
+          <a:bodyPr wrap="square" rtlCol="0" anchor="ctr"/>
+          <a:lstStyle/>
+          <a:p>
+            <a:pPr algn="r" indent="0" marL="0">
+              <a:buNone/>
+            </a:pPr>
+            <a:r>
+              <a:rPr lang="en-US" sz="1400" dirty="0">
+                <a:solidFill>
+                  <a:srgbClr val="FFFFFF"/>
+                </a:solidFill>
+              </a:rPr>
+              <a:t>Página 2 de 22</a:t>
             </a:r>
             <a:endParaRPr lang="en-US" sz="1400" dirty="0"/>
           </a:p>
@@ -3878,7 +5152,6 @@
         <a:solidFill>
           <a:srgbClr val="616161"/>
         </a:solidFill>
-        <a:effectLst/>
       </p:bgPr>
     </p:bg>
     <p:spTree>
@@ -3903,7 +5176,7 @@
         </p:nvSpPr>
         <p:spPr>
           <a:xfrm>
-            <a:off x="457200" y="457200"/>
+            <a:off x="274320" y="2286000"/>
             <a:ext cx="5829300" cy="0"/>
           </a:xfrm>
           <a:prstGeom prst="rect">
@@ -3916,7 +5189,7 @@
           <a:bodyPr wrap="square" rtlCol="0" anchor="ctr"/>
           <a:lstStyle/>
           <a:p>
-            <a:pPr marL="0" indent="0" algn="l">
+            <a:pPr algn="l" indent="0" marL="0">
               <a:buNone/>
             </a:pPr>
             <a:r>
@@ -3925,8 +5198,11 @@
                   <a:srgbClr val="F39200"/>
                 </a:solidFill>
               </a:rPr>
-              <a:t>46. </a:t>
-            </a:r>
+              <a:t>39. </a:t>
+            </a:r>
+            <a:pPr algn="l" indent="0" marL="0">
+              <a:buNone/>
+            </a:pPr>
             <a:r>
               <a:rPr lang="en-US" sz="1400" dirty="0">
                 <a:solidFill>
@@ -3947,7 +5223,7 @@
         </p:nvSpPr>
         <p:spPr>
           <a:xfrm>
-            <a:off x="457200" y="5029200"/>
+            <a:off x="274320" y="5029200"/>
             <a:ext cx="5829300" cy="0"/>
           </a:xfrm>
           <a:prstGeom prst="rect">
@@ -3960,7 +5236,7 @@
           <a:bodyPr wrap="square" rtlCol="0" anchor="ctr"/>
           <a:lstStyle/>
           <a:p>
-            <a:pPr marL="0" indent="0" algn="l">
+            <a:pPr algn="l" indent="0" marL="0">
               <a:buNone/>
             </a:pPr>
             <a:r>
@@ -3969,8 +5245,11 @@
                   <a:srgbClr val="F39200"/>
                 </a:solidFill>
               </a:rPr>
-              <a:t>47. </a:t>
-            </a:r>
+              <a:t>40. </a:t>
+            </a:r>
+            <a:pPr algn="l" indent="0" marL="0">
+              <a:buNone/>
+            </a:pPr>
             <a:r>
               <a:rPr lang="en-US" sz="1400" dirty="0">
                 <a:solidFill>
@@ -3978,6 +5257,82 @@
                 </a:solidFill>
               </a:rPr>
               <a:t>NORMALIZACIÓN DE SISTEMA DE REGADIO</a:t>
+            </a:r>
+            <a:endParaRPr lang="en-US" sz="1400" dirty="0"/>
+          </a:p>
+        </p:txBody>
+      </p:sp>
+      <p:sp>
+        <p:nvSpPr>
+          <p:cNvPr id="4" name="Shape 2"/>
+          <p:cNvSpPr/>
+          <p:nvPr/>
+        </p:nvSpPr>
+        <p:spPr>
+          <a:xfrm>
+            <a:off x="457200" y="731520"/>
+            <a:ext cx="6766560" cy="45720"/>
+          </a:xfrm>
+          <a:prstGeom prst="rect">
+            <a:avLst/>
+          </a:prstGeom>
+          <a:solidFill>
+            <a:srgbClr val="F39200"/>
+          </a:solidFill>
+          <a:ln/>
+        </p:spPr>
+      </p:sp>
+      <p:sp>
+        <p:nvSpPr>
+          <p:cNvPr id="5" name="Shape 3"/>
+          <p:cNvSpPr/>
+          <p:nvPr/>
+        </p:nvSpPr>
+        <p:spPr>
+          <a:xfrm>
+            <a:off x="0" y="9692640"/>
+            <a:ext cx="7772400" cy="210312"/>
+          </a:xfrm>
+          <a:prstGeom prst="rect">
+            <a:avLst/>
+          </a:prstGeom>
+          <a:solidFill>
+            <a:srgbClr val="F39200"/>
+          </a:solidFill>
+          <a:ln/>
+        </p:spPr>
+      </p:sp>
+      <p:sp>
+        <p:nvSpPr>
+          <p:cNvPr id="6" name="Text 4"/>
+          <p:cNvSpPr/>
+          <p:nvPr/>
+        </p:nvSpPr>
+        <p:spPr>
+          <a:xfrm>
+            <a:off x="1280160" y="9793224"/>
+            <a:ext cx="5829300" cy="0"/>
+          </a:xfrm>
+          <a:prstGeom prst="rect">
+            <a:avLst/>
+          </a:prstGeom>
+          <a:noFill/>
+          <a:ln/>
+        </p:spPr>
+        <p:txBody>
+          <a:bodyPr wrap="square" rtlCol="0" anchor="ctr"/>
+          <a:lstStyle/>
+          <a:p>
+            <a:pPr algn="r" indent="0" marL="0">
+              <a:buNone/>
+            </a:pPr>
+            <a:r>
+              <a:rPr lang="en-US" sz="1400" dirty="0">
+                <a:solidFill>
+                  <a:srgbClr val="FFFFFF"/>
+                </a:solidFill>
+              </a:rPr>
+              <a:t>Página 20 de 22</a:t>
             </a:r>
             <a:endParaRPr lang="en-US" sz="1400" dirty="0"/>
           </a:p>
@@ -3999,7 +5354,6 @@
         <a:solidFill>
           <a:srgbClr val="616161"/>
         </a:solidFill>
-        <a:effectLst/>
       </p:bgPr>
     </p:bg>
     <p:spTree>
@@ -4024,7 +5378,7 @@
         </p:nvSpPr>
         <p:spPr>
           <a:xfrm>
-            <a:off x="457200" y="457200"/>
+            <a:off x="274320" y="2286000"/>
             <a:ext cx="5829300" cy="0"/>
           </a:xfrm>
           <a:prstGeom prst="rect">
@@ -4037,7 +5391,7 @@
           <a:bodyPr wrap="square" rtlCol="0" anchor="ctr"/>
           <a:lstStyle/>
           <a:p>
-            <a:pPr marL="0" indent="0" algn="l">
+            <a:pPr algn="l" indent="0" marL="0">
               <a:buNone/>
             </a:pPr>
             <a:r>
@@ -4046,8 +5400,11 @@
                   <a:srgbClr val="F39200"/>
                 </a:solidFill>
               </a:rPr>
-              <a:t>48. </a:t>
-            </a:r>
+              <a:t>41. </a:t>
+            </a:r>
+            <a:pPr algn="l" indent="0" marL="0">
+              <a:buNone/>
+            </a:pPr>
             <a:r>
               <a:rPr lang="en-US" sz="1400" dirty="0">
                 <a:solidFill>
@@ -4068,7 +5425,7 @@
         </p:nvSpPr>
         <p:spPr>
           <a:xfrm>
-            <a:off x="457200" y="5029200"/>
+            <a:off x="274320" y="5029200"/>
             <a:ext cx="5829300" cy="0"/>
           </a:xfrm>
           <a:prstGeom prst="rect">
@@ -4081,7 +5438,7 @@
           <a:bodyPr wrap="square" rtlCol="0" anchor="ctr"/>
           <a:lstStyle/>
           <a:p>
-            <a:pPr marL="0" indent="0" algn="l">
+            <a:pPr algn="l" indent="0" marL="0">
               <a:buNone/>
             </a:pPr>
             <a:r>
@@ -4090,8 +5447,11 @@
                   <a:srgbClr val="F39200"/>
                 </a:solidFill>
               </a:rPr>
-              <a:t>49. </a:t>
-            </a:r>
+              <a:t>42. </a:t>
+            </a:r>
+            <a:pPr algn="l" indent="0" marL="0">
+              <a:buNone/>
+            </a:pPr>
             <a:r>
               <a:rPr lang="en-US" sz="1400" dirty="0">
                 <a:solidFill>
@@ -4099,6 +5459,82 @@
                 </a:solidFill>
               </a:rPr>
               <a:t>LAVADO GENERAL</a:t>
+            </a:r>
+            <a:endParaRPr lang="en-US" sz="1400" dirty="0"/>
+          </a:p>
+        </p:txBody>
+      </p:sp>
+      <p:sp>
+        <p:nvSpPr>
+          <p:cNvPr id="4" name="Shape 2"/>
+          <p:cNvSpPr/>
+          <p:nvPr/>
+        </p:nvSpPr>
+        <p:spPr>
+          <a:xfrm>
+            <a:off x="457200" y="731520"/>
+            <a:ext cx="6766560" cy="45720"/>
+          </a:xfrm>
+          <a:prstGeom prst="rect">
+            <a:avLst/>
+          </a:prstGeom>
+          <a:solidFill>
+            <a:srgbClr val="F39200"/>
+          </a:solidFill>
+          <a:ln/>
+        </p:spPr>
+      </p:sp>
+      <p:sp>
+        <p:nvSpPr>
+          <p:cNvPr id="5" name="Shape 3"/>
+          <p:cNvSpPr/>
+          <p:nvPr/>
+        </p:nvSpPr>
+        <p:spPr>
+          <a:xfrm>
+            <a:off x="0" y="9692640"/>
+            <a:ext cx="7772400" cy="210312"/>
+          </a:xfrm>
+          <a:prstGeom prst="rect">
+            <a:avLst/>
+          </a:prstGeom>
+          <a:solidFill>
+            <a:srgbClr val="F39200"/>
+          </a:solidFill>
+          <a:ln/>
+        </p:spPr>
+      </p:sp>
+      <p:sp>
+        <p:nvSpPr>
+          <p:cNvPr id="6" name="Text 4"/>
+          <p:cNvSpPr/>
+          <p:nvPr/>
+        </p:nvSpPr>
+        <p:spPr>
+          <a:xfrm>
+            <a:off x="1280160" y="9793224"/>
+            <a:ext cx="5829300" cy="0"/>
+          </a:xfrm>
+          <a:prstGeom prst="rect">
+            <a:avLst/>
+          </a:prstGeom>
+          <a:noFill/>
+          <a:ln/>
+        </p:spPr>
+        <p:txBody>
+          <a:bodyPr wrap="square" rtlCol="0" anchor="ctr"/>
+          <a:lstStyle/>
+          <a:p>
+            <a:pPr algn="r" indent="0" marL="0">
+              <a:buNone/>
+            </a:pPr>
+            <a:r>
+              <a:rPr lang="en-US" sz="1400" dirty="0">
+                <a:solidFill>
+                  <a:srgbClr val="FFFFFF"/>
+                </a:solidFill>
+              </a:rPr>
+              <a:t>Página 21 de 22</a:t>
             </a:r>
             <a:endParaRPr lang="en-US" sz="1400" dirty="0"/>
           </a:p>
@@ -4120,7 +5556,6 @@
         <a:solidFill>
           <a:srgbClr val="616161"/>
         </a:solidFill>
-        <a:effectLst/>
       </p:bgPr>
     </p:bg>
     <p:spTree>
@@ -4145,7 +5580,7 @@
         </p:nvSpPr>
         <p:spPr>
           <a:xfrm>
-            <a:off x="457200" y="457200"/>
+            <a:off x="274320" y="2286000"/>
             <a:ext cx="5829300" cy="0"/>
           </a:xfrm>
           <a:prstGeom prst="rect">
@@ -4158,7 +5593,7 @@
           <a:bodyPr wrap="square" rtlCol="0" anchor="ctr"/>
           <a:lstStyle/>
           <a:p>
-            <a:pPr marL="0" indent="0" algn="l">
+            <a:pPr algn="l" indent="0" marL="0">
               <a:buNone/>
             </a:pPr>
             <a:r>
@@ -4167,8 +5602,11 @@
                   <a:srgbClr val="F39200"/>
                 </a:solidFill>
               </a:rPr>
-              <a:t>50. </a:t>
-            </a:r>
+              <a:t>43. </a:t>
+            </a:r>
+            <a:pPr algn="l" indent="0" marL="0">
+              <a:buNone/>
+            </a:pPr>
             <a:r>
               <a:rPr lang="en-US" sz="1400" dirty="0">
                 <a:solidFill>
@@ -4189,7 +5627,7 @@
         </p:nvSpPr>
         <p:spPr>
           <a:xfrm>
-            <a:off x="457200" y="5029200"/>
+            <a:off x="274320" y="5029200"/>
             <a:ext cx="5829300" cy="0"/>
           </a:xfrm>
           <a:prstGeom prst="rect">
@@ -4202,7 +5640,7 @@
           <a:bodyPr wrap="square" rtlCol="0" anchor="ctr"/>
           <a:lstStyle/>
           <a:p>
-            <a:pPr marL="0" indent="0" algn="l">
+            <a:pPr algn="l" indent="0" marL="0">
               <a:buNone/>
             </a:pPr>
             <a:r>
@@ -4211,8 +5649,11 @@
                   <a:srgbClr val="F39200"/>
                 </a:solidFill>
               </a:rPr>
-              <a:t>51. </a:t>
-            </a:r>
+              <a:t>44. </a:t>
+            </a:r>
+            <a:pPr algn="l" indent="0" marL="0">
+              <a:buNone/>
+            </a:pPr>
             <a:r>
               <a:rPr lang="en-US" sz="1400" dirty="0">
                 <a:solidFill>
@@ -4220,6 +5661,82 @@
                 </a:solidFill>
               </a:rPr>
               <a:t>CONFECCIÓN INFORME DE REPARACIÓN</a:t>
+            </a:r>
+            <a:endParaRPr lang="en-US" sz="1400" dirty="0"/>
+          </a:p>
+        </p:txBody>
+      </p:sp>
+      <p:sp>
+        <p:nvSpPr>
+          <p:cNvPr id="4" name="Shape 2"/>
+          <p:cNvSpPr/>
+          <p:nvPr/>
+        </p:nvSpPr>
+        <p:spPr>
+          <a:xfrm>
+            <a:off x="457200" y="731520"/>
+            <a:ext cx="6766560" cy="45720"/>
+          </a:xfrm>
+          <a:prstGeom prst="rect">
+            <a:avLst/>
+          </a:prstGeom>
+          <a:solidFill>
+            <a:srgbClr val="F39200"/>
+          </a:solidFill>
+          <a:ln/>
+        </p:spPr>
+      </p:sp>
+      <p:sp>
+        <p:nvSpPr>
+          <p:cNvPr id="5" name="Shape 3"/>
+          <p:cNvSpPr/>
+          <p:nvPr/>
+        </p:nvSpPr>
+        <p:spPr>
+          <a:xfrm>
+            <a:off x="0" y="9692640"/>
+            <a:ext cx="7772400" cy="210312"/>
+          </a:xfrm>
+          <a:prstGeom prst="rect">
+            <a:avLst/>
+          </a:prstGeom>
+          <a:solidFill>
+            <a:srgbClr val="F39200"/>
+          </a:solidFill>
+          <a:ln/>
+        </p:spPr>
+      </p:sp>
+      <p:sp>
+        <p:nvSpPr>
+          <p:cNvPr id="6" name="Text 4"/>
+          <p:cNvSpPr/>
+          <p:nvPr/>
+        </p:nvSpPr>
+        <p:spPr>
+          <a:xfrm>
+            <a:off x="1280160" y="9793224"/>
+            <a:ext cx="5829300" cy="0"/>
+          </a:xfrm>
+          <a:prstGeom prst="rect">
+            <a:avLst/>
+          </a:prstGeom>
+          <a:noFill/>
+          <a:ln/>
+        </p:spPr>
+        <p:txBody>
+          <a:bodyPr wrap="square" rtlCol="0" anchor="ctr"/>
+          <a:lstStyle/>
+          <a:p>
+            <a:pPr algn="r" indent="0" marL="0">
+              <a:buNone/>
+            </a:pPr>
+            <a:r>
+              <a:rPr lang="en-US" sz="1400" dirty="0">
+                <a:solidFill>
+                  <a:srgbClr val="FFFFFF"/>
+                </a:solidFill>
+              </a:rPr>
+              <a:t>Página 22 de 22</a:t>
             </a:r>
             <a:endParaRPr lang="en-US" sz="1400" dirty="0"/>
           </a:p>
@@ -4241,7 +5758,6 @@
         <a:solidFill>
           <a:srgbClr val="616161"/>
         </a:solidFill>
-        <a:effectLst/>
       </p:bgPr>
     </p:bg>
     <p:spTree>
@@ -4266,7 +5782,7 @@
         </p:nvSpPr>
         <p:spPr>
           <a:xfrm>
-            <a:off x="457200" y="457200"/>
+            <a:off x="274320" y="2286000"/>
             <a:ext cx="5829300" cy="0"/>
           </a:xfrm>
           <a:prstGeom prst="rect">
@@ -4279,7 +5795,7 @@
           <a:bodyPr wrap="square" rtlCol="0" anchor="ctr"/>
           <a:lstStyle/>
           <a:p>
-            <a:pPr marL="0" indent="0" algn="l">
+            <a:pPr algn="l" indent="0" marL="0">
               <a:buNone/>
             </a:pPr>
             <a:r>
@@ -4288,8 +5804,11 @@
                   <a:srgbClr val="F39200"/>
                 </a:solidFill>
               </a:rPr>
-              <a:t>12. </a:t>
-            </a:r>
+              <a:t>5. </a:t>
+            </a:r>
+            <a:pPr algn="l" indent="0" marL="0">
+              <a:buNone/>
+            </a:pPr>
             <a:r>
               <a:rPr lang="en-US" sz="1400" dirty="0">
                 <a:solidFill>
@@ -4310,7 +5829,7 @@
         </p:nvSpPr>
         <p:spPr>
           <a:xfrm>
-            <a:off x="457200" y="5029200"/>
+            <a:off x="274320" y="5029200"/>
             <a:ext cx="5829300" cy="0"/>
           </a:xfrm>
           <a:prstGeom prst="rect">
@@ -4323,7 +5842,7 @@
           <a:bodyPr wrap="square" rtlCol="0" anchor="ctr"/>
           <a:lstStyle/>
           <a:p>
-            <a:pPr marL="0" indent="0" algn="l">
+            <a:pPr algn="l" indent="0" marL="0">
               <a:buNone/>
             </a:pPr>
             <a:r>
@@ -4332,8 +5851,11 @@
                   <a:srgbClr val="F39200"/>
                 </a:solidFill>
               </a:rPr>
-              <a:t>13. </a:t>
-            </a:r>
+              <a:t>6. </a:t>
+            </a:r>
+            <a:pPr algn="l" indent="0" marL="0">
+              <a:buNone/>
+            </a:pPr>
             <a:r>
               <a:rPr lang="en-US" sz="1400" dirty="0">
                 <a:solidFill>
@@ -4341,6 +5863,82 @@
                 </a:solidFill>
               </a:rPr>
               <a:t>RELLENAR DEPOSITO DE LIMPIA PARABRISAS</a:t>
+            </a:r>
+            <a:endParaRPr lang="en-US" sz="1400" dirty="0"/>
+          </a:p>
+        </p:txBody>
+      </p:sp>
+      <p:sp>
+        <p:nvSpPr>
+          <p:cNvPr id="4" name="Shape 2"/>
+          <p:cNvSpPr/>
+          <p:nvPr/>
+        </p:nvSpPr>
+        <p:spPr>
+          <a:xfrm>
+            <a:off x="457200" y="731520"/>
+            <a:ext cx="6766560" cy="45720"/>
+          </a:xfrm>
+          <a:prstGeom prst="rect">
+            <a:avLst/>
+          </a:prstGeom>
+          <a:solidFill>
+            <a:srgbClr val="F39200"/>
+          </a:solidFill>
+          <a:ln/>
+        </p:spPr>
+      </p:sp>
+      <p:sp>
+        <p:nvSpPr>
+          <p:cNvPr id="5" name="Shape 3"/>
+          <p:cNvSpPr/>
+          <p:nvPr/>
+        </p:nvSpPr>
+        <p:spPr>
+          <a:xfrm>
+            <a:off x="0" y="9692640"/>
+            <a:ext cx="7772400" cy="210312"/>
+          </a:xfrm>
+          <a:prstGeom prst="rect">
+            <a:avLst/>
+          </a:prstGeom>
+          <a:solidFill>
+            <a:srgbClr val="F39200"/>
+          </a:solidFill>
+          <a:ln/>
+        </p:spPr>
+      </p:sp>
+      <p:sp>
+        <p:nvSpPr>
+          <p:cNvPr id="6" name="Text 4"/>
+          <p:cNvSpPr/>
+          <p:nvPr/>
+        </p:nvSpPr>
+        <p:spPr>
+          <a:xfrm>
+            <a:off x="1280160" y="9793224"/>
+            <a:ext cx="5829300" cy="0"/>
+          </a:xfrm>
+          <a:prstGeom prst="rect">
+            <a:avLst/>
+          </a:prstGeom>
+          <a:noFill/>
+          <a:ln/>
+        </p:spPr>
+        <p:txBody>
+          <a:bodyPr wrap="square" rtlCol="0" anchor="ctr"/>
+          <a:lstStyle/>
+          <a:p>
+            <a:pPr algn="r" indent="0" marL="0">
+              <a:buNone/>
+            </a:pPr>
+            <a:r>
+              <a:rPr lang="en-US" sz="1400" dirty="0">
+                <a:solidFill>
+                  <a:srgbClr val="FFFFFF"/>
+                </a:solidFill>
+              </a:rPr>
+              <a:t>Página 3 de 22</a:t>
             </a:r>
             <a:endParaRPr lang="en-US" sz="1400" dirty="0"/>
           </a:p>
@@ -4362,7 +5960,6 @@
         <a:solidFill>
           <a:srgbClr val="616161"/>
         </a:solidFill>
-        <a:effectLst/>
       </p:bgPr>
     </p:bg>
     <p:spTree>
@@ -4387,7 +5984,7 @@
         </p:nvSpPr>
         <p:spPr>
           <a:xfrm>
-            <a:off x="457200" y="457200"/>
+            <a:off x="274320" y="2286000"/>
             <a:ext cx="5829300" cy="0"/>
           </a:xfrm>
           <a:prstGeom prst="rect">
@@ -4400,7 +5997,7 @@
           <a:bodyPr wrap="square" rtlCol="0" anchor="ctr"/>
           <a:lstStyle/>
           <a:p>
-            <a:pPr marL="0" indent="0" algn="l">
+            <a:pPr algn="l" indent="0" marL="0">
               <a:buNone/>
             </a:pPr>
             <a:r>
@@ -4409,8 +6006,11 @@
                   <a:srgbClr val="F39200"/>
                 </a:solidFill>
               </a:rPr>
-              <a:t>14. </a:t>
-            </a:r>
+              <a:t>7. </a:t>
+            </a:r>
+            <a:pPr algn="l" indent="0" marL="0">
+              <a:buNone/>
+            </a:pPr>
             <a:r>
               <a:rPr lang="en-US" sz="1400" dirty="0">
                 <a:solidFill>
@@ -4431,7 +6031,7 @@
         </p:nvSpPr>
         <p:spPr>
           <a:xfrm>
-            <a:off x="457200" y="5029200"/>
+            <a:off x="274320" y="5029200"/>
             <a:ext cx="5829300" cy="0"/>
           </a:xfrm>
           <a:prstGeom prst="rect">
@@ -4444,7 +6044,7 @@
           <a:bodyPr wrap="square" rtlCol="0" anchor="ctr"/>
           <a:lstStyle/>
           <a:p>
-            <a:pPr marL="0" indent="0" algn="l">
+            <a:pPr algn="l" indent="0" marL="0">
               <a:buNone/>
             </a:pPr>
             <a:r>
@@ -4453,8 +6053,11 @@
                   <a:srgbClr val="F39200"/>
                 </a:solidFill>
               </a:rPr>
-              <a:t>15. </a:t>
-            </a:r>
+              <a:t>8. </a:t>
+            </a:r>
+            <a:pPr algn="l" indent="0" marL="0">
+              <a:buNone/>
+            </a:pPr>
             <a:r>
               <a:rPr lang="en-US" sz="1400" dirty="0">
                 <a:solidFill>
@@ -4462,6 +6065,82 @@
                 </a:solidFill>
               </a:rPr>
               <a:t>FABRICACIÓN PROTECCIÓN AD-BLUE </a:t>
+            </a:r>
+            <a:endParaRPr lang="en-US" sz="1400" dirty="0"/>
+          </a:p>
+        </p:txBody>
+      </p:sp>
+      <p:sp>
+        <p:nvSpPr>
+          <p:cNvPr id="4" name="Shape 2"/>
+          <p:cNvSpPr/>
+          <p:nvPr/>
+        </p:nvSpPr>
+        <p:spPr>
+          <a:xfrm>
+            <a:off x="457200" y="731520"/>
+            <a:ext cx="6766560" cy="45720"/>
+          </a:xfrm>
+          <a:prstGeom prst="rect">
+            <a:avLst/>
+          </a:prstGeom>
+          <a:solidFill>
+            <a:srgbClr val="F39200"/>
+          </a:solidFill>
+          <a:ln/>
+        </p:spPr>
+      </p:sp>
+      <p:sp>
+        <p:nvSpPr>
+          <p:cNvPr id="5" name="Shape 3"/>
+          <p:cNvSpPr/>
+          <p:nvPr/>
+        </p:nvSpPr>
+        <p:spPr>
+          <a:xfrm>
+            <a:off x="0" y="9692640"/>
+            <a:ext cx="7772400" cy="210312"/>
+          </a:xfrm>
+          <a:prstGeom prst="rect">
+            <a:avLst/>
+          </a:prstGeom>
+          <a:solidFill>
+            <a:srgbClr val="F39200"/>
+          </a:solidFill>
+          <a:ln/>
+        </p:spPr>
+      </p:sp>
+      <p:sp>
+        <p:nvSpPr>
+          <p:cNvPr id="6" name="Text 4"/>
+          <p:cNvSpPr/>
+          <p:nvPr/>
+        </p:nvSpPr>
+        <p:spPr>
+          <a:xfrm>
+            <a:off x="1280160" y="9793224"/>
+            <a:ext cx="5829300" cy="0"/>
+          </a:xfrm>
+          <a:prstGeom prst="rect">
+            <a:avLst/>
+          </a:prstGeom>
+          <a:noFill/>
+          <a:ln/>
+        </p:spPr>
+        <p:txBody>
+          <a:bodyPr wrap="square" rtlCol="0" anchor="ctr"/>
+          <a:lstStyle/>
+          <a:p>
+            <a:pPr algn="r" indent="0" marL="0">
+              <a:buNone/>
+            </a:pPr>
+            <a:r>
+              <a:rPr lang="en-US" sz="1400" dirty="0">
+                <a:solidFill>
+                  <a:srgbClr val="FFFFFF"/>
+                </a:solidFill>
+              </a:rPr>
+              <a:t>Página 4 de 22</a:t>
             </a:r>
             <a:endParaRPr lang="en-US" sz="1400" dirty="0"/>
           </a:p>
@@ -4483,7 +6162,6 @@
         <a:solidFill>
           <a:srgbClr val="616161"/>
         </a:solidFill>
-        <a:effectLst/>
       </p:bgPr>
     </p:bg>
     <p:spTree>
@@ -4508,7 +6186,7 @@
         </p:nvSpPr>
         <p:spPr>
           <a:xfrm>
-            <a:off x="457200" y="457200"/>
+            <a:off x="274320" y="2286000"/>
             <a:ext cx="5829300" cy="0"/>
           </a:xfrm>
           <a:prstGeom prst="rect">
@@ -4521,7 +6199,7 @@
           <a:bodyPr wrap="square" rtlCol="0" anchor="ctr"/>
           <a:lstStyle/>
           <a:p>
-            <a:pPr marL="0" indent="0" algn="l">
+            <a:pPr algn="l" indent="0" marL="0">
               <a:buNone/>
             </a:pPr>
             <a:r>
@@ -4530,8 +6208,11 @@
                   <a:srgbClr val="F39200"/>
                 </a:solidFill>
               </a:rPr>
-              <a:t>16. </a:t>
-            </a:r>
+              <a:t>9. </a:t>
+            </a:r>
+            <a:pPr algn="l" indent="0" marL="0">
+              <a:buNone/>
+            </a:pPr>
             <a:r>
               <a:rPr lang="en-US" sz="1400" dirty="0">
                 <a:solidFill>
@@ -4552,7 +6233,7 @@
         </p:nvSpPr>
         <p:spPr>
           <a:xfrm>
-            <a:off x="457200" y="5029200"/>
+            <a:off x="274320" y="5029200"/>
             <a:ext cx="5829300" cy="0"/>
           </a:xfrm>
           <a:prstGeom prst="rect">
@@ -4565,7 +6246,7 @@
           <a:bodyPr wrap="square" rtlCol="0" anchor="ctr"/>
           <a:lstStyle/>
           <a:p>
-            <a:pPr marL="0" indent="0" algn="l">
+            <a:pPr algn="l" indent="0" marL="0">
               <a:buNone/>
             </a:pPr>
             <a:r>
@@ -4574,8 +6255,11 @@
                   <a:srgbClr val="F39200"/>
                 </a:solidFill>
               </a:rPr>
-              <a:t>17. </a:t>
-            </a:r>
+              <a:t>10. </a:t>
+            </a:r>
+            <a:pPr algn="l" indent="0" marL="0">
+              <a:buNone/>
+            </a:pPr>
             <a:r>
               <a:rPr lang="en-US" sz="1400" dirty="0">
                 <a:solidFill>
@@ -4583,6 +6267,82 @@
                 </a:solidFill>
               </a:rPr>
               <a:t>REPARACIÓN DE LLAVE DE PASO MAL ESTADO Y FALTA DE LUBRICACIÓN</a:t>
+            </a:r>
+            <a:endParaRPr lang="en-US" sz="1400" dirty="0"/>
+          </a:p>
+        </p:txBody>
+      </p:sp>
+      <p:sp>
+        <p:nvSpPr>
+          <p:cNvPr id="4" name="Shape 2"/>
+          <p:cNvSpPr/>
+          <p:nvPr/>
+        </p:nvSpPr>
+        <p:spPr>
+          <a:xfrm>
+            <a:off x="457200" y="731520"/>
+            <a:ext cx="6766560" cy="45720"/>
+          </a:xfrm>
+          <a:prstGeom prst="rect">
+            <a:avLst/>
+          </a:prstGeom>
+          <a:solidFill>
+            <a:srgbClr val="F39200"/>
+          </a:solidFill>
+          <a:ln/>
+        </p:spPr>
+      </p:sp>
+      <p:sp>
+        <p:nvSpPr>
+          <p:cNvPr id="5" name="Shape 3"/>
+          <p:cNvSpPr/>
+          <p:nvPr/>
+        </p:nvSpPr>
+        <p:spPr>
+          <a:xfrm>
+            <a:off x="0" y="9692640"/>
+            <a:ext cx="7772400" cy="210312"/>
+          </a:xfrm>
+          <a:prstGeom prst="rect">
+            <a:avLst/>
+          </a:prstGeom>
+          <a:solidFill>
+            <a:srgbClr val="F39200"/>
+          </a:solidFill>
+          <a:ln/>
+        </p:spPr>
+      </p:sp>
+      <p:sp>
+        <p:nvSpPr>
+          <p:cNvPr id="6" name="Text 4"/>
+          <p:cNvSpPr/>
+          <p:nvPr/>
+        </p:nvSpPr>
+        <p:spPr>
+          <a:xfrm>
+            <a:off x="1280160" y="9793224"/>
+            <a:ext cx="5829300" cy="0"/>
+          </a:xfrm>
+          <a:prstGeom prst="rect">
+            <a:avLst/>
+          </a:prstGeom>
+          <a:noFill/>
+          <a:ln/>
+        </p:spPr>
+        <p:txBody>
+          <a:bodyPr wrap="square" rtlCol="0" anchor="ctr"/>
+          <a:lstStyle/>
+          <a:p>
+            <a:pPr algn="r" indent="0" marL="0">
+              <a:buNone/>
+            </a:pPr>
+            <a:r>
+              <a:rPr lang="en-US" sz="1400" dirty="0">
+                <a:solidFill>
+                  <a:srgbClr val="FFFFFF"/>
+                </a:solidFill>
+              </a:rPr>
+              <a:t>Página 5 de 22</a:t>
             </a:r>
             <a:endParaRPr lang="en-US" sz="1400" dirty="0"/>
           </a:p>
@@ -4604,7 +6364,6 @@
         <a:solidFill>
           <a:srgbClr val="616161"/>
         </a:solidFill>
-        <a:effectLst/>
       </p:bgPr>
     </p:bg>
     <p:spTree>
@@ -4629,7 +6388,7 @@
         </p:nvSpPr>
         <p:spPr>
           <a:xfrm>
-            <a:off x="457200" y="457200"/>
+            <a:off x="274320" y="2286000"/>
             <a:ext cx="5829300" cy="0"/>
           </a:xfrm>
           <a:prstGeom prst="rect">
@@ -4642,7 +6401,7 @@
           <a:bodyPr wrap="square" rtlCol="0" anchor="ctr"/>
           <a:lstStyle/>
           <a:p>
-            <a:pPr marL="0" indent="0" algn="l">
+            <a:pPr algn="l" indent="0" marL="0">
               <a:buNone/>
             </a:pPr>
             <a:r>
@@ -4651,8 +6410,11 @@
                   <a:srgbClr val="F39200"/>
                 </a:solidFill>
               </a:rPr>
-              <a:t>18. </a:t>
-            </a:r>
+              <a:t>11. </a:t>
+            </a:r>
+            <a:pPr algn="l" indent="0" marL="0">
+              <a:buNone/>
+            </a:pPr>
             <a:r>
               <a:rPr lang="en-US" sz="1400" dirty="0">
                 <a:solidFill>
@@ -4673,7 +6435,7 @@
         </p:nvSpPr>
         <p:spPr>
           <a:xfrm>
-            <a:off x="457200" y="5029200"/>
+            <a:off x="274320" y="5029200"/>
             <a:ext cx="5829300" cy="0"/>
           </a:xfrm>
           <a:prstGeom prst="rect">
@@ -4686,7 +6448,7 @@
           <a:bodyPr wrap="square" rtlCol="0" anchor="ctr"/>
           <a:lstStyle/>
           <a:p>
-            <a:pPr marL="0" indent="0" algn="l">
+            <a:pPr algn="l" indent="0" marL="0">
               <a:buNone/>
             </a:pPr>
             <a:r>
@@ -4695,8 +6457,11 @@
                   <a:srgbClr val="F39200"/>
                 </a:solidFill>
               </a:rPr>
-              <a:t>19. </a:t>
-            </a:r>
+              <a:t>12. </a:t>
+            </a:r>
+            <a:pPr algn="l" indent="0" marL="0">
+              <a:buNone/>
+            </a:pPr>
             <a:r>
               <a:rPr lang="en-US" sz="1400" dirty="0">
                 <a:solidFill>
@@ -4704,6 +6469,82 @@
                 </a:solidFill>
               </a:rPr>
               <a:t>FABRICAR TAPA Y BARANDAS DE ESTANQUE</a:t>
+            </a:r>
+            <a:endParaRPr lang="en-US" sz="1400" dirty="0"/>
+          </a:p>
+        </p:txBody>
+      </p:sp>
+      <p:sp>
+        <p:nvSpPr>
+          <p:cNvPr id="4" name="Shape 2"/>
+          <p:cNvSpPr/>
+          <p:nvPr/>
+        </p:nvSpPr>
+        <p:spPr>
+          <a:xfrm>
+            <a:off x="457200" y="731520"/>
+            <a:ext cx="6766560" cy="45720"/>
+          </a:xfrm>
+          <a:prstGeom prst="rect">
+            <a:avLst/>
+          </a:prstGeom>
+          <a:solidFill>
+            <a:srgbClr val="F39200"/>
+          </a:solidFill>
+          <a:ln/>
+        </p:spPr>
+      </p:sp>
+      <p:sp>
+        <p:nvSpPr>
+          <p:cNvPr id="5" name="Shape 3"/>
+          <p:cNvSpPr/>
+          <p:nvPr/>
+        </p:nvSpPr>
+        <p:spPr>
+          <a:xfrm>
+            <a:off x="0" y="9692640"/>
+            <a:ext cx="7772400" cy="210312"/>
+          </a:xfrm>
+          <a:prstGeom prst="rect">
+            <a:avLst/>
+          </a:prstGeom>
+          <a:solidFill>
+            <a:srgbClr val="F39200"/>
+          </a:solidFill>
+          <a:ln/>
+        </p:spPr>
+      </p:sp>
+      <p:sp>
+        <p:nvSpPr>
+          <p:cNvPr id="6" name="Text 4"/>
+          <p:cNvSpPr/>
+          <p:nvPr/>
+        </p:nvSpPr>
+        <p:spPr>
+          <a:xfrm>
+            <a:off x="1280160" y="9793224"/>
+            <a:ext cx="5829300" cy="0"/>
+          </a:xfrm>
+          <a:prstGeom prst="rect">
+            <a:avLst/>
+          </a:prstGeom>
+          <a:noFill/>
+          <a:ln/>
+        </p:spPr>
+        <p:txBody>
+          <a:bodyPr wrap="square" rtlCol="0" anchor="ctr"/>
+          <a:lstStyle/>
+          <a:p>
+            <a:pPr algn="r" indent="0" marL="0">
+              <a:buNone/>
+            </a:pPr>
+            <a:r>
+              <a:rPr lang="en-US" sz="1400" dirty="0">
+                <a:solidFill>
+                  <a:srgbClr val="FFFFFF"/>
+                </a:solidFill>
+              </a:rPr>
+              <a:t>Página 6 de 22</a:t>
             </a:r>
             <a:endParaRPr lang="en-US" sz="1400" dirty="0"/>
           </a:p>
@@ -4725,7 +6566,6 @@
         <a:solidFill>
           <a:srgbClr val="616161"/>
         </a:solidFill>
-        <a:effectLst/>
       </p:bgPr>
     </p:bg>
     <p:spTree>
@@ -4750,7 +6590,7 @@
         </p:nvSpPr>
         <p:spPr>
           <a:xfrm>
-            <a:off x="457200" y="457200"/>
+            <a:off x="274320" y="2286000"/>
             <a:ext cx="5829300" cy="0"/>
           </a:xfrm>
           <a:prstGeom prst="rect">
@@ -4763,7 +6603,7 @@
           <a:bodyPr wrap="square" rtlCol="0" anchor="ctr"/>
           <a:lstStyle/>
           <a:p>
-            <a:pPr marL="0" indent="0" algn="l">
+            <a:pPr algn="l" indent="0" marL="0">
               <a:buNone/>
             </a:pPr>
             <a:r>
@@ -4772,8 +6612,11 @@
                   <a:srgbClr val="F39200"/>
                 </a:solidFill>
               </a:rPr>
-              <a:t>20. </a:t>
-            </a:r>
+              <a:t>13. </a:t>
+            </a:r>
+            <a:pPr algn="l" indent="0" marL="0">
+              <a:buNone/>
+            </a:pPr>
             <a:r>
               <a:rPr lang="en-US" sz="1400" dirty="0">
                 <a:solidFill>
@@ -4794,7 +6637,7 @@
         </p:nvSpPr>
         <p:spPr>
           <a:xfrm>
-            <a:off x="457200" y="5029200"/>
+            <a:off x="274320" y="5029200"/>
             <a:ext cx="5829300" cy="0"/>
           </a:xfrm>
           <a:prstGeom prst="rect">
@@ -4807,7 +6650,7 @@
           <a:bodyPr wrap="square" rtlCol="0" anchor="ctr"/>
           <a:lstStyle/>
           <a:p>
-            <a:pPr marL="0" indent="0" algn="l">
+            <a:pPr algn="l" indent="0" marL="0">
               <a:buNone/>
             </a:pPr>
             <a:r>
@@ -4816,8 +6659,11 @@
                   <a:srgbClr val="F39200"/>
                 </a:solidFill>
               </a:rPr>
-              <a:t>21. </a:t>
-            </a:r>
+              <a:t>14. </a:t>
+            </a:r>
+            <a:pPr algn="l" indent="0" marL="0">
+              <a:buNone/>
+            </a:pPr>
             <a:r>
               <a:rPr lang="en-US" sz="1400" dirty="0">
                 <a:solidFill>
@@ -4825,6 +6671,82 @@
                 </a:solidFill>
               </a:rPr>
               <a:t>REPONER TAPABARRO RH POSICIÓN N°2</a:t>
+            </a:r>
+            <a:endParaRPr lang="en-US" sz="1400" dirty="0"/>
+          </a:p>
+        </p:txBody>
+      </p:sp>
+      <p:sp>
+        <p:nvSpPr>
+          <p:cNvPr id="4" name="Shape 2"/>
+          <p:cNvSpPr/>
+          <p:nvPr/>
+        </p:nvSpPr>
+        <p:spPr>
+          <a:xfrm>
+            <a:off x="457200" y="731520"/>
+            <a:ext cx="6766560" cy="45720"/>
+          </a:xfrm>
+          <a:prstGeom prst="rect">
+            <a:avLst/>
+          </a:prstGeom>
+          <a:solidFill>
+            <a:srgbClr val="F39200"/>
+          </a:solidFill>
+          <a:ln/>
+        </p:spPr>
+      </p:sp>
+      <p:sp>
+        <p:nvSpPr>
+          <p:cNvPr id="5" name="Shape 3"/>
+          <p:cNvSpPr/>
+          <p:nvPr/>
+        </p:nvSpPr>
+        <p:spPr>
+          <a:xfrm>
+            <a:off x="0" y="9692640"/>
+            <a:ext cx="7772400" cy="210312"/>
+          </a:xfrm>
+          <a:prstGeom prst="rect">
+            <a:avLst/>
+          </a:prstGeom>
+          <a:solidFill>
+            <a:srgbClr val="F39200"/>
+          </a:solidFill>
+          <a:ln/>
+        </p:spPr>
+      </p:sp>
+      <p:sp>
+        <p:nvSpPr>
+          <p:cNvPr id="6" name="Text 4"/>
+          <p:cNvSpPr/>
+          <p:nvPr/>
+        </p:nvSpPr>
+        <p:spPr>
+          <a:xfrm>
+            <a:off x="1280160" y="9793224"/>
+            <a:ext cx="5829300" cy="0"/>
+          </a:xfrm>
+          <a:prstGeom prst="rect">
+            <a:avLst/>
+          </a:prstGeom>
+          <a:noFill/>
+          <a:ln/>
+        </p:spPr>
+        <p:txBody>
+          <a:bodyPr wrap="square" rtlCol="0" anchor="ctr"/>
+          <a:lstStyle/>
+          <a:p>
+            <a:pPr algn="r" indent="0" marL="0">
+              <a:buNone/>
+            </a:pPr>
+            <a:r>
+              <a:rPr lang="en-US" sz="1400" dirty="0">
+                <a:solidFill>
+                  <a:srgbClr val="FFFFFF"/>
+                </a:solidFill>
+              </a:rPr>
+              <a:t>Página 7 de 22</a:t>
             </a:r>
             <a:endParaRPr lang="en-US" sz="1400" dirty="0"/>
           </a:p>
@@ -4846,7 +6768,6 @@
         <a:solidFill>
           <a:srgbClr val="616161"/>
         </a:solidFill>
-        <a:effectLst/>
       </p:bgPr>
     </p:bg>
     <p:spTree>
@@ -4871,7 +6792,7 @@
         </p:nvSpPr>
         <p:spPr>
           <a:xfrm>
-            <a:off x="457200" y="457200"/>
+            <a:off x="274320" y="2286000"/>
             <a:ext cx="5829300" cy="0"/>
           </a:xfrm>
           <a:prstGeom prst="rect">
@@ -4884,7 +6805,7 @@
           <a:bodyPr wrap="square" rtlCol="0" anchor="ctr"/>
           <a:lstStyle/>
           <a:p>
-            <a:pPr marL="0" indent="0" algn="l">
+            <a:pPr algn="l" indent="0" marL="0">
               <a:buNone/>
             </a:pPr>
             <a:r>
@@ -4893,8 +6814,11 @@
                   <a:srgbClr val="F39200"/>
                 </a:solidFill>
               </a:rPr>
-              <a:t>22. </a:t>
-            </a:r>
+              <a:t>15. </a:t>
+            </a:r>
+            <a:pPr algn="l" indent="0" marL="0">
+              <a:buNone/>
+            </a:pPr>
             <a:r>
               <a:rPr lang="en-US" sz="1400" dirty="0">
                 <a:solidFill>
@@ -4915,7 +6839,7 @@
         </p:nvSpPr>
         <p:spPr>
           <a:xfrm>
-            <a:off x="457200" y="5029200"/>
+            <a:off x="274320" y="5029200"/>
             <a:ext cx="5829300" cy="0"/>
           </a:xfrm>
           <a:prstGeom prst="rect">
@@ -4928,7 +6852,7 @@
           <a:bodyPr wrap="square" rtlCol="0" anchor="ctr"/>
           <a:lstStyle/>
           <a:p>
-            <a:pPr marL="0" indent="0" algn="l">
+            <a:pPr algn="l" indent="0" marL="0">
               <a:buNone/>
             </a:pPr>
             <a:r>
@@ -4937,8 +6861,11 @@
                   <a:srgbClr val="F39200"/>
                 </a:solidFill>
               </a:rPr>
-              <a:t>23. </a:t>
-            </a:r>
+              <a:t>16. </a:t>
+            </a:r>
+            <a:pPr algn="l" indent="0" marL="0">
+              <a:buNone/>
+            </a:pPr>
             <a:r>
               <a:rPr lang="en-US" sz="1400" dirty="0">
                 <a:solidFill>
@@ -4946,6 +6873,82 @@
                 </a:solidFill>
               </a:rPr>
               <a:t>REPONER PASADOR DE TIRO DELANTERO</a:t>
+            </a:r>
+            <a:endParaRPr lang="en-US" sz="1400" dirty="0"/>
+          </a:p>
+        </p:txBody>
+      </p:sp>
+      <p:sp>
+        <p:nvSpPr>
+          <p:cNvPr id="4" name="Shape 2"/>
+          <p:cNvSpPr/>
+          <p:nvPr/>
+        </p:nvSpPr>
+        <p:spPr>
+          <a:xfrm>
+            <a:off x="457200" y="731520"/>
+            <a:ext cx="6766560" cy="45720"/>
+          </a:xfrm>
+          <a:prstGeom prst="rect">
+            <a:avLst/>
+          </a:prstGeom>
+          <a:solidFill>
+            <a:srgbClr val="F39200"/>
+          </a:solidFill>
+          <a:ln/>
+        </p:spPr>
+      </p:sp>
+      <p:sp>
+        <p:nvSpPr>
+          <p:cNvPr id="5" name="Shape 3"/>
+          <p:cNvSpPr/>
+          <p:nvPr/>
+        </p:nvSpPr>
+        <p:spPr>
+          <a:xfrm>
+            <a:off x="0" y="9692640"/>
+            <a:ext cx="7772400" cy="210312"/>
+          </a:xfrm>
+          <a:prstGeom prst="rect">
+            <a:avLst/>
+          </a:prstGeom>
+          <a:solidFill>
+            <a:srgbClr val="F39200"/>
+          </a:solidFill>
+          <a:ln/>
+        </p:spPr>
+      </p:sp>
+      <p:sp>
+        <p:nvSpPr>
+          <p:cNvPr id="6" name="Text 4"/>
+          <p:cNvSpPr/>
+          <p:nvPr/>
+        </p:nvSpPr>
+        <p:spPr>
+          <a:xfrm>
+            <a:off x="1280160" y="9793224"/>
+            <a:ext cx="5829300" cy="0"/>
+          </a:xfrm>
+          <a:prstGeom prst="rect">
+            <a:avLst/>
+          </a:prstGeom>
+          <a:noFill/>
+          <a:ln/>
+        </p:spPr>
+        <p:txBody>
+          <a:bodyPr wrap="square" rtlCol="0" anchor="ctr"/>
+          <a:lstStyle/>
+          <a:p>
+            <a:pPr algn="r" indent="0" marL="0">
+              <a:buNone/>
+            </a:pPr>
+            <a:r>
+              <a:rPr lang="en-US" sz="1400" dirty="0">
+                <a:solidFill>
+                  <a:srgbClr val="FFFFFF"/>
+                </a:solidFill>
+              </a:rPr>
+              <a:t>Página 8 de 22</a:t>
             </a:r>
             <a:endParaRPr lang="en-US" sz="1400" dirty="0"/>
           </a:p>
@@ -4967,7 +6970,6 @@
         <a:solidFill>
           <a:srgbClr val="616161"/>
         </a:solidFill>
-        <a:effectLst/>
       </p:bgPr>
     </p:bg>
     <p:spTree>
@@ -4992,7 +6994,7 @@
         </p:nvSpPr>
         <p:spPr>
           <a:xfrm>
-            <a:off x="457200" y="457200"/>
+            <a:off x="274320" y="2286000"/>
             <a:ext cx="5829300" cy="0"/>
           </a:xfrm>
           <a:prstGeom prst="rect">
@@ -5005,7 +7007,7 @@
           <a:bodyPr wrap="square" rtlCol="0" anchor="ctr"/>
           <a:lstStyle/>
           <a:p>
-            <a:pPr marL="0" indent="0" algn="l">
+            <a:pPr algn="l" indent="0" marL="0">
               <a:buNone/>
             </a:pPr>
             <a:r>
@@ -5014,8 +7016,11 @@
                   <a:srgbClr val="F39200"/>
                 </a:solidFill>
               </a:rPr>
-              <a:t>24. </a:t>
-            </a:r>
+              <a:t>17. </a:t>
+            </a:r>
+            <a:pPr algn="l" indent="0" marL="0">
+              <a:buNone/>
+            </a:pPr>
             <a:r>
               <a:rPr lang="en-US" sz="1400" dirty="0">
                 <a:solidFill>
@@ -5036,7 +7041,7 @@
         </p:nvSpPr>
         <p:spPr>
           <a:xfrm>
-            <a:off x="457200" y="5029200"/>
+            <a:off x="274320" y="5029200"/>
             <a:ext cx="5829300" cy="0"/>
           </a:xfrm>
           <a:prstGeom prst="rect">
@@ -5049,7 +7054,7 @@
           <a:bodyPr wrap="square" rtlCol="0" anchor="ctr"/>
           <a:lstStyle/>
           <a:p>
-            <a:pPr marL="0" indent="0" algn="l">
+            <a:pPr algn="l" indent="0" marL="0">
               <a:buNone/>
             </a:pPr>
             <a:r>
@@ -5058,8 +7063,11 @@
                   <a:srgbClr val="F39200"/>
                 </a:solidFill>
               </a:rPr>
-              <a:t>25. </a:t>
-            </a:r>
+              <a:t>18. </a:t>
+            </a:r>
+            <a:pPr algn="l" indent="0" marL="0">
+              <a:buNone/>
+            </a:pPr>
             <a:r>
               <a:rPr lang="en-US" sz="1400" dirty="0">
                 <a:solidFill>
@@ -5067,6 +7075,82 @@
                 </a:solidFill>
               </a:rPr>
               <a:t>FABRICAR PROTECCIÓN DE FOCOS TRASEROS FALTANTES</a:t>
+            </a:r>
+            <a:endParaRPr lang="en-US" sz="1400" dirty="0"/>
+          </a:p>
+        </p:txBody>
+      </p:sp>
+      <p:sp>
+        <p:nvSpPr>
+          <p:cNvPr id="4" name="Shape 2"/>
+          <p:cNvSpPr/>
+          <p:nvPr/>
+        </p:nvSpPr>
+        <p:spPr>
+          <a:xfrm>
+            <a:off x="457200" y="731520"/>
+            <a:ext cx="6766560" cy="45720"/>
+          </a:xfrm>
+          <a:prstGeom prst="rect">
+            <a:avLst/>
+          </a:prstGeom>
+          <a:solidFill>
+            <a:srgbClr val="F39200"/>
+          </a:solidFill>
+          <a:ln/>
+        </p:spPr>
+      </p:sp>
+      <p:sp>
+        <p:nvSpPr>
+          <p:cNvPr id="5" name="Shape 3"/>
+          <p:cNvSpPr/>
+          <p:nvPr/>
+        </p:nvSpPr>
+        <p:spPr>
+          <a:xfrm>
+            <a:off x="0" y="9692640"/>
+            <a:ext cx="7772400" cy="210312"/>
+          </a:xfrm>
+          <a:prstGeom prst="rect">
+            <a:avLst/>
+          </a:prstGeom>
+          <a:solidFill>
+            <a:srgbClr val="F39200"/>
+          </a:solidFill>
+          <a:ln/>
+        </p:spPr>
+      </p:sp>
+      <p:sp>
+        <p:nvSpPr>
+          <p:cNvPr id="6" name="Text 4"/>
+          <p:cNvSpPr/>
+          <p:nvPr/>
+        </p:nvSpPr>
+        <p:spPr>
+          <a:xfrm>
+            <a:off x="1280160" y="9793224"/>
+            <a:ext cx="5829300" cy="0"/>
+          </a:xfrm>
+          <a:prstGeom prst="rect">
+            <a:avLst/>
+          </a:prstGeom>
+          <a:noFill/>
+          <a:ln/>
+        </p:spPr>
+        <p:txBody>
+          <a:bodyPr wrap="square" rtlCol="0" anchor="ctr"/>
+          <a:lstStyle/>
+          <a:p>
+            <a:pPr algn="r" indent="0" marL="0">
+              <a:buNone/>
+            </a:pPr>
+            <a:r>
+              <a:rPr lang="en-US" sz="1400" dirty="0">
+                <a:solidFill>
+                  <a:srgbClr val="FFFFFF"/>
+                </a:solidFill>
+              </a:rPr>
+              <a:t>Página 9 de 22</a:t>
             </a:r>
             <a:endParaRPr lang="en-US" sz="1400" dirty="0"/>
           </a:p>
@@ -5373,299 +7457,4 @@
     </a:ext>
   </a:extLst>
 </a:theme>
-</file>
-
-<file path=ppt/theme/theme2.xml><?xml version="1.0" encoding="utf-8"?>
-<a:theme xmlns:a="http://schemas.openxmlformats.org/drawingml/2006/main" name="Tema de Office">
-  <a:themeElements>
-    <a:clrScheme name="Office">
-      <a:dk1>
-        <a:sysClr val="windowText" lastClr="000000"/>
-      </a:dk1>
-      <a:lt1>
-        <a:sysClr val="window" lastClr="FFFFFF"/>
-      </a:lt1>
-      <a:dk2>
-        <a:srgbClr val="44546A"/>
-      </a:dk2>
-      <a:lt2>
-        <a:srgbClr val="E7E6E6"/>
-      </a:lt2>
-      <a:accent1>
-        <a:srgbClr val="4472C4"/>
-      </a:accent1>
-      <a:accent2>
-        <a:srgbClr val="ED7D31"/>
-      </a:accent2>
-      <a:accent3>
-        <a:srgbClr val="A5A5A5"/>
-      </a:accent3>
-      <a:accent4>
-        <a:srgbClr val="FFC000"/>
-      </a:accent4>
-      <a:accent5>
-        <a:srgbClr val="5B9BD5"/>
-      </a:accent5>
-      <a:accent6>
-        <a:srgbClr val="70AD47"/>
-      </a:accent6>
-      <a:hlink>
-        <a:srgbClr val="0563C1"/>
-      </a:hlink>
-      <a:folHlink>
-        <a:srgbClr val="954F72"/>
-      </a:folHlink>
-    </a:clrScheme>
-    <a:fontScheme name="Office">
-      <a:majorFont>
-        <a:latin typeface="Calibri Light" panose="020F0302020204030204"/>
-        <a:ea typeface=""/>
-        <a:cs typeface=""/>
-        <a:font script="Jpan" typeface="游ゴシック Light"/>
-        <a:font script="Hang" typeface="맑은 고딕"/>
-        <a:font script="Hans" typeface="等线 Light"/>
-        <a:font script="Hant" typeface="新細明體"/>
-        <a:font script="Arab" typeface="Times New Roman"/>
-        <a:font script="Hebr" typeface="Times New Roman"/>
-        <a:font script="Thai" typeface="Angsana New"/>
-        <a:font script="Ethi" typeface="Nyala"/>
-        <a:font script="Beng" typeface="Vrinda"/>
-        <a:font script="Gujr" typeface="Shruti"/>
-        <a:font script="Khmr" typeface="MoolBoran"/>
-        <a:font script="Knda" typeface="Tunga"/>
-        <a:font script="Guru" typeface="Raavi"/>
-        <a:font script="Cans" typeface="Euphemia"/>
-        <a:font script="Cher" typeface="Plantagenet Cherokee"/>
-        <a:font script="Yiii" typeface="Microsoft Yi Baiti"/>
-        <a:font script="Tibt" typeface="Microsoft Himalaya"/>
-        <a:font script="Thaa" typeface="MV Boli"/>
-        <a:font script="Deva" typeface="Mangal"/>
-        <a:font script="Telu" typeface="Gautami"/>
-        <a:font script="Taml" typeface="Latha"/>
-        <a:font script="Syrc" typeface="Estrangelo Edessa"/>
-        <a:font script="Orya" typeface="Kalinga"/>
-        <a:font script="Mlym" typeface="Kartika"/>
-        <a:font script="Laoo" typeface="DokChampa"/>
-        <a:font script="Sinh" typeface="Iskoola Pota"/>
-        <a:font script="Mong" typeface="Mongolian Baiti"/>
-        <a:font script="Viet" typeface="Times New Roman"/>
-        <a:font script="Uigh" typeface="Microsoft Uighur"/>
-        <a:font script="Geor" typeface="Sylfaen"/>
-        <a:font script="Armn" typeface="Arial"/>
-        <a:font script="Bugi" typeface="Leelawadee UI"/>
-        <a:font script="Bopo" typeface="Microsoft JhengHei"/>
-        <a:font script="Java" typeface="Javanese Text"/>
-        <a:font script="Lisu" typeface="Segoe UI"/>
-        <a:font script="Mymr" typeface="Myanmar Text"/>
-        <a:font script="Nkoo" typeface="Ebrima"/>
-        <a:font script="Olck" typeface="Nirmala UI"/>
-        <a:font script="Osma" typeface="Ebrima"/>
-        <a:font script="Phag" typeface="Phagspa"/>
-        <a:font script="Syrn" typeface="Estrangelo Edessa"/>
-        <a:font script="Syrj" typeface="Estrangelo Edessa"/>
-        <a:font script="Syre" typeface="Estrangelo Edessa"/>
-        <a:font script="Sora" typeface="Nirmala UI"/>
-        <a:font script="Tale" typeface="Microsoft Tai Le"/>
-        <a:font script="Talu" typeface="Microsoft New Tai Lue"/>
-        <a:font script="Tfng" typeface="Ebrima"/>
-      </a:majorFont>
-      <a:minorFont>
-        <a:latin typeface="Calibri" panose="020F0502020204030204"/>
-        <a:ea typeface=""/>
-        <a:cs typeface=""/>
-        <a:font script="Jpan" typeface="游ゴシック"/>
-        <a:font script="Hang" typeface="맑은 고딕"/>
-        <a:font script="Hans" typeface="等线"/>
-        <a:font script="Hant" typeface="新細明體"/>
-        <a:font script="Arab" typeface="Arial"/>
-        <a:font script="Hebr" typeface="Arial"/>
-        <a:font script="Thai" typeface="Cordia New"/>
-        <a:font script="Ethi" typeface="Nyala"/>
-        <a:font script="Beng" typeface="Vrinda"/>
-        <a:font script="Gujr" typeface="Shruti"/>
-        <a:font script="Khmr" typeface="DaunPenh"/>
-        <a:font script="Knda" typeface="Tunga"/>
-        <a:font script="Guru" typeface="Raavi"/>
-        <a:font script="Cans" typeface="Euphemia"/>
-        <a:font script="Cher" typeface="Plantagenet Cherokee"/>
-        <a:font script="Yiii" typeface="Microsoft Yi Baiti"/>
-        <a:font script="Tibt" typeface="Microsoft Himalaya"/>
-        <a:font script="Thaa" typeface="MV Boli"/>
-        <a:font script="Deva" typeface="Mangal"/>
-        <a:font script="Telu" typeface="Gautami"/>
-        <a:font script="Taml" typeface="Latha"/>
-        <a:font script="Syrc" typeface="Estrangelo Edessa"/>
-        <a:font script="Orya" typeface="Kalinga"/>
-        <a:font script="Mlym" typeface="Kartika"/>
-        <a:font script="Laoo" typeface="DokChampa"/>
-        <a:font script="Sinh" typeface="Iskoola Pota"/>
-        <a:font script="Mong" typeface="Mongolian Baiti"/>
-        <a:font script="Viet" typeface="Arial"/>
-        <a:font script="Uigh" typeface="Microsoft Uighur"/>
-        <a:font script="Geor" typeface="Sylfaen"/>
-        <a:font script="Armn" typeface="Arial"/>
-        <a:font script="Bugi" typeface="Leelawadee UI"/>
-        <a:font script="Bopo" typeface="Microsoft JhengHei"/>
-        <a:font script="Java" typeface="Javanese Text"/>
-        <a:font script="Lisu" typeface="Segoe UI"/>
-        <a:font script="Mymr" typeface="Myanmar Text"/>
-        <a:font script="Nkoo" typeface="Ebrima"/>
-        <a:font script="Olck" typeface="Nirmala UI"/>
-        <a:font script="Osma" typeface="Ebrima"/>
-        <a:font script="Phag" typeface="Phagspa"/>
-        <a:font script="Syrn" typeface="Estrangelo Edessa"/>
-        <a:font script="Syrj" typeface="Estrangelo Edessa"/>
-        <a:font script="Syre" typeface="Estrangelo Edessa"/>
-        <a:font script="Sora" typeface="Nirmala UI"/>
-        <a:font script="Tale" typeface="Microsoft Tai Le"/>
-        <a:font script="Talu" typeface="Microsoft New Tai Lue"/>
-        <a:font script="Tfng" typeface="Ebrima"/>
-      </a:minorFont>
-    </a:fontScheme>
-    <a:fmtScheme name="Office">
-      <a:fillStyleLst>
-        <a:solidFill>
-          <a:schemeClr val="phClr"/>
-        </a:solidFill>
-        <a:gradFill rotWithShape="1">
-          <a:gsLst>
-            <a:gs pos="0">
-              <a:schemeClr val="phClr">
-                <a:lumMod val="110000"/>
-                <a:satMod val="105000"/>
-                <a:tint val="67000"/>
-              </a:schemeClr>
-            </a:gs>
-            <a:gs pos="50000">
-              <a:schemeClr val="phClr">
-                <a:lumMod val="105000"/>
-                <a:satMod val="103000"/>
-                <a:tint val="73000"/>
-              </a:schemeClr>
-            </a:gs>
-            <a:gs pos="100000">
-              <a:schemeClr val="phClr">
-                <a:lumMod val="105000"/>
-                <a:satMod val="109000"/>
-                <a:tint val="81000"/>
-              </a:schemeClr>
-            </a:gs>
-          </a:gsLst>
-          <a:lin ang="5400000" scaled="0"/>
-        </a:gradFill>
-        <a:gradFill rotWithShape="1">
-          <a:gsLst>
-            <a:gs pos="0">
-              <a:schemeClr val="phClr">
-                <a:satMod val="103000"/>
-                <a:lumMod val="102000"/>
-                <a:tint val="94000"/>
-              </a:schemeClr>
-            </a:gs>
-            <a:gs pos="50000">
-              <a:schemeClr val="phClr">
-                <a:satMod val="110000"/>
-                <a:lumMod val="100000"/>
-                <a:shade val="100000"/>
-              </a:schemeClr>
-            </a:gs>
-            <a:gs pos="100000">
-              <a:schemeClr val="phClr">
-                <a:lumMod val="99000"/>
-                <a:satMod val="120000"/>
-                <a:shade val="78000"/>
-              </a:schemeClr>
-            </a:gs>
-          </a:gsLst>
-          <a:lin ang="5400000" scaled="0"/>
-        </a:gradFill>
-      </a:fillStyleLst>
-      <a:lnStyleLst>
-        <a:ln w="6350" cap="flat" cmpd="sng" algn="ctr">
-          <a:solidFill>
-            <a:schemeClr val="phClr"/>
-          </a:solidFill>
-          <a:prstDash val="solid"/>
-          <a:miter lim="800000"/>
-        </a:ln>
-        <a:ln w="12700" cap="flat" cmpd="sng" algn="ctr">
-          <a:solidFill>
-            <a:schemeClr val="phClr"/>
-          </a:solidFill>
-          <a:prstDash val="solid"/>
-          <a:miter lim="800000"/>
-        </a:ln>
-        <a:ln w="19050" cap="flat" cmpd="sng" algn="ctr">
-          <a:solidFill>
-            <a:schemeClr val="phClr"/>
-          </a:solidFill>
-          <a:prstDash val="solid"/>
-          <a:miter lim="800000"/>
-        </a:ln>
-      </a:lnStyleLst>
-      <a:effectStyleLst>
-        <a:effectStyle>
-          <a:effectLst/>
-        </a:effectStyle>
-        <a:effectStyle>
-          <a:effectLst/>
-        </a:effectStyle>
-        <a:effectStyle>
-          <a:effectLst>
-            <a:outerShdw blurRad="57150" dist="19050" dir="5400000" algn="ctr" rotWithShape="0">
-              <a:srgbClr val="000000">
-                <a:alpha val="63000"/>
-              </a:srgbClr>
-            </a:outerShdw>
-          </a:effectLst>
-        </a:effectStyle>
-      </a:effectStyleLst>
-      <a:bgFillStyleLst>
-        <a:solidFill>
-          <a:schemeClr val="phClr"/>
-        </a:solidFill>
-        <a:solidFill>
-          <a:schemeClr val="phClr">
-            <a:tint val="95000"/>
-            <a:satMod val="170000"/>
-          </a:schemeClr>
-        </a:solidFill>
-        <a:gradFill rotWithShape="1">
-          <a:gsLst>
-            <a:gs pos="0">
-              <a:schemeClr val="phClr">
-                <a:tint val="93000"/>
-                <a:satMod val="150000"/>
-                <a:shade val="98000"/>
-                <a:lumMod val="102000"/>
-              </a:schemeClr>
-            </a:gs>
-            <a:gs pos="50000">
-              <a:schemeClr val="phClr">
-                <a:tint val="98000"/>
-                <a:satMod val="130000"/>
-                <a:shade val="90000"/>
-                <a:lumMod val="103000"/>
-              </a:schemeClr>
-            </a:gs>
-            <a:gs pos="100000">
-              <a:schemeClr val="phClr">
-                <a:shade val="63000"/>
-                <a:satMod val="120000"/>
-              </a:schemeClr>
-            </a:gs>
-          </a:gsLst>
-          <a:lin ang="5400000" scaled="0"/>
-        </a:gradFill>
-      </a:bgFillStyleLst>
-    </a:fmtScheme>
-  </a:themeElements>
-  <a:objectDefaults/>
-  <a:extraClrSchemeLst/>
-  <a:extLst>
-    <a:ext uri="{05A4C25C-085E-4340-85A3-A5531E510DB2}">
-      <thm15:themeFamily xmlns:thm15="http://schemas.microsoft.com/office/thememl/2012/main" name="Office Theme" id="{62F939B6-93AF-4DB8-9C6B-D6C7DFDC589F}" vid="{4A3C46E8-61CC-4603-A589-7422A47A8E4A}"/>
-    </a:ext>
-  </a:extLst>
-</a:theme>
 </file>
</xml_diff>